<commit_message>
Update architecture overview diagram.
</commit_message>
<xml_diff>
--- a/Test Framework Midterm Presentation 001.pptx
+++ b/Test Framework Midterm Presentation 001.pptx
@@ -738,7 +738,7 @@
           </a:lstStyle>
           <a:p>
             <a:r>
-              <a:rPr lang="en-US" smtClean="0"/>
+              <a:rPr lang="en-US"/>
               <a:t>Click to edit Master title style</a:t>
             </a:r>
             <a:endParaRPr lang="en-US" dirty="0"/>
@@ -858,7 +858,7 @@
           </a:lstStyle>
           <a:p>
             <a:r>
-              <a:rPr lang="en-US" smtClean="0"/>
+              <a:rPr lang="en-US"/>
               <a:t>Click to edit Master subtitle style</a:t>
             </a:r>
             <a:endParaRPr lang="en-US" dirty="0"/>
@@ -883,7 +883,7 @@
             <a:fld id="{B61BEF0D-F0BB-DE4B-95CE-6DB70DBA9567}" type="datetimeFigureOut">
               <a:rPr lang="en-US" dirty="0"/>
               <a:pPr/>
-              <a:t>7/28/2020</a:t>
+              <a:t>7/29/2020</a:t>
             </a:fld>
             <a:endParaRPr lang="en-US" dirty="0"/>
           </a:p>
@@ -984,7 +984,7 @@
           </a:lstStyle>
           <a:p>
             <a:r>
-              <a:rPr lang="en-US" smtClean="0"/>
+              <a:rPr lang="en-US"/>
               <a:t>Click to edit Master title style</a:t>
             </a:r>
             <a:endParaRPr lang="en-US" dirty="0"/>
@@ -1107,7 +1107,7 @@
           <a:p>
             <a:pPr lvl="0"/>
             <a:r>
-              <a:rPr lang="en-US" smtClean="0"/>
+              <a:rPr lang="en-US"/>
               <a:t>Click to edit Master text styles</a:t>
             </a:r>
           </a:p>
@@ -1131,7 +1131,7 @@
             <a:fld id="{B61BEF0D-F0BB-DE4B-95CE-6DB70DBA9567}" type="datetimeFigureOut">
               <a:rPr lang="en-US" dirty="0"/>
               <a:pPr/>
-              <a:t>7/28/2020</a:t>
+              <a:t>7/29/2020</a:t>
             </a:fld>
             <a:endParaRPr lang="en-US" dirty="0"/>
           </a:p>
@@ -1232,7 +1232,7 @@
           </a:lstStyle>
           <a:p>
             <a:r>
-              <a:rPr lang="en-US" smtClean="0"/>
+              <a:rPr lang="en-US"/>
               <a:t>Click to edit Master title style</a:t>
             </a:r>
             <a:endParaRPr lang="en-US" dirty="0"/>
@@ -1296,7 +1296,7 @@
           <a:p>
             <a:pPr lvl="0"/>
             <a:r>
-              <a:rPr lang="en-US" smtClean="0"/>
+              <a:rPr lang="en-US"/>
               <a:t>Click to edit Master text styles</a:t>
             </a:r>
           </a:p>
@@ -1418,7 +1418,7 @@
           <a:p>
             <a:pPr lvl="0"/>
             <a:r>
-              <a:rPr lang="en-US" smtClean="0"/>
+              <a:rPr lang="en-US"/>
               <a:t>Click to edit Master text styles</a:t>
             </a:r>
           </a:p>
@@ -1442,7 +1442,7 @@
             <a:fld id="{B61BEF0D-F0BB-DE4B-95CE-6DB70DBA9567}" type="datetimeFigureOut">
               <a:rPr lang="en-US" dirty="0"/>
               <a:pPr/>
-              <a:t>7/28/2020</a:t>
+              <a:t>7/29/2020</a:t>
             </a:fld>
             <a:endParaRPr lang="en-US" dirty="0"/>
           </a:p>
@@ -1625,7 +1625,7 @@
           </a:lstStyle>
           <a:p>
             <a:r>
-              <a:rPr lang="en-US" smtClean="0"/>
+              <a:rPr lang="en-US"/>
               <a:t>Click to edit Master title style</a:t>
             </a:r>
             <a:endParaRPr lang="en-US" dirty="0"/>
@@ -1748,7 +1748,7 @@
           <a:p>
             <a:pPr lvl="0"/>
             <a:r>
-              <a:rPr lang="en-US" smtClean="0"/>
+              <a:rPr lang="en-US"/>
               <a:t>Click to edit Master text styles</a:t>
             </a:r>
           </a:p>
@@ -1772,7 +1772,7 @@
             <a:fld id="{B61BEF0D-F0BB-DE4B-95CE-6DB70DBA9567}" type="datetimeFigureOut">
               <a:rPr lang="en-US" dirty="0"/>
               <a:pPr/>
-              <a:t>7/28/2020</a:t>
+              <a:t>7/29/2020</a:t>
             </a:fld>
             <a:endParaRPr lang="en-US" dirty="0"/>
           </a:p>
@@ -1873,7 +1873,7 @@
           </a:lstStyle>
           <a:p>
             <a:r>
-              <a:rPr lang="en-US" smtClean="0"/>
+              <a:rPr lang="en-US"/>
               <a:t>Click to edit Master title style</a:t>
             </a:r>
             <a:endParaRPr lang="en-US" dirty="0"/>
@@ -1937,7 +1937,7 @@
           <a:p>
             <a:pPr lvl="0"/>
             <a:r>
-              <a:rPr lang="en-US" smtClean="0"/>
+              <a:rPr lang="en-US"/>
               <a:t>Click to edit Master text styles</a:t>
             </a:r>
           </a:p>
@@ -2059,7 +2059,7 @@
           <a:p>
             <a:pPr lvl="0"/>
             <a:r>
-              <a:rPr lang="en-US" smtClean="0"/>
+              <a:rPr lang="en-US"/>
               <a:t>Click to edit Master text styles</a:t>
             </a:r>
           </a:p>
@@ -2083,7 +2083,7 @@
             <a:fld id="{B61BEF0D-F0BB-DE4B-95CE-6DB70DBA9567}" type="datetimeFigureOut">
               <a:rPr lang="en-US" dirty="0"/>
               <a:pPr/>
-              <a:t>7/28/2020</a:t>
+              <a:t>7/29/2020</a:t>
             </a:fld>
             <a:endParaRPr lang="en-US" dirty="0"/>
           </a:p>
@@ -2266,7 +2266,7 @@
           </a:lstStyle>
           <a:p>
             <a:r>
-              <a:rPr lang="en-US" smtClean="0"/>
+              <a:rPr lang="en-US"/>
               <a:t>Click to edit Master title style</a:t>
             </a:r>
             <a:endParaRPr lang="en-US" dirty="0"/>
@@ -2327,7 +2327,7 @@
           <a:p>
             <a:pPr lvl="0"/>
             <a:r>
-              <a:rPr lang="en-US" smtClean="0"/>
+              <a:rPr lang="en-US"/>
               <a:t>Click to edit Master text styles</a:t>
             </a:r>
           </a:p>
@@ -2449,7 +2449,7 @@
           <a:p>
             <a:pPr lvl="0"/>
             <a:r>
-              <a:rPr lang="en-US" smtClean="0"/>
+              <a:rPr lang="en-US"/>
               <a:t>Click to edit Master text styles</a:t>
             </a:r>
           </a:p>
@@ -2473,7 +2473,7 @@
             <a:fld id="{B61BEF0D-F0BB-DE4B-95CE-6DB70DBA9567}" type="datetimeFigureOut">
               <a:rPr lang="en-US" dirty="0"/>
               <a:pPr/>
-              <a:t>7/28/2020</a:t>
+              <a:t>7/29/2020</a:t>
             </a:fld>
             <a:endParaRPr lang="en-US" dirty="0"/>
           </a:p>
@@ -2563,7 +2563,7 @@
           <a:lstStyle/>
           <a:p>
             <a:r>
-              <a:rPr lang="en-US" smtClean="0"/>
+              <a:rPr lang="en-US"/>
               <a:t>Click to edit Master title style</a:t>
             </a:r>
             <a:endParaRPr lang="en-US" dirty="0"/>
@@ -2587,35 +2587,35 @@
           <a:p>
             <a:pPr lvl="0"/>
             <a:r>
-              <a:rPr lang="en-US" smtClean="0"/>
+              <a:rPr lang="en-US"/>
               <a:t>Click to edit Master text styles</a:t>
             </a:r>
           </a:p>
           <a:p>
             <a:pPr lvl="1"/>
             <a:r>
-              <a:rPr lang="en-US" smtClean="0"/>
+              <a:rPr lang="en-US"/>
               <a:t>Second level</a:t>
             </a:r>
           </a:p>
           <a:p>
             <a:pPr lvl="2"/>
             <a:r>
-              <a:rPr lang="en-US" smtClean="0"/>
+              <a:rPr lang="en-US"/>
               <a:t>Third level</a:t>
             </a:r>
           </a:p>
           <a:p>
             <a:pPr lvl="3"/>
             <a:r>
-              <a:rPr lang="en-US" smtClean="0"/>
+              <a:rPr lang="en-US"/>
               <a:t>Fourth level</a:t>
             </a:r>
           </a:p>
           <a:p>
             <a:pPr lvl="4"/>
             <a:r>
-              <a:rPr lang="en-US" smtClean="0"/>
+              <a:rPr lang="en-US"/>
               <a:t>Fifth level</a:t>
             </a:r>
             <a:endParaRPr lang="en-US" dirty="0"/>
@@ -2639,7 +2639,7 @@
           <a:p>
             <a:fld id="{55C6B4A9-1611-4792-9094-5F34BCA07E0B}" type="datetimeFigureOut">
               <a:rPr lang="en-US" dirty="0"/>
-              <a:t>7/28/2020</a:t>
+              <a:t>7/29/2020</a:t>
             </a:fld>
             <a:endParaRPr lang="en-US" dirty="0"/>
           </a:p>
@@ -2733,7 +2733,7 @@
           <a:lstStyle/>
           <a:p>
             <a:r>
-              <a:rPr lang="en-US" smtClean="0"/>
+              <a:rPr lang="en-US"/>
               <a:t>Click to edit Master title style</a:t>
             </a:r>
             <a:endParaRPr lang="en-US" dirty="0"/>
@@ -2762,35 +2762,35 @@
           <a:p>
             <a:pPr lvl="0"/>
             <a:r>
-              <a:rPr lang="en-US" smtClean="0"/>
+              <a:rPr lang="en-US"/>
               <a:t>Click to edit Master text styles</a:t>
             </a:r>
           </a:p>
           <a:p>
             <a:pPr lvl="1"/>
             <a:r>
-              <a:rPr lang="en-US" smtClean="0"/>
+              <a:rPr lang="en-US"/>
               <a:t>Second level</a:t>
             </a:r>
           </a:p>
           <a:p>
             <a:pPr lvl="2"/>
             <a:r>
-              <a:rPr lang="en-US" smtClean="0"/>
+              <a:rPr lang="en-US"/>
               <a:t>Third level</a:t>
             </a:r>
           </a:p>
           <a:p>
             <a:pPr lvl="3"/>
             <a:r>
-              <a:rPr lang="en-US" smtClean="0"/>
+              <a:rPr lang="en-US"/>
               <a:t>Fourth level</a:t>
             </a:r>
           </a:p>
           <a:p>
             <a:pPr lvl="4"/>
             <a:r>
-              <a:rPr lang="en-US" smtClean="0"/>
+              <a:rPr lang="en-US"/>
               <a:t>Fifth level</a:t>
             </a:r>
             <a:endParaRPr lang="en-US" dirty="0"/>
@@ -2815,7 +2815,7 @@
             <a:fld id="{B61BEF0D-F0BB-DE4B-95CE-6DB70DBA9567}" type="datetimeFigureOut">
               <a:rPr lang="en-US" dirty="0"/>
               <a:pPr/>
-              <a:t>7/28/2020</a:t>
+              <a:t>7/29/2020</a:t>
             </a:fld>
             <a:endParaRPr lang="en-US" dirty="0"/>
           </a:p>
@@ -2905,7 +2905,7 @@
           <a:lstStyle/>
           <a:p>
             <a:r>
-              <a:rPr lang="en-US" smtClean="0"/>
+              <a:rPr lang="en-US"/>
               <a:t>Click to edit Master title style</a:t>
             </a:r>
             <a:endParaRPr lang="en-US" dirty="0"/>
@@ -2929,35 +2929,35 @@
           <a:p>
             <a:pPr lvl="0"/>
             <a:r>
-              <a:rPr lang="en-US" smtClean="0"/>
+              <a:rPr lang="en-US"/>
               <a:t>Click to edit Master text styles</a:t>
             </a:r>
           </a:p>
           <a:p>
             <a:pPr lvl="1"/>
             <a:r>
-              <a:rPr lang="en-US" smtClean="0"/>
+              <a:rPr lang="en-US"/>
               <a:t>Second level</a:t>
             </a:r>
           </a:p>
           <a:p>
             <a:pPr lvl="2"/>
             <a:r>
-              <a:rPr lang="en-US" smtClean="0"/>
+              <a:rPr lang="en-US"/>
               <a:t>Third level</a:t>
             </a:r>
           </a:p>
           <a:p>
             <a:pPr lvl="3"/>
             <a:r>
-              <a:rPr lang="en-US" smtClean="0"/>
+              <a:rPr lang="en-US"/>
               <a:t>Fourth level</a:t>
             </a:r>
           </a:p>
           <a:p>
             <a:pPr lvl="4"/>
             <a:r>
-              <a:rPr lang="en-US" smtClean="0"/>
+              <a:rPr lang="en-US"/>
               <a:t>Fifth level</a:t>
             </a:r>
             <a:endParaRPr lang="en-US" dirty="0"/>
@@ -2981,7 +2981,7 @@
           <a:p>
             <a:fld id="{42A54C80-263E-416B-A8E0-580EDEADCBDC}" type="datetimeFigureOut">
               <a:rPr lang="en-US" dirty="0"/>
-              <a:t>7/28/2020</a:t>
+              <a:t>7/29/2020</a:t>
             </a:fld>
             <a:endParaRPr lang="en-US" dirty="0"/>
           </a:p>
@@ -3079,7 +3079,7 @@
           </a:lstStyle>
           <a:p>
             <a:r>
-              <a:rPr lang="en-US" smtClean="0"/>
+              <a:rPr lang="en-US"/>
               <a:t>Click to edit Master title style</a:t>
             </a:r>
             <a:endParaRPr lang="en-US" dirty="0"/>
@@ -3200,7 +3200,7 @@
           <a:p>
             <a:pPr lvl="0"/>
             <a:r>
-              <a:rPr lang="en-US" smtClean="0"/>
+              <a:rPr lang="en-US"/>
               <a:t>Click to edit Master text styles</a:t>
             </a:r>
           </a:p>
@@ -3224,7 +3224,7 @@
             <a:fld id="{B61BEF0D-F0BB-DE4B-95CE-6DB70DBA9567}" type="datetimeFigureOut">
               <a:rPr lang="en-US" dirty="0"/>
               <a:pPr/>
-              <a:t>7/28/2020</a:t>
+              <a:t>7/29/2020</a:t>
             </a:fld>
             <a:endParaRPr lang="en-US" dirty="0"/>
           </a:p>
@@ -3314,7 +3314,7 @@
           <a:lstStyle/>
           <a:p>
             <a:r>
-              <a:rPr lang="en-US" smtClean="0"/>
+              <a:rPr lang="en-US"/>
               <a:t>Click to edit Master title style</a:t>
             </a:r>
             <a:endParaRPr lang="en-US" dirty="0"/>
@@ -3343,35 +3343,35 @@
           <a:p>
             <a:pPr lvl="0"/>
             <a:r>
-              <a:rPr lang="en-US" smtClean="0"/>
+              <a:rPr lang="en-US"/>
               <a:t>Click to edit Master text styles</a:t>
             </a:r>
           </a:p>
           <a:p>
             <a:pPr lvl="1"/>
             <a:r>
-              <a:rPr lang="en-US" smtClean="0"/>
+              <a:rPr lang="en-US"/>
               <a:t>Second level</a:t>
             </a:r>
           </a:p>
           <a:p>
             <a:pPr lvl="2"/>
             <a:r>
-              <a:rPr lang="en-US" smtClean="0"/>
+              <a:rPr lang="en-US"/>
               <a:t>Third level</a:t>
             </a:r>
           </a:p>
           <a:p>
             <a:pPr lvl="3"/>
             <a:r>
-              <a:rPr lang="en-US" smtClean="0"/>
+              <a:rPr lang="en-US"/>
               <a:t>Fourth level</a:t>
             </a:r>
           </a:p>
           <a:p>
             <a:pPr lvl="4"/>
             <a:r>
-              <a:rPr lang="en-US" smtClean="0"/>
+              <a:rPr lang="en-US"/>
               <a:t>Fifth level</a:t>
             </a:r>
             <a:endParaRPr lang="en-US" dirty="0"/>
@@ -3400,35 +3400,35 @@
           <a:p>
             <a:pPr lvl="0"/>
             <a:r>
-              <a:rPr lang="en-US" smtClean="0"/>
+              <a:rPr lang="en-US"/>
               <a:t>Click to edit Master text styles</a:t>
             </a:r>
           </a:p>
           <a:p>
             <a:pPr lvl="1"/>
             <a:r>
-              <a:rPr lang="en-US" smtClean="0"/>
+              <a:rPr lang="en-US"/>
               <a:t>Second level</a:t>
             </a:r>
           </a:p>
           <a:p>
             <a:pPr lvl="2"/>
             <a:r>
-              <a:rPr lang="en-US" smtClean="0"/>
+              <a:rPr lang="en-US"/>
               <a:t>Third level</a:t>
             </a:r>
           </a:p>
           <a:p>
             <a:pPr lvl="3"/>
             <a:r>
-              <a:rPr lang="en-US" smtClean="0"/>
+              <a:rPr lang="en-US"/>
               <a:t>Fourth level</a:t>
             </a:r>
           </a:p>
           <a:p>
             <a:pPr lvl="4"/>
             <a:r>
-              <a:rPr lang="en-US" smtClean="0"/>
+              <a:rPr lang="en-US"/>
               <a:t>Fifth level</a:t>
             </a:r>
             <a:endParaRPr lang="en-US" dirty="0"/>
@@ -3452,7 +3452,7 @@
           <a:p>
             <a:fld id="{42A54C80-263E-416B-A8E0-580EDEADCBDC}" type="datetimeFigureOut">
               <a:rPr lang="en-US" dirty="0"/>
-              <a:t>7/28/2020</a:t>
+              <a:t>7/29/2020</a:t>
             </a:fld>
             <a:endParaRPr lang="en-US" dirty="0"/>
           </a:p>
@@ -3545,7 +3545,7 @@
           </a:lstStyle>
           <a:p>
             <a:r>
-              <a:rPr lang="en-US" smtClean="0"/>
+              <a:rPr lang="en-US"/>
               <a:t>Click to edit Master title style</a:t>
             </a:r>
             <a:endParaRPr lang="en-US" dirty="0"/>
@@ -3613,7 +3613,7 @@
           <a:p>
             <a:pPr lvl="0"/>
             <a:r>
-              <a:rPr lang="en-US" smtClean="0"/>
+              <a:rPr lang="en-US"/>
               <a:t>Click to edit Master text styles</a:t>
             </a:r>
           </a:p>
@@ -3643,35 +3643,35 @@
           <a:p>
             <a:pPr lvl="0"/>
             <a:r>
-              <a:rPr lang="en-US" smtClean="0"/>
+              <a:rPr lang="en-US"/>
               <a:t>Click to edit Master text styles</a:t>
             </a:r>
           </a:p>
           <a:p>
             <a:pPr lvl="1"/>
             <a:r>
-              <a:rPr lang="en-US" smtClean="0"/>
+              <a:rPr lang="en-US"/>
               <a:t>Second level</a:t>
             </a:r>
           </a:p>
           <a:p>
             <a:pPr lvl="2"/>
             <a:r>
-              <a:rPr lang="en-US" smtClean="0"/>
+              <a:rPr lang="en-US"/>
               <a:t>Third level</a:t>
             </a:r>
           </a:p>
           <a:p>
             <a:pPr lvl="3"/>
             <a:r>
-              <a:rPr lang="en-US" smtClean="0"/>
+              <a:rPr lang="en-US"/>
               <a:t>Fourth level</a:t>
             </a:r>
           </a:p>
           <a:p>
             <a:pPr lvl="4"/>
             <a:r>
-              <a:rPr lang="en-US" smtClean="0"/>
+              <a:rPr lang="en-US"/>
               <a:t>Fifth level</a:t>
             </a:r>
             <a:endParaRPr lang="en-US" dirty="0"/>
@@ -3739,7 +3739,7 @@
           <a:p>
             <a:pPr lvl="0"/>
             <a:r>
-              <a:rPr lang="en-US" smtClean="0"/>
+              <a:rPr lang="en-US"/>
               <a:t>Click to edit Master text styles</a:t>
             </a:r>
           </a:p>
@@ -3769,35 +3769,35 @@
           <a:p>
             <a:pPr lvl="0"/>
             <a:r>
-              <a:rPr lang="en-US" smtClean="0"/>
+              <a:rPr lang="en-US"/>
               <a:t>Click to edit Master text styles</a:t>
             </a:r>
           </a:p>
           <a:p>
             <a:pPr lvl="1"/>
             <a:r>
-              <a:rPr lang="en-US" smtClean="0"/>
+              <a:rPr lang="en-US"/>
               <a:t>Second level</a:t>
             </a:r>
           </a:p>
           <a:p>
             <a:pPr lvl="2"/>
             <a:r>
-              <a:rPr lang="en-US" smtClean="0"/>
+              <a:rPr lang="en-US"/>
               <a:t>Third level</a:t>
             </a:r>
           </a:p>
           <a:p>
             <a:pPr lvl="3"/>
             <a:r>
-              <a:rPr lang="en-US" smtClean="0"/>
+              <a:rPr lang="en-US"/>
               <a:t>Fourth level</a:t>
             </a:r>
           </a:p>
           <a:p>
             <a:pPr lvl="4"/>
             <a:r>
-              <a:rPr lang="en-US" smtClean="0"/>
+              <a:rPr lang="en-US"/>
               <a:t>Fifth level</a:t>
             </a:r>
             <a:endParaRPr lang="en-US" dirty="0"/>
@@ -3822,7 +3822,7 @@
             <a:fld id="{B61BEF0D-F0BB-DE4B-95CE-6DB70DBA9567}" type="datetimeFigureOut">
               <a:rPr lang="en-US" dirty="0"/>
               <a:pPr/>
-              <a:t>7/28/2020</a:t>
+              <a:t>7/29/2020</a:t>
             </a:fld>
             <a:endParaRPr lang="en-US" dirty="0"/>
           </a:p>
@@ -3917,7 +3917,7 @@
           <a:lstStyle/>
           <a:p>
             <a:r>
-              <a:rPr lang="en-US" smtClean="0"/>
+              <a:rPr lang="en-US"/>
               <a:t>Click to edit Master title style</a:t>
             </a:r>
             <a:endParaRPr lang="en-US" dirty="0"/>
@@ -3942,7 +3942,7 @@
             <a:fld id="{B61BEF0D-F0BB-DE4B-95CE-6DB70DBA9567}" type="datetimeFigureOut">
               <a:rPr lang="en-US" dirty="0"/>
               <a:pPr/>
-              <a:t>7/28/2020</a:t>
+              <a:t>7/29/2020</a:t>
             </a:fld>
             <a:endParaRPr lang="en-US" dirty="0"/>
           </a:p>
@@ -4034,7 +4034,7 @@
             <a:fld id="{B61BEF0D-F0BB-DE4B-95CE-6DB70DBA9567}" type="datetimeFigureOut">
               <a:rPr lang="en-US" dirty="0"/>
               <a:pPr/>
-              <a:t>7/28/2020</a:t>
+              <a:t>7/29/2020</a:t>
             </a:fld>
             <a:endParaRPr lang="en-US" dirty="0"/>
           </a:p>
@@ -4135,7 +4135,7 @@
           </a:lstStyle>
           <a:p>
             <a:r>
-              <a:rPr lang="en-US" smtClean="0"/>
+              <a:rPr lang="en-US"/>
               <a:t>Click to edit Master title style</a:t>
             </a:r>
             <a:endParaRPr lang="en-US" dirty="0"/>
@@ -4166,35 +4166,35 @@
           <a:p>
             <a:pPr lvl="0"/>
             <a:r>
-              <a:rPr lang="en-US" smtClean="0"/>
+              <a:rPr lang="en-US"/>
               <a:t>Click to edit Master text styles</a:t>
             </a:r>
           </a:p>
           <a:p>
             <a:pPr lvl="1"/>
             <a:r>
-              <a:rPr lang="en-US" smtClean="0"/>
+              <a:rPr lang="en-US"/>
               <a:t>Second level</a:t>
             </a:r>
           </a:p>
           <a:p>
             <a:pPr lvl="2"/>
             <a:r>
-              <a:rPr lang="en-US" smtClean="0"/>
+              <a:rPr lang="en-US"/>
               <a:t>Third level</a:t>
             </a:r>
           </a:p>
           <a:p>
             <a:pPr lvl="3"/>
             <a:r>
-              <a:rPr lang="en-US" smtClean="0"/>
+              <a:rPr lang="en-US"/>
               <a:t>Fourth level</a:t>
             </a:r>
           </a:p>
           <a:p>
             <a:pPr lvl="4"/>
             <a:r>
-              <a:rPr lang="en-US" smtClean="0"/>
+              <a:rPr lang="en-US"/>
               <a:t>Fifth level</a:t>
             </a:r>
             <a:endParaRPr lang="en-US" dirty="0"/>
@@ -4262,7 +4262,7 @@
           <a:p>
             <a:pPr lvl="0"/>
             <a:r>
-              <a:rPr lang="en-US" smtClean="0"/>
+              <a:rPr lang="en-US"/>
               <a:t>Click to edit Master text styles</a:t>
             </a:r>
           </a:p>
@@ -4285,7 +4285,7 @@
           <a:p>
             <a:fld id="{42A54C80-263E-416B-A8E0-580EDEADCBDC}" type="datetimeFigureOut">
               <a:rPr lang="en-US" dirty="0"/>
-              <a:t>7/28/2020</a:t>
+              <a:t>7/29/2020</a:t>
             </a:fld>
             <a:endParaRPr lang="en-US" dirty="0"/>
           </a:p>
@@ -4385,7 +4385,7 @@
           </a:lstStyle>
           <a:p>
             <a:r>
-              <a:rPr lang="en-US" smtClean="0"/>
+              <a:rPr lang="en-US"/>
               <a:t>Click to edit Master title style</a:t>
             </a:r>
             <a:endParaRPr lang="en-US" dirty="0"/>
@@ -4452,7 +4452,7 @@
           </a:lstStyle>
           <a:p>
             <a:r>
-              <a:rPr lang="en-US" smtClean="0"/>
+              <a:rPr lang="en-US"/>
               <a:t>Click icon to add picture</a:t>
             </a:r>
             <a:endParaRPr lang="en-US" dirty="0"/>
@@ -4520,7 +4520,7 @@
           <a:p>
             <a:pPr lvl="0"/>
             <a:r>
-              <a:rPr lang="en-US" smtClean="0"/>
+              <a:rPr lang="en-US"/>
               <a:t>Click to edit Master text styles</a:t>
             </a:r>
           </a:p>
@@ -4587,7 +4587,7 @@
             <a:fld id="{B61BEF0D-F0BB-DE4B-95CE-6DB70DBA9567}" type="datetimeFigureOut">
               <a:rPr lang="en-US" dirty="0"/>
               <a:pPr/>
-              <a:t>7/28/2020</a:t>
+              <a:t>7/29/2020</a:t>
             </a:fld>
             <a:endParaRPr lang="en-US" dirty="0"/>
           </a:p>
@@ -5180,7 +5180,7 @@
           <a:lstStyle/>
           <a:p>
             <a:r>
-              <a:rPr lang="en-US" smtClean="0"/>
+              <a:rPr lang="en-US"/>
               <a:t>Click to edit Master title style</a:t>
             </a:r>
             <a:endParaRPr lang="en-US" dirty="0"/>
@@ -5214,35 +5214,35 @@
           <a:p>
             <a:pPr lvl="0"/>
             <a:r>
-              <a:rPr lang="en-US" smtClean="0"/>
+              <a:rPr lang="en-US"/>
               <a:t>Click to edit Master text styles</a:t>
             </a:r>
           </a:p>
           <a:p>
             <a:pPr lvl="1"/>
             <a:r>
-              <a:rPr lang="en-US" smtClean="0"/>
+              <a:rPr lang="en-US"/>
               <a:t>Second level</a:t>
             </a:r>
           </a:p>
           <a:p>
             <a:pPr lvl="2"/>
             <a:r>
-              <a:rPr lang="en-US" smtClean="0"/>
+              <a:rPr lang="en-US"/>
               <a:t>Third level</a:t>
             </a:r>
           </a:p>
           <a:p>
             <a:pPr lvl="3"/>
             <a:r>
-              <a:rPr lang="en-US" smtClean="0"/>
+              <a:rPr lang="en-US"/>
               <a:t>Fourth level</a:t>
             </a:r>
           </a:p>
           <a:p>
             <a:pPr lvl="4"/>
             <a:r>
-              <a:rPr lang="en-US" smtClean="0"/>
+              <a:rPr lang="en-US"/>
               <a:t>Fifth level</a:t>
             </a:r>
             <a:endParaRPr lang="en-US" dirty="0"/>
@@ -5285,7 +5285,7 @@
             <a:fld id="{B61BEF0D-F0BB-DE4B-95CE-6DB70DBA9567}" type="datetimeFigureOut">
               <a:rPr lang="en-US" dirty="0"/>
               <a:pPr/>
-              <a:t>7/28/2020</a:t>
+              <a:t>7/29/2020</a:t>
             </a:fld>
             <a:endParaRPr lang="en-US" dirty="0"/>
           </a:p>
@@ -5821,10 +5821,9 @@
           <a:lstStyle/>
           <a:p>
             <a:r>
-              <a:rPr lang="en-US" dirty="0" smtClean="0"/>
+              <a:rPr lang="en-US" dirty="0"/>
               <a:t>Test Framework</a:t>
             </a:r>
-            <a:endParaRPr lang="en-US" dirty="0"/>
           </a:p>
         </p:txBody>
       </p:sp>
@@ -5851,7 +5850,7 @@
           <a:lstStyle/>
           <a:p>
             <a:r>
-              <a:rPr lang="en-US" dirty="0" smtClean="0"/>
+              <a:rPr lang="en-US" dirty="0"/>
               <a:t>Requirements</a:t>
             </a:r>
           </a:p>
@@ -5860,16 +5859,16 @@
           </a:p>
           <a:p>
             <a:r>
-              <a:rPr lang="en-US" sz="1200" dirty="0" smtClean="0"/>
+              <a:rPr lang="en-US" sz="1200" dirty="0"/>
               <a:t>A Web Based System to Support Testing Multiple Program Modules</a:t>
             </a:r>
           </a:p>
           <a:p>
-            <a:endParaRPr lang="en-US" sz="1200" dirty="0" smtClean="0"/>
-          </a:p>
-          <a:p>
-            <a:r>
-              <a:rPr lang="en-US" sz="1200" dirty="0" smtClean="0">
+            <a:endParaRPr lang="en-US" sz="1200" dirty="0"/>
+          </a:p>
+          <a:p>
+            <a:r>
+              <a:rPr lang="en-US" sz="1200" dirty="0">
                 <a:solidFill>
                   <a:srgbClr val="92D050"/>
                 </a:solidFill>
@@ -5877,7 +5876,7 @@
               <a:t>David Howick, Miriam Farrington, </a:t>
             </a:r>
             <a:r>
-              <a:rPr lang="en-US" sz="1200" dirty="0" err="1" smtClean="0">
+              <a:rPr lang="en-US" sz="1200" dirty="0" err="1">
                 <a:solidFill>
                   <a:srgbClr val="92D050"/>
                 </a:solidFill>
@@ -5885,7 +5884,7 @@
               <a:t>Mudit</a:t>
             </a:r>
             <a:r>
-              <a:rPr lang="en-US" sz="1200" dirty="0" smtClean="0">
+              <a:rPr lang="en-US" sz="1200" dirty="0">
                 <a:solidFill>
                   <a:srgbClr val="92D050"/>
                 </a:solidFill>
@@ -5893,7 +5892,7 @@
               <a:t> Vats, </a:t>
             </a:r>
             <a:r>
-              <a:rPr lang="en-US" sz="1200" dirty="0" err="1" smtClean="0">
+              <a:rPr lang="en-US" sz="1200" dirty="0" err="1">
                 <a:solidFill>
                   <a:srgbClr val="92D050"/>
                 </a:solidFill>
@@ -5901,7 +5900,7 @@
               <a:t>Elona</a:t>
             </a:r>
             <a:r>
-              <a:rPr lang="en-US" sz="1200" dirty="0" smtClean="0">
+              <a:rPr lang="en-US" sz="1200" dirty="0">
                 <a:solidFill>
                   <a:srgbClr val="92D050"/>
                 </a:solidFill>
@@ -5909,7 +5908,7 @@
               <a:t> </a:t>
             </a:r>
             <a:r>
-              <a:rPr lang="en-US" sz="1200" dirty="0" err="1" smtClean="0">
+              <a:rPr lang="en-US" sz="1200" dirty="0" err="1">
                 <a:solidFill>
                   <a:srgbClr val="92D050"/>
                 </a:solidFill>
@@ -5917,7 +5916,7 @@
               <a:t>Vabishchevich</a:t>
             </a:r>
             <a:r>
-              <a:rPr lang="en-US" sz="1200" dirty="0" smtClean="0">
+              <a:rPr lang="en-US" sz="1200" dirty="0">
                 <a:solidFill>
                   <a:srgbClr val="92D050"/>
                 </a:solidFill>
@@ -5925,7 +5924,7 @@
               <a:t>, Jeffrey </a:t>
             </a:r>
             <a:r>
-              <a:rPr lang="en-US" sz="1200" dirty="0" err="1" smtClean="0">
+              <a:rPr lang="en-US" sz="1200" dirty="0" err="1">
                 <a:solidFill>
                   <a:srgbClr val="92D050"/>
                 </a:solidFill>
@@ -5950,13 +5949,6 @@
   <p:clrMapOvr>
     <a:masterClrMapping/>
   </p:clrMapOvr>
-  <p:timing>
-    <p:tnLst>
-      <p:par>
-        <p:cTn id="1" dur="indefinite" restart="never" nodeType="tmRoot"/>
-      </p:par>
-    </p:tnLst>
-  </p:timing>
 </p:sld>
 </file>
 
@@ -5993,10 +5985,9 @@
           <a:lstStyle/>
           <a:p>
             <a:r>
-              <a:rPr lang="en-US" dirty="0" smtClean="0"/>
+              <a:rPr lang="en-US" dirty="0"/>
               <a:t>System Requirements</a:t>
             </a:r>
-            <a:endParaRPr lang="en-US" dirty="0"/>
           </a:p>
         </p:txBody>
       </p:sp>
@@ -6024,64 +6015,20 @@
           <a:p>
             <a:r>
               <a:rPr lang="en-US" dirty="0"/>
-              <a:t>2.7	The system shall have a test environment to allow other users to test changes and impact before </a:t>
-            </a:r>
-            <a:r>
-              <a:rPr lang="en-US" dirty="0" smtClean="0"/>
-              <a:t>committing </a:t>
-            </a:r>
-            <a:r>
-              <a:rPr lang="en-US" dirty="0"/>
-              <a:t>them to production.  </a:t>
+              <a:t>2.7	The system shall have a test environment to allow other users to test changes and impact before committing them to production.  </a:t>
             </a:r>
           </a:p>
           <a:p>
             <a:pPr lvl="1"/>
             <a:r>
-              <a:rPr lang="en-US" dirty="0" smtClean="0"/>
-              <a:t>2.7.1</a:t>
-            </a:r>
-            <a:r>
-              <a:rPr lang="en-US" dirty="0"/>
-              <a:t>	The test environment shall be implemented in multiple zones and multiple </a:t>
-            </a:r>
-            <a:r>
-              <a:rPr lang="en-US" dirty="0" smtClean="0"/>
-              <a:t>regions </a:t>
-            </a:r>
-            <a:r>
-              <a:rPr lang="en-US" dirty="0"/>
-              <a:t>to enable testing of </a:t>
-            </a:r>
-            <a:r>
-              <a:rPr lang="en-US" dirty="0" smtClean="0"/>
-              <a:t>HA/DR </a:t>
-            </a:r>
-            <a:r>
-              <a:rPr lang="en-US" dirty="0"/>
-              <a:t>requirements rather than taking production </a:t>
-            </a:r>
-            <a:r>
-              <a:rPr lang="en-US" dirty="0" smtClean="0"/>
-              <a:t>down</a:t>
-            </a:r>
-            <a:r>
-              <a:rPr lang="en-US" dirty="0"/>
-              <a:t>.</a:t>
-            </a:r>
-          </a:p>
-          <a:p>
-            <a:r>
-              <a:rPr lang="en-US" dirty="0"/>
-              <a:t>2.8	The system shall have a production environment that is used by multiple users implemented </a:t>
-            </a:r>
-            <a:r>
-              <a:rPr lang="en-US" dirty="0" smtClean="0"/>
-              <a:t>in multiple </a:t>
-            </a:r>
-            <a:r>
-              <a:rPr lang="en-US" dirty="0"/>
-              <a:t>regions and multiple availability zones.</a:t>
+              <a:rPr lang="en-US" dirty="0"/>
+              <a:t>2.7.1	The test environment shall be implemented in multiple zones and multiple regions to enable testing of HA/DR requirements rather than taking production down.</a:t>
+            </a:r>
+          </a:p>
+          <a:p>
+            <a:r>
+              <a:rPr lang="en-US" dirty="0"/>
+              <a:t>2.8	The system shall have a production environment that is used by multiple users implemented in multiple regions and multiple availability zones.</a:t>
             </a:r>
           </a:p>
           <a:p>
@@ -6093,12 +6040,8 @@
           <a:p>
             <a:pPr lvl="1"/>
             <a:r>
-              <a:rPr lang="en-US" dirty="0" smtClean="0"/>
-              <a:t>2.9.1</a:t>
-            </a:r>
-            <a:r>
-              <a:rPr lang="en-US" dirty="0"/>
-              <a:t>	The system shall allow specification of the thread pool size.</a:t>
+              <a:rPr lang="en-US" dirty="0"/>
+              <a:t>2.9.1	The system shall allow specification of the thread pool size.</a:t>
             </a:r>
           </a:p>
           <a:p>
@@ -6118,15 +6061,7 @@
           <a:p>
             <a:r>
               <a:rPr lang="en-US" dirty="0"/>
-              <a:t>2.10	The system shall allow the ability to create additional environments for specialized testing upon </a:t>
-            </a:r>
-            <a:r>
-              <a:rPr lang="en-US" dirty="0" smtClean="0"/>
-              <a:t>demand</a:t>
-            </a:r>
-            <a:r>
-              <a:rPr lang="en-US" dirty="0"/>
-              <a:t>.</a:t>
+              <a:t>2.10	The system shall allow the ability to create additional environments for specialized testing upon demand.</a:t>
             </a:r>
           </a:p>
           <a:p>
@@ -6162,13 +6097,6 @@
   <p:clrMapOvr>
     <a:masterClrMapping/>
   </p:clrMapOvr>
-  <p:timing>
-    <p:tnLst>
-      <p:par>
-        <p:cTn id="1" dur="indefinite" restart="never" nodeType="tmRoot"/>
-      </p:par>
-    </p:tnLst>
-  </p:timing>
 </p:sld>
 </file>
 
@@ -6205,10 +6133,9 @@
           <a:lstStyle/>
           <a:p>
             <a:r>
-              <a:rPr lang="en-US" dirty="0" smtClean="0"/>
+              <a:rPr lang="en-US" dirty="0"/>
               <a:t>User Requirements</a:t>
             </a:r>
-            <a:endParaRPr lang="en-US" dirty="0"/>
           </a:p>
         </p:txBody>
       </p:sp>
@@ -6236,13 +6163,8 @@
           <a:p>
             <a:r>
               <a:rPr lang="en-US" b="1" dirty="0"/>
-              <a:t>4.1 	User Requirement </a:t>
-            </a:r>
-            <a:r>
-              <a:rPr lang="en-US" b="1" dirty="0" smtClean="0"/>
-              <a:t>1: Unit Test Execution</a:t>
-            </a:r>
-            <a:endParaRPr lang="en-US" b="1" dirty="0"/>
+              <a:t>4.1 	User Requirement 1: Unit Test Execution</a:t>
+            </a:r>
           </a:p>
           <a:p>
             <a:r>
@@ -6253,13 +6175,8 @@
           <a:p>
             <a:r>
               <a:rPr lang="en-US" b="1" dirty="0"/>
-              <a:t>4.2 	User Requirement </a:t>
-            </a:r>
-            <a:r>
-              <a:rPr lang="en-US" b="1" dirty="0" smtClean="0"/>
-              <a:t>2: Logging and Results Viewing</a:t>
-            </a:r>
-            <a:endParaRPr lang="en-US" b="1" dirty="0"/>
+              <a:t>4.2 	User Requirement 2: Logging and Results Viewing</a:t>
+            </a:r>
           </a:p>
           <a:p>
             <a:r>
@@ -6270,13 +6187,8 @@
           <a:p>
             <a:r>
               <a:rPr lang="en-US" b="1" dirty="0"/>
-              <a:t>4.3 	User Requirement </a:t>
-            </a:r>
-            <a:r>
-              <a:rPr lang="en-US" b="1" dirty="0" smtClean="0"/>
-              <a:t>3: Concurrent Test Execution</a:t>
-            </a:r>
-            <a:endParaRPr lang="en-US" b="1" dirty="0"/>
+              <a:t>4.3 	User Requirement 3: Concurrent Test Execution</a:t>
+            </a:r>
           </a:p>
           <a:p>
             <a:r>
@@ -6299,13 +6211,6 @@
   <p:clrMapOvr>
     <a:masterClrMapping/>
   </p:clrMapOvr>
-  <p:timing>
-    <p:tnLst>
-      <p:par>
-        <p:cTn id="1" dur="indefinite" restart="never" nodeType="tmRoot"/>
-      </p:par>
-    </p:tnLst>
-  </p:timing>
 </p:sld>
 </file>
 
@@ -6342,10 +6247,9 @@
           <a:lstStyle/>
           <a:p>
             <a:r>
-              <a:rPr lang="en-US" dirty="0" smtClean="0"/>
+              <a:rPr lang="en-US" dirty="0"/>
               <a:t>Availability and Business Continuity</a:t>
             </a:r>
-            <a:endParaRPr lang="en-US" dirty="0"/>
           </a:p>
         </p:txBody>
       </p:sp>
@@ -6368,96 +6272,37 @@
           <a:p>
             <a:r>
               <a:rPr lang="en-US" b="1" dirty="0"/>
-              <a:t>3.1 	Availability Requirement </a:t>
-            </a:r>
-            <a:r>
-              <a:rPr lang="en-US" b="1" dirty="0" smtClean="0"/>
-              <a:t>1: Continuous System Uptime</a:t>
-            </a:r>
-            <a:endParaRPr lang="en-US" b="1" dirty="0"/>
-          </a:p>
-          <a:p>
-            <a:r>
-              <a:rPr lang="en-US" dirty="0" smtClean="0"/>
-              <a:t>The </a:t>
-            </a:r>
-            <a:r>
-              <a:rPr lang="en-US" dirty="0"/>
-              <a:t>system shall support 24/7 availability. Routine downtime in a particular region necessary for </a:t>
-            </a:r>
-            <a:r>
-              <a:rPr lang="en-US" dirty="0" smtClean="0"/>
-              <a:t>maintenance </a:t>
-            </a:r>
-            <a:r>
-              <a:rPr lang="en-US" dirty="0"/>
-              <a:t>or enhancement to the system shall take place after 21:00 EST on Saturday </a:t>
-            </a:r>
-            <a:r>
-              <a:rPr lang="en-US" dirty="0" smtClean="0"/>
-              <a:t>and </a:t>
-            </a:r>
-            <a:r>
-              <a:rPr lang="en-US" dirty="0"/>
-              <a:t>shall end before 23:00 EST on Sunday. </a:t>
+              <a:t>3.1 	Availability Requirement 1: Continuous System Uptime</a:t>
+            </a:r>
+          </a:p>
+          <a:p>
+            <a:r>
+              <a:rPr lang="en-US" dirty="0"/>
+              <a:t>The system shall support 24/7 availability. Routine downtime in a particular region necessary for maintenance or enhancement to the system shall take place after 21:00 EST on Saturday and shall end before 23:00 EST on Sunday. </a:t>
             </a:r>
           </a:p>
           <a:p>
             <a:r>
               <a:rPr lang="en-US" b="1" dirty="0"/>
-              <a:t>3.2 	Availability Requirement </a:t>
-            </a:r>
-            <a:r>
-              <a:rPr lang="en-US" b="1" dirty="0" smtClean="0"/>
-              <a:t>2: Recovery Time</a:t>
-            </a:r>
-            <a:endParaRPr lang="en-US" b="1" dirty="0"/>
-          </a:p>
-          <a:p>
-            <a:r>
-              <a:rPr lang="en-US" dirty="0" smtClean="0"/>
-              <a:t>The </a:t>
-            </a:r>
-            <a:r>
-              <a:rPr lang="en-US" dirty="0"/>
-              <a:t>system shall be able to quickly recover from outages due to unforeseen circumstances while </a:t>
-            </a:r>
-            <a:r>
-              <a:rPr lang="en-US" dirty="0" smtClean="0"/>
-              <a:t>minimizing </a:t>
-            </a:r>
-            <a:r>
-              <a:rPr lang="en-US" dirty="0"/>
-              <a:t>downtime. The system shall support the ability to create and issue automated alerts 	when downtime is encountered for any of the reasons stated below.</a:t>
+              <a:t>3.2 	Availability Requirement 2: Recovery Time</a:t>
+            </a:r>
+          </a:p>
+          <a:p>
+            <a:r>
+              <a:rPr lang="en-US" dirty="0"/>
+              <a:t>The system shall be able to quickly recover from outages due to unforeseen circumstances while minimizing downtime. The system shall support the ability to create and issue automated alerts 	when downtime is encountered for any of the reasons stated below.</a:t>
             </a:r>
           </a:p>
           <a:p>
             <a:r>
               <a:rPr lang="en-US" b="1" dirty="0"/>
-              <a:t>3.3 	Availability Requirement </a:t>
-            </a:r>
-            <a:r>
-              <a:rPr lang="en-US" b="1" dirty="0" smtClean="0"/>
-              <a:t>3: High Availability</a:t>
-            </a:r>
-            <a:endParaRPr lang="en-US" b="1" dirty="0"/>
-          </a:p>
-          <a:p>
-            <a:r>
-              <a:rPr lang="en-US" dirty="0" smtClean="0"/>
-              <a:t>The </a:t>
-            </a:r>
-            <a:r>
-              <a:rPr lang="en-US" dirty="0"/>
-              <a:t>system shall support high availability by being quickly accessible to users attempting to </a:t>
-            </a:r>
-            <a:r>
-              <a:rPr lang="en-US" dirty="0" smtClean="0"/>
-              <a:t>access </a:t>
-            </a:r>
-            <a:r>
-              <a:rPr lang="en-US" dirty="0"/>
-              <a:t>it from any geographic region. </a:t>
+              <a:t>3.3 	Availability Requirement 3: High Availability</a:t>
+            </a:r>
+          </a:p>
+          <a:p>
+            <a:r>
+              <a:rPr lang="en-US" dirty="0"/>
+              <a:t>The system shall support high availability by being quickly accessible to users attempting to access it from any geographic region. </a:t>
             </a:r>
           </a:p>
           <a:p>
@@ -6475,13 +6320,6 @@
   <p:clrMapOvr>
     <a:masterClrMapping/>
   </p:clrMapOvr>
-  <p:timing>
-    <p:tnLst>
-      <p:par>
-        <p:cTn id="1" dur="indefinite" restart="never" nodeType="tmRoot"/>
-      </p:par>
-    </p:tnLst>
-  </p:timing>
 </p:sld>
 </file>
 
@@ -6518,10 +6356,9 @@
           <a:lstStyle/>
           <a:p>
             <a:r>
-              <a:rPr lang="en-US" dirty="0" smtClean="0"/>
+              <a:rPr lang="en-US" dirty="0"/>
               <a:t>Technical Constraints</a:t>
             </a:r>
-            <a:endParaRPr lang="en-US" dirty="0"/>
           </a:p>
         </p:txBody>
       </p:sp>
@@ -6554,13 +6391,8 @@
           <a:p>
             <a:r>
               <a:rPr lang="en-US" dirty="0"/>
-              <a:t>5.1.3    The system shall have at least 75% unit test coverage of the source code</a:t>
-            </a:r>
-            <a:r>
-              <a:rPr lang="en-US" dirty="0" smtClean="0"/>
-              <a:t>. </a:t>
-            </a:r>
-            <a:endParaRPr lang="en-US" dirty="0"/>
+              <a:t>5.1.3    The system shall have at least 75% unit test coverage of the source code. </a:t>
+            </a:r>
           </a:p>
         </p:txBody>
       </p:sp>
@@ -6574,13 +6406,6 @@
   <p:clrMapOvr>
     <a:masterClrMapping/>
   </p:clrMapOvr>
-  <p:timing>
-    <p:tnLst>
-      <p:par>
-        <p:cTn id="1" dur="indefinite" restart="never" nodeType="tmRoot"/>
-      </p:par>
-    </p:tnLst>
-  </p:timing>
 </p:sld>
 </file>
 
@@ -6617,10 +6442,9 @@
           <a:lstStyle/>
           <a:p>
             <a:r>
-              <a:rPr lang="en-US" dirty="0" smtClean="0"/>
+              <a:rPr lang="en-US" dirty="0"/>
               <a:t>Operational Constraints</a:t>
             </a:r>
-            <a:endParaRPr lang="en-US" dirty="0"/>
           </a:p>
         </p:txBody>
       </p:sp>
@@ -6647,22 +6471,14 @@
           <a:lstStyle/>
           <a:p>
             <a:r>
-              <a:rPr lang="en-US" dirty="0" smtClean="0"/>
-              <a:t>5.2.1     </a:t>
-            </a:r>
-            <a:r>
-              <a:rPr lang="en-US" dirty="0"/>
-              <a:t>Granting access to a new user of the system shall take no more than 1 business day to complete.</a:t>
-            </a:r>
-          </a:p>
-          <a:p>
-            <a:r>
-              <a:rPr lang="en-US" dirty="0" smtClean="0"/>
-              <a:t>5.2.2     </a:t>
-            </a:r>
-            <a:r>
-              <a:rPr lang="en-US" dirty="0"/>
-              <a:t>Modifying or removing a user’s access to the system shall take no more than 1 business day to complete. </a:t>
+              <a:rPr lang="en-US" dirty="0"/>
+              <a:t>5.2.1     Granting access to a new user of the system shall take no more than 1 business day to complete.</a:t>
+            </a:r>
+          </a:p>
+          <a:p>
+            <a:r>
+              <a:rPr lang="en-US" dirty="0"/>
+              <a:t>5.2.2     Modifying or removing a user’s access to the system shall take no more than 1 business day to complete. </a:t>
             </a:r>
           </a:p>
           <a:p>
@@ -6680,13 +6496,6 @@
   <p:clrMapOvr>
     <a:masterClrMapping/>
   </p:clrMapOvr>
-  <p:timing>
-    <p:tnLst>
-      <p:par>
-        <p:cTn id="1" dur="indefinite" restart="never" nodeType="tmRoot"/>
-      </p:par>
-    </p:tnLst>
-  </p:timing>
 </p:sld>
 </file>
 
@@ -6723,10 +6532,9 @@
           <a:lstStyle/>
           <a:p>
             <a:r>
-              <a:rPr lang="en-US" dirty="0" smtClean="0"/>
+              <a:rPr lang="en-US" dirty="0"/>
               <a:t>Business Constraints</a:t>
             </a:r>
-            <a:endParaRPr lang="en-US" dirty="0"/>
           </a:p>
         </p:txBody>
       </p:sp>
@@ -6753,15 +6561,7 @@
           <a:p>
             <a:r>
               <a:rPr lang="en-US" dirty="0"/>
-              <a:t>5.3.2 </a:t>
-            </a:r>
-            <a:r>
-              <a:rPr lang="en-US" dirty="0" smtClean="0"/>
-              <a:t>User </a:t>
-            </a:r>
-            <a:r>
-              <a:rPr lang="en-US" dirty="0"/>
-              <a:t>training shall take no more than 1 business day to complete, regardless of the user’s role. </a:t>
+              <a:t>5.3.2 User training shall take no more than 1 business day to complete, regardless of the user’s role. </a:t>
             </a:r>
           </a:p>
           <a:p>
@@ -6779,13 +6579,6 @@
   <p:clrMapOvr>
     <a:masterClrMapping/>
   </p:clrMapOvr>
-  <p:timing>
-    <p:tnLst>
-      <p:par>
-        <p:cTn id="1" dur="indefinite" restart="never" nodeType="tmRoot"/>
-      </p:par>
-    </p:tnLst>
-  </p:timing>
 </p:sld>
 </file>
 
@@ -6822,10 +6615,9 @@
           <a:lstStyle/>
           <a:p>
             <a:r>
-              <a:rPr lang="en-US" dirty="0" smtClean="0"/>
+              <a:rPr lang="en-US" dirty="0"/>
               <a:t>System Models: Use Case</a:t>
             </a:r>
-            <a:endParaRPr lang="en-US" dirty="0"/>
           </a:p>
         </p:txBody>
       </p:sp>
@@ -6858,13 +6650,6 @@
   <p:clrMapOvr>
     <a:masterClrMapping/>
   </p:clrMapOvr>
-  <p:timing>
-    <p:tnLst>
-      <p:par>
-        <p:cTn id="1" dur="indefinite" restart="never" nodeType="tmRoot"/>
-      </p:par>
-    </p:tnLst>
-  </p:timing>
 </p:sld>
 </file>
 
@@ -6901,10 +6686,9 @@
           <a:lstStyle/>
           <a:p>
             <a:r>
-              <a:rPr lang="en-US" dirty="0" smtClean="0"/>
+              <a:rPr lang="en-US" dirty="0"/>
               <a:t>System Models: Sequence Diagram</a:t>
             </a:r>
-            <a:endParaRPr lang="en-US" dirty="0"/>
           </a:p>
         </p:txBody>
       </p:sp>
@@ -6937,13 +6721,6 @@
   <p:clrMapOvr>
     <a:masterClrMapping/>
   </p:clrMapOvr>
-  <p:timing>
-    <p:tnLst>
-      <p:par>
-        <p:cTn id="1" dur="indefinite" restart="never" nodeType="tmRoot"/>
-      </p:par>
-    </p:tnLst>
-  </p:timing>
 </p:sld>
 </file>
 
@@ -6980,10 +6757,9 @@
           <a:lstStyle/>
           <a:p>
             <a:r>
-              <a:rPr lang="en-US" dirty="0" smtClean="0"/>
+              <a:rPr lang="en-US" dirty="0"/>
               <a:t>System Models: Class Diagram</a:t>
             </a:r>
-            <a:endParaRPr lang="en-US" dirty="0"/>
           </a:p>
         </p:txBody>
       </p:sp>
@@ -7016,13 +6792,6 @@
   <p:clrMapOvr>
     <a:masterClrMapping/>
   </p:clrMapOvr>
-  <p:timing>
-    <p:tnLst>
-      <p:par>
-        <p:cTn id="1" dur="indefinite" restart="never" nodeType="tmRoot"/>
-      </p:par>
-    </p:tnLst>
-  </p:timing>
 </p:sld>
 </file>
 
@@ -7059,10 +6828,9 @@
           <a:lstStyle/>
           <a:p>
             <a:r>
-              <a:rPr lang="en-US" dirty="0" smtClean="0"/>
+              <a:rPr lang="en-US" dirty="0"/>
               <a:t>Thank You</a:t>
             </a:r>
-            <a:endParaRPr lang="en-US" dirty="0"/>
           </a:p>
         </p:txBody>
       </p:sp>
@@ -7082,10 +6850,9 @@
           <a:lstStyle/>
           <a:p>
             <a:r>
-              <a:rPr lang="en-US" dirty="0" smtClean="0"/>
+              <a:rPr lang="en-US" dirty="0"/>
               <a:t>Questions?</a:t>
             </a:r>
-            <a:endParaRPr lang="en-US" dirty="0"/>
           </a:p>
         </p:txBody>
       </p:sp>
@@ -7099,13 +6866,6 @@
   <p:clrMapOvr>
     <a:masterClrMapping/>
   </p:clrMapOvr>
-  <p:timing>
-    <p:tnLst>
-      <p:par>
-        <p:cTn id="1" dur="indefinite" restart="never" nodeType="tmRoot"/>
-      </p:par>
-    </p:tnLst>
-  </p:timing>
 </p:sld>
 </file>
 
@@ -7142,10 +6902,9 @@
           <a:lstStyle/>
           <a:p>
             <a:r>
-              <a:rPr lang="en-US" dirty="0" smtClean="0"/>
+              <a:rPr lang="en-US" dirty="0"/>
               <a:t>Preface</a:t>
             </a:r>
-            <a:endParaRPr lang="en-US" dirty="0"/>
           </a:p>
         </p:txBody>
       </p:sp>
@@ -7172,40 +6931,39 @@
           <a:lstStyle/>
           <a:p>
             <a:r>
-              <a:rPr lang="en-US" dirty="0" smtClean="0"/>
+              <a:rPr lang="en-US" dirty="0"/>
               <a:t>Developing large scale software with complex features, interactions, or complex system interfaces (APIs) is best built and tested incrementally.</a:t>
             </a:r>
           </a:p>
           <a:p>
             <a:r>
-              <a:rPr lang="en-US" dirty="0" smtClean="0"/>
+              <a:rPr lang="en-US" dirty="0"/>
               <a:t>Build a basic core, with a small number of packages, then add features one-at-a-time with new packages or new program code to existing packages.  </a:t>
             </a:r>
           </a:p>
           <a:p>
             <a:r>
-              <a:rPr lang="en-US" dirty="0" smtClean="0"/>
+              <a:rPr lang="en-US" dirty="0"/>
               <a:t>Each time new functionality is added, the application is built and tested.</a:t>
             </a:r>
           </a:p>
           <a:p>
             <a:r>
-              <a:rPr lang="en-US" dirty="0" smtClean="0"/>
+              <a:rPr lang="en-US" dirty="0"/>
               <a:t>The Test Framework Application will allow the development team(s), and other users of the system to define tests which run with exception handling and results logging.</a:t>
             </a:r>
           </a:p>
           <a:p>
             <a:r>
-              <a:rPr lang="en-US" dirty="0" smtClean="0"/>
+              <a:rPr lang="en-US" dirty="0"/>
               <a:t>Goal of the Test Framework is to allow program testing with out proliferating code with many try-catch blocks, debug statements, assertions, or verbose logging.</a:t>
             </a:r>
           </a:p>
           <a:p>
             <a:r>
-              <a:rPr lang="en-US" dirty="0" smtClean="0"/>
+              <a:rPr lang="en-US" dirty="0"/>
               <a:t>The Test Framework will be easy to use and accessed by the user’s web browser.  The system itself being cloud hosted in multiple regions so performance is always top notch.</a:t>
             </a:r>
-            <a:endParaRPr lang="en-US" dirty="0"/>
           </a:p>
         </p:txBody>
       </p:sp>
@@ -7219,13 +6977,6 @@
   <p:clrMapOvr>
     <a:masterClrMapping/>
   </p:clrMapOvr>
-  <p:timing>
-    <p:tnLst>
-      <p:par>
-        <p:cTn id="1" dur="indefinite" restart="never" nodeType="tmRoot"/>
-      </p:par>
-    </p:tnLst>
-  </p:timing>
 </p:sld>
 </file>
 
@@ -7262,10 +7013,9 @@
           <a:lstStyle/>
           <a:p>
             <a:r>
-              <a:rPr lang="en-US" dirty="0" smtClean="0"/>
+              <a:rPr lang="en-US" dirty="0"/>
               <a:t>Backup</a:t>
             </a:r>
-            <a:endParaRPr lang="en-US" dirty="0"/>
           </a:p>
         </p:txBody>
       </p:sp>
@@ -7298,13 +7048,6 @@
   <p:clrMapOvr>
     <a:masterClrMapping/>
   </p:clrMapOvr>
-  <p:timing>
-    <p:tnLst>
-      <p:par>
-        <p:cTn id="1" dur="indefinite" restart="never" nodeType="tmRoot"/>
-      </p:par>
-    </p:tnLst>
-  </p:timing>
 </p:sld>
 </file>
 
@@ -7341,10 +7084,9 @@
           <a:lstStyle/>
           <a:p>
             <a:r>
-              <a:rPr lang="en-US" dirty="0" smtClean="0"/>
+              <a:rPr lang="en-US" dirty="0"/>
               <a:t>Availability and Business Continuity</a:t>
             </a:r>
-            <a:endParaRPr lang="en-US" dirty="0"/>
           </a:p>
         </p:txBody>
       </p:sp>
@@ -7378,53 +7120,13 @@
           <a:p>
             <a:r>
               <a:rPr lang="en-US" dirty="0"/>
-              <a:t>	The system shall support 24/7 availability. Routine downtime in a particular region necessary for </a:t>
-            </a:r>
-            <a:r>
-              <a:rPr lang="en-US" dirty="0" smtClean="0"/>
-              <a:t>maintenance </a:t>
-            </a:r>
-            <a:r>
-              <a:rPr lang="en-US" dirty="0"/>
-              <a:t>or enhancement to the system shall take place after 21:00 EST on Saturday </a:t>
-            </a:r>
-            <a:r>
-              <a:rPr lang="en-US" dirty="0" smtClean="0"/>
-              <a:t>and </a:t>
-            </a:r>
-            <a:r>
-              <a:rPr lang="en-US" dirty="0"/>
-              <a:t>shall end before 23:00 EST on Sunday. </a:t>
-            </a:r>
-          </a:p>
-          <a:p>
-            <a:r>
-              <a:rPr lang="en-US" dirty="0"/>
-              <a:t>3.1.1     Any scheduled downtime which takes place outside of the designated hours shall be reported to </a:t>
-            </a:r>
-            <a:r>
-              <a:rPr lang="en-US" dirty="0" smtClean="0"/>
-              <a:t>users </a:t>
-            </a:r>
-            <a:r>
-              <a:rPr lang="en-US" dirty="0"/>
-              <a:t>no less than 48 hours in advance. In the case of emergency system outage, the notice </a:t>
-            </a:r>
-            <a:r>
-              <a:rPr lang="en-US" dirty="0" smtClean="0"/>
-              <a:t>period </a:t>
-            </a:r>
-            <a:r>
-              <a:rPr lang="en-US" dirty="0"/>
-              <a:t>shall be waived but users shall be informed as soon as possible of any unplanned system </a:t>
-            </a:r>
-            <a:r>
-              <a:rPr lang="en-US" dirty="0" smtClean="0"/>
-              <a:t>outages</a:t>
-            </a:r>
-            <a:r>
-              <a:rPr lang="en-US" dirty="0"/>
-              <a:t>.</a:t>
+              <a:t>	The system shall support 24/7 availability. Routine downtime in a particular region necessary for maintenance or enhancement to the system shall take place after 21:00 EST on Saturday and shall end before 23:00 EST on Sunday. </a:t>
+            </a:r>
+          </a:p>
+          <a:p>
+            <a:r>
+              <a:rPr lang="en-US" dirty="0"/>
+              <a:t>3.1.1     Any scheduled downtime which takes place outside of the designated hours shall be reported to users no less than 48 hours in advance. In the case of emergency system outage, the notice period shall be waived but users shall be informed as soon as possible of any unplanned system outages.</a:t>
             </a:r>
           </a:p>
           <a:p>
@@ -7436,97 +7138,25 @@
           <a:p>
             <a:r>
               <a:rPr lang="en-US" dirty="0"/>
-              <a:t>	The system shall be able to quickly recover from outages due to unforeseen circumstances while 	minimizing downtime. The system shall support the ability to create and issue automated alerts </a:t>
-            </a:r>
-            <a:r>
-              <a:rPr lang="en-US" dirty="0" smtClean="0"/>
-              <a:t>when </a:t>
-            </a:r>
-            <a:r>
-              <a:rPr lang="en-US" dirty="0"/>
-              <a:t>downtime is encountered for any of the reasons stated below.</a:t>
-            </a:r>
-          </a:p>
-          <a:p>
-            <a:r>
-              <a:rPr lang="en-US" dirty="0"/>
-              <a:t>3.2.1     In the event of an unplanned outage due to the loss of a particular region or availability zone, </a:t>
-            </a:r>
-            <a:r>
-              <a:rPr lang="en-US" dirty="0" smtClean="0"/>
-              <a:t>the </a:t>
-            </a:r>
-            <a:r>
-              <a:rPr lang="en-US" dirty="0"/>
-              <a:t>system shall immediately fail over to another region or availability zone as determined by </a:t>
-            </a:r>
-            <a:r>
-              <a:rPr lang="en-US" dirty="0" smtClean="0"/>
-              <a:t>the </a:t>
-            </a:r>
-            <a:r>
-              <a:rPr lang="en-US" dirty="0"/>
-              <a:t>cloud provider.</a:t>
-            </a:r>
-          </a:p>
-          <a:p>
-            <a:r>
-              <a:rPr lang="en-US" dirty="0"/>
-              <a:t>3.2.2      In the event of an unplanned outage due to the failure of an instance on which the system is </a:t>
-            </a:r>
-            <a:r>
-              <a:rPr lang="en-US" dirty="0" smtClean="0"/>
-              <a:t>hosted</a:t>
-            </a:r>
-            <a:r>
-              <a:rPr lang="en-US" dirty="0"/>
-              <a:t>, the system shall immediately fail over to a backup instance. In the event a backup </a:t>
-            </a:r>
-            <a:r>
-              <a:rPr lang="en-US" dirty="0" smtClean="0"/>
-              <a:t>instance </a:t>
-            </a:r>
-            <a:r>
-              <a:rPr lang="en-US" dirty="0"/>
-              <a:t>does not exist, the system shall have the ability to immediately spin up a new instance </a:t>
-            </a:r>
-            <a:r>
-              <a:rPr lang="en-US" dirty="0" smtClean="0"/>
-              <a:t>and </a:t>
-            </a:r>
-            <a:r>
-              <a:rPr lang="en-US" dirty="0"/>
-              <a:t>fail over to it using automated deployment.</a:t>
-            </a:r>
-          </a:p>
-          <a:p>
-            <a:r>
-              <a:rPr lang="en-US" dirty="0"/>
-              <a:t>3.2.3.    In the event of an unplanned outage in any or all regions due to a software error, the system </a:t>
-            </a:r>
-            <a:r>
-              <a:rPr lang="en-US" dirty="0" smtClean="0"/>
-              <a:t>shall </a:t>
-            </a:r>
-            <a:r>
-              <a:rPr lang="en-US" dirty="0"/>
-              <a:t>support the ability to quickly identify and create a restore point from the last known </a:t>
-            </a:r>
-            <a:r>
-              <a:rPr lang="en-US" dirty="0" smtClean="0"/>
-              <a:t>working </a:t>
-            </a:r>
-            <a:r>
-              <a:rPr lang="en-US" dirty="0"/>
-              <a:t>backup. This process shall take no more than 1 hour to complete from the time </a:t>
-            </a:r>
-            <a:r>
-              <a:rPr lang="en-US" dirty="0" smtClean="0"/>
-              <a:t>the software </a:t>
-            </a:r>
-            <a:r>
-              <a:rPr lang="en-US" dirty="0"/>
-              <a:t>malfunction is identified.</a:t>
+              <a:t>	The system shall be able to quickly recover from outages due to unforeseen circumstances while 	minimizing downtime. The system shall support the ability to create and issue automated alerts when downtime is encountered for any of the reasons stated below.</a:t>
+            </a:r>
+          </a:p>
+          <a:p>
+            <a:r>
+              <a:rPr lang="en-US" dirty="0"/>
+              <a:t>3.2.1     In the event of an unplanned outage due to the loss of a particular region or availability zone, the system shall immediately fail over to another region or availability zone as determined by the cloud provider.</a:t>
+            </a:r>
+          </a:p>
+          <a:p>
+            <a:r>
+              <a:rPr lang="en-US" dirty="0"/>
+              <a:t>3.2.2      In the event of an unplanned outage due to the failure of an instance on which the system is hosted, the system shall immediately fail over to a backup instance. In the event a backup instance does not exist, the system shall have the ability to immediately spin up a new instance and fail over to it using automated deployment.</a:t>
+            </a:r>
+          </a:p>
+          <a:p>
+            <a:r>
+              <a:rPr lang="en-US" dirty="0"/>
+              <a:t>3.2.3.    In the event of an unplanned outage in any or all regions due to a software error, the system shall support the ability to quickly identify and create a restore point from the last known working backup. This process shall take no more than 1 hour to complete from the time the software malfunction is identified.</a:t>
             </a:r>
           </a:p>
           <a:p>
@@ -7544,13 +7174,6 @@
   <p:clrMapOvr>
     <a:masterClrMapping/>
   </p:clrMapOvr>
-  <p:timing>
-    <p:tnLst>
-      <p:par>
-        <p:cTn id="1" dur="indefinite" restart="never" nodeType="tmRoot"/>
-      </p:par>
-    </p:tnLst>
-  </p:timing>
 </p:sld>
 </file>
 
@@ -7587,10 +7210,9 @@
           <a:lstStyle/>
           <a:p>
             <a:r>
-              <a:rPr lang="en-US" dirty="0" smtClean="0"/>
+              <a:rPr lang="en-US" dirty="0"/>
               <a:t>Availability and Business Continuity</a:t>
             </a:r>
-            <a:endParaRPr lang="en-US" dirty="0"/>
           </a:p>
         </p:txBody>
       </p:sp>
@@ -7661,13 +7283,6 @@
   <p:clrMapOvr>
     <a:masterClrMapping/>
   </p:clrMapOvr>
-  <p:timing>
-    <p:tnLst>
-      <p:par>
-        <p:cTn id="1" dur="indefinite" restart="never" nodeType="tmRoot"/>
-      </p:par>
-    </p:tnLst>
-  </p:timing>
 </p:sld>
 </file>
 
@@ -7704,10 +7319,9 @@
           <a:lstStyle/>
           <a:p>
             <a:r>
-              <a:rPr lang="en-US" dirty="0" smtClean="0"/>
+              <a:rPr lang="en-US" dirty="0"/>
               <a:t>User Requirements</a:t>
             </a:r>
-            <a:endParaRPr lang="en-US" dirty="0"/>
           </a:p>
         </p:txBody>
       </p:sp>
@@ -7806,13 +7420,6 @@
   <p:clrMapOvr>
     <a:masterClrMapping/>
   </p:clrMapOvr>
-  <p:timing>
-    <p:tnLst>
-      <p:par>
-        <p:cTn id="1" dur="indefinite" restart="never" nodeType="tmRoot"/>
-      </p:par>
-    </p:tnLst>
-  </p:timing>
 </p:sld>
 </file>
 
@@ -7849,10 +7456,9 @@
           <a:lstStyle/>
           <a:p>
             <a:r>
-              <a:rPr lang="en-US" dirty="0" smtClean="0"/>
+              <a:rPr lang="en-US" dirty="0"/>
               <a:t>User Requirements</a:t>
             </a:r>
-            <a:endParaRPr lang="en-US" dirty="0"/>
           </a:p>
         </p:txBody>
       </p:sp>
@@ -7890,71 +7496,35 @@
             <a:pPr lvl="1"/>
             <a:r>
               <a:rPr lang="en-US" dirty="0"/>
-              <a:t>4.1.6.1	 </a:t>
-            </a:r>
-            <a:r>
-              <a:rPr lang="en-US" dirty="0" smtClean="0"/>
-              <a:t> Display </a:t>
-            </a:r>
-            <a:r>
-              <a:rPr lang="en-US" dirty="0"/>
-              <a:t>all possible tests and allow the user to select all tests they wish to run.</a:t>
+              <a:t>4.1.6.1	  Display all possible tests and allow the user to select all tests they wish to run.</a:t>
             </a:r>
           </a:p>
           <a:p>
             <a:pPr lvl="1"/>
             <a:r>
               <a:rPr lang="en-US" dirty="0"/>
-              <a:t>4.1.6.2	</a:t>
-            </a:r>
-            <a:r>
-              <a:rPr lang="en-US" dirty="0" smtClean="0"/>
-              <a:t>  Display </a:t>
-            </a:r>
-            <a:r>
-              <a:rPr lang="en-US" dirty="0"/>
-              <a:t>the selected list of all tests to be run (container object on GUI).</a:t>
+              <a:t>4.1.6.2	  Display the selected list of all tests to be run (container object on GUI).</a:t>
             </a:r>
           </a:p>
           <a:p>
             <a:pPr lvl="1"/>
             <a:r>
               <a:rPr lang="en-US" dirty="0"/>
-              <a:t>4.1.6.3	</a:t>
-            </a:r>
-            <a:r>
-              <a:rPr lang="en-US" dirty="0" smtClean="0"/>
-              <a:t>  Show </a:t>
-            </a:r>
-            <a:r>
-              <a:rPr lang="en-US" dirty="0"/>
-              <a:t>test progress and status on the GUI.</a:t>
+              <a:t>4.1.6.3	  Show test progress and status on the GUI.</a:t>
             </a:r>
           </a:p>
           <a:p>
             <a:pPr lvl="1"/>
             <a:r>
               <a:rPr lang="en-US" dirty="0"/>
-              <a:t>4.1.6.4	</a:t>
-            </a:r>
-            <a:r>
-              <a:rPr lang="en-US" dirty="0" smtClean="0"/>
-              <a:t>  Display </a:t>
-            </a:r>
-            <a:r>
-              <a:rPr lang="en-US" dirty="0"/>
-              <a:t>the results of each test in real-time.</a:t>
+              <a:t>4.1.6.4	  Display the results of each test in real-time.</a:t>
             </a:r>
           </a:p>
           <a:p>
             <a:pPr lvl="1"/>
             <a:r>
-              <a:rPr lang="en-US" dirty="0" smtClean="0"/>
-              <a:t>4.1.6.5  Allow </a:t>
-            </a:r>
-            <a:r>
-              <a:rPr lang="en-US" dirty="0"/>
-              <a:t>the user to specify an output file in which to log the test results.</a:t>
+              <a:rPr lang="en-US" dirty="0"/>
+              <a:t>4.1.6.5  Allow the user to specify an output file in which to log the test results.</a:t>
             </a:r>
           </a:p>
           <a:p>
@@ -7974,29 +7544,13 @@
           <a:p>
             <a:r>
               <a:rPr lang="en-US" dirty="0"/>
-              <a:t>	</a:t>
-            </a:r>
-            <a:r>
-              <a:rPr lang="en-US" dirty="0" smtClean="0"/>
-              <a:t>	4.1.7.1 </a:t>
-            </a:r>
-            <a:r>
-              <a:rPr lang="en-US" dirty="0"/>
-              <a:t>Execute tests on available clients.</a:t>
-            </a:r>
-          </a:p>
-          <a:p>
-            <a:r>
-              <a:rPr lang="en-US" dirty="0"/>
-              <a:t>	</a:t>
-            </a:r>
-            <a:r>
-              <a:rPr lang="en-US" dirty="0" smtClean="0"/>
-              <a:t>	4.1.7.2 </a:t>
-            </a:r>
-            <a:r>
-              <a:rPr lang="en-US" dirty="0"/>
-              <a:t>Export current and prior test results for specific clients.</a:t>
+              <a:t>		4.1.7.1 Execute tests on available clients.</a:t>
+            </a:r>
+          </a:p>
+          <a:p>
+            <a:r>
+              <a:rPr lang="en-US" dirty="0"/>
+              <a:t>		4.1.7.2 Export current and prior test results for specific clients.</a:t>
             </a:r>
           </a:p>
           <a:p>
@@ -8020,13 +7574,6 @@
   <p:clrMapOvr>
     <a:masterClrMapping/>
   </p:clrMapOvr>
-  <p:timing>
-    <p:tnLst>
-      <p:par>
-        <p:cTn id="1" dur="indefinite" restart="never" nodeType="tmRoot"/>
-      </p:par>
-    </p:tnLst>
-  </p:timing>
 </p:sld>
 </file>
 
@@ -8063,10 +7610,9 @@
           <a:lstStyle/>
           <a:p>
             <a:r>
-              <a:rPr lang="en-US" dirty="0" smtClean="0"/>
+              <a:rPr lang="en-US" dirty="0"/>
               <a:t>User Requirements</a:t>
             </a:r>
-            <a:endParaRPr lang="en-US" dirty="0"/>
           </a:p>
         </p:txBody>
       </p:sp>
@@ -8166,13 +7712,6 @@
   <p:clrMapOvr>
     <a:masterClrMapping/>
   </p:clrMapOvr>
-  <p:timing>
-    <p:tnLst>
-      <p:par>
-        <p:cTn id="1" dur="indefinite" restart="never" nodeType="tmRoot"/>
-      </p:par>
-    </p:tnLst>
-  </p:timing>
 </p:sld>
 </file>
 
@@ -8209,10 +7748,9 @@
           <a:lstStyle/>
           <a:p>
             <a:r>
-              <a:rPr lang="en-US" dirty="0" smtClean="0"/>
+              <a:rPr lang="en-US" dirty="0"/>
               <a:t>User Requirements</a:t>
             </a:r>
-            <a:endParaRPr lang="en-US" dirty="0"/>
           </a:p>
         </p:txBody>
       </p:sp>
@@ -8269,13 +7807,6 @@
   <p:clrMapOvr>
     <a:masterClrMapping/>
   </p:clrMapOvr>
-  <p:timing>
-    <p:tnLst>
-      <p:par>
-        <p:cTn id="1" dur="indefinite" restart="never" nodeType="tmRoot"/>
-      </p:par>
-    </p:tnLst>
-  </p:timing>
 </p:sld>
 </file>
 
@@ -8312,10 +7843,9 @@
           <a:lstStyle/>
           <a:p>
             <a:r>
-              <a:rPr lang="en-US" dirty="0" smtClean="0"/>
+              <a:rPr lang="en-US" dirty="0"/>
               <a:t>Introduction</a:t>
             </a:r>
-            <a:endParaRPr lang="en-US" dirty="0"/>
           </a:p>
         </p:txBody>
       </p:sp>
@@ -8335,40 +7865,39 @@
           <a:lstStyle/>
           <a:p>
             <a:r>
-              <a:rPr lang="en-US" dirty="0" smtClean="0"/>
+              <a:rPr lang="en-US" dirty="0"/>
               <a:t>Web based, cloud hosted solution.</a:t>
             </a:r>
           </a:p>
           <a:p>
             <a:r>
-              <a:rPr lang="en-US" dirty="0" smtClean="0"/>
+              <a:rPr lang="en-US" dirty="0"/>
               <a:t>Can test multiple program modules or blocks of program code simultaneously.</a:t>
             </a:r>
           </a:p>
           <a:p>
             <a:r>
-              <a:rPr lang="en-US" dirty="0" smtClean="0"/>
+              <a:rPr lang="en-US" dirty="0"/>
               <a:t>Multiple methods of access or delivery (dynamic link library, XML, JSON, etc.).</a:t>
             </a:r>
           </a:p>
           <a:p>
             <a:r>
-              <a:rPr lang="en-US" dirty="0" smtClean="0"/>
+              <a:rPr lang="en-US" dirty="0"/>
               <a:t>Support for Multiple Languages (C++, C#, Java, Python).</a:t>
             </a:r>
           </a:p>
           <a:p>
             <a:r>
-              <a:rPr lang="en-US" dirty="0" smtClean="0"/>
+              <a:rPr lang="en-US" dirty="0"/>
               <a:t>Scalable solution.</a:t>
             </a:r>
           </a:p>
           <a:p>
             <a:r>
-              <a:rPr lang="en-US" dirty="0" smtClean="0"/>
+              <a:rPr lang="en-US" dirty="0"/>
               <a:t>Cloud hosted in multiple regions for best performance, reduction in latency, support high availability and disaster recovery of solution. </a:t>
             </a:r>
-            <a:endParaRPr lang="en-US" dirty="0"/>
           </a:p>
         </p:txBody>
       </p:sp>
@@ -8382,13 +7911,6 @@
   <p:clrMapOvr>
     <a:masterClrMapping/>
   </p:clrMapOvr>
-  <p:timing>
-    <p:tnLst>
-      <p:par>
-        <p:cTn id="1" dur="indefinite" restart="never" nodeType="tmRoot"/>
-      </p:par>
-    </p:tnLst>
-  </p:timing>
 </p:sld>
 </file>
 
@@ -8425,10 +7947,9 @@
           <a:lstStyle/>
           <a:p>
             <a:r>
-              <a:rPr lang="en-US" dirty="0" smtClean="0"/>
+              <a:rPr lang="en-US" dirty="0"/>
               <a:t>System Overview</a:t>
             </a:r>
-            <a:endParaRPr lang="en-US" dirty="0"/>
           </a:p>
         </p:txBody>
       </p:sp>
@@ -8479,11 +8000,7 @@
             <a:pPr lvl="1"/>
             <a:r>
               <a:rPr lang="en-US" dirty="0"/>
-              <a:t>Remote </a:t>
-            </a:r>
-            <a:r>
-              <a:rPr lang="en-US" dirty="0" smtClean="0"/>
-              <a:t>User</a:t>
+              <a:t>Remote User</a:t>
             </a:r>
           </a:p>
           <a:p>
@@ -8495,11 +8012,7 @@
           <a:p>
             <a:r>
               <a:rPr lang="en-US" dirty="0"/>
-              <a:t>Web </a:t>
-            </a:r>
-            <a:r>
-              <a:rPr lang="en-US" dirty="0" smtClean="0"/>
-              <a:t>User Interface</a:t>
+              <a:t>Web User Interface</a:t>
             </a:r>
           </a:p>
           <a:p>
@@ -8524,7 +8037,7 @@
           <a:p>
             <a:pPr lvl="1"/>
             <a:r>
-              <a:rPr lang="en-US" dirty="0" smtClean="0"/>
+              <a:rPr lang="en-US" dirty="0"/>
               <a:t>Database</a:t>
             </a:r>
           </a:p>
@@ -8558,13 +8071,8 @@
             <a:pPr lvl="1"/>
             <a:r>
               <a:rPr lang="en-US" dirty="0"/>
-              <a:t>Desktop </a:t>
-            </a:r>
-            <a:r>
-              <a:rPr lang="en-US" dirty="0" smtClean="0"/>
-              <a:t>User Interface</a:t>
-            </a:r>
-            <a:endParaRPr lang="en-US" dirty="0"/>
+              <a:t>Desktop User Interface</a:t>
+            </a:r>
           </a:p>
           <a:p>
             <a:pPr lvl="1"/>
@@ -8588,13 +8096,6 @@
   <p:clrMapOvr>
     <a:masterClrMapping/>
   </p:clrMapOvr>
-  <p:timing>
-    <p:tnLst>
-      <p:par>
-        <p:cTn id="1" dur="indefinite" restart="never" nodeType="tmRoot"/>
-      </p:par>
-    </p:tnLst>
-  </p:timing>
 </p:sld>
 </file>
 
@@ -8631,45 +8132,40 @@
           <a:lstStyle/>
           <a:p>
             <a:r>
-              <a:rPr lang="en-US" dirty="0" smtClean="0"/>
+              <a:rPr lang="en-US" dirty="0"/>
               <a:t>System Overview</a:t>
             </a:r>
-            <a:endParaRPr lang="en-US" dirty="0"/>
           </a:p>
         </p:txBody>
       </p:sp>
       <p:pic>
         <p:nvPicPr>
-          <p:cNvPr id="4" name="Content Placeholder 3"/>
+          <p:cNvPr id="6" name="Picture 5">
+            <a:extLst>
+              <a:ext uri="{FF2B5EF4-FFF2-40B4-BE49-F238E27FC236}">
+                <a16:creationId xmlns:a16="http://schemas.microsoft.com/office/drawing/2014/main" id="{42F62902-0B99-45F6-8313-405C7CFCB586}"/>
+              </a:ext>
+            </a:extLst>
+          </p:cNvPr>
           <p:cNvPicPr>
-            <a:picLocks noGrp="1"/>
+            <a:picLocks noChangeAspect="1"/>
           </p:cNvPicPr>
-          <p:nvPr>
-            <p:ph idx="1"/>
-          </p:nvPr>
+          <p:nvPr/>
         </p:nvPicPr>
         <p:blipFill>
-          <a:blip r:embed="rId2" cstate="print">
-            <a:extLst>
-              <a:ext uri="{28A0092B-C50C-407E-A947-70E740481C1C}">
-                <a14:useLocalDpi xmlns:a14="http://schemas.microsoft.com/office/drawing/2010/main" val="0"/>
-              </a:ext>
-            </a:extLst>
-          </a:blip>
-          <a:srcRect/>
+          <a:blip r:embed="rId2"/>
           <a:stretch>
             <a:fillRect/>
           </a:stretch>
         </p:blipFill>
-        <p:spPr bwMode="auto">
+        <p:spPr>
           <a:xfrm>
-            <a:off x="765977" y="1656272"/>
-            <a:ext cx="8419381" cy="4718649"/>
+            <a:off x="552741" y="1260615"/>
+            <a:ext cx="9119897" cy="5463745"/>
           </a:xfrm>
           <a:prstGeom prst="rect">
             <a:avLst/>
           </a:prstGeom>
-          <a:noFill/>
         </p:spPr>
       </p:pic>
     </p:spTree>
@@ -8682,13 +8178,6 @@
   <p:clrMapOvr>
     <a:masterClrMapping/>
   </p:clrMapOvr>
-  <p:timing>
-    <p:tnLst>
-      <p:par>
-        <p:cTn id="1" dur="indefinite" restart="never" nodeType="tmRoot"/>
-      </p:par>
-    </p:tnLst>
-  </p:timing>
 </p:sld>
 </file>
 
@@ -8725,10 +8214,9 @@
           <a:lstStyle/>
           <a:p>
             <a:r>
-              <a:rPr lang="en-US" dirty="0" smtClean="0"/>
+              <a:rPr lang="en-US" dirty="0"/>
               <a:t>System Users</a:t>
             </a:r>
-            <a:endParaRPr lang="en-US" dirty="0"/>
           </a:p>
         </p:txBody>
       </p:sp>
@@ -8758,7 +8246,7 @@
               <a:buNone/>
             </a:pPr>
             <a:r>
-              <a:rPr lang="en-US" dirty="0" smtClean="0"/>
+              <a:rPr lang="en-US" dirty="0"/>
               <a:t>There are nine types of users of this system.  They are:</a:t>
             </a:r>
           </a:p>
@@ -8814,19 +8302,14 @@
           <a:p>
             <a:r>
               <a:rPr lang="en-US" dirty="0"/>
-              <a:t>IT Managers (Mostly line level managers</a:t>
-            </a:r>
-            <a:r>
-              <a:rPr lang="en-US" dirty="0" smtClean="0"/>
-              <a:t>).</a:t>
-            </a:r>
-          </a:p>
-          <a:p>
-            <a:r>
-              <a:rPr lang="en-US" dirty="0" smtClean="0"/>
+              <a:t>IT Managers (Mostly line level managers).</a:t>
+            </a:r>
+          </a:p>
+          <a:p>
+            <a:r>
+              <a:rPr lang="en-US" dirty="0"/>
               <a:t>System Administrators.  These users manage and maintain the system, accessibility, and perform system maintenance upgrades. </a:t>
             </a:r>
-            <a:endParaRPr lang="en-US" dirty="0"/>
           </a:p>
         </p:txBody>
       </p:sp>
@@ -8840,13 +8323,6 @@
   <p:clrMapOvr>
     <a:masterClrMapping/>
   </p:clrMapOvr>
-  <p:timing>
-    <p:tnLst>
-      <p:par>
-        <p:cTn id="1" dur="indefinite" restart="never" nodeType="tmRoot"/>
-      </p:par>
-    </p:tnLst>
-  </p:timing>
 </p:sld>
 </file>
 
@@ -8883,10 +8359,9 @@
           <a:lstStyle/>
           <a:p>
             <a:r>
-              <a:rPr lang="en-US" dirty="0" smtClean="0"/>
+              <a:rPr lang="en-US" dirty="0"/>
               <a:t>System Usability</a:t>
             </a:r>
-            <a:endParaRPr lang="en-US" dirty="0"/>
           </a:p>
         </p:txBody>
       </p:sp>
@@ -8973,13 +8448,6 @@
   <p:clrMapOvr>
     <a:masterClrMapping/>
   </p:clrMapOvr>
-  <p:timing>
-    <p:tnLst>
-      <p:par>
-        <p:cTn id="1" dur="indefinite" restart="never" nodeType="tmRoot"/>
-      </p:par>
-    </p:tnLst>
-  </p:timing>
 </p:sld>
 </file>
 
@@ -9016,10 +8484,9 @@
           <a:lstStyle/>
           <a:p>
             <a:r>
-              <a:rPr lang="en-US" dirty="0" smtClean="0"/>
+              <a:rPr lang="en-US" dirty="0"/>
               <a:t>User Roles and Accessibility</a:t>
             </a:r>
-            <a:endParaRPr lang="en-US" dirty="0"/>
           </a:p>
         </p:txBody>
       </p:sp>
@@ -9052,13 +8519,6 @@
   <p:clrMapOvr>
     <a:masterClrMapping/>
   </p:clrMapOvr>
-  <p:timing>
-    <p:tnLst>
-      <p:par>
-        <p:cTn id="1" dur="indefinite" restart="never" nodeType="tmRoot"/>
-      </p:par>
-    </p:tnLst>
-  </p:timing>
 </p:sld>
 </file>
 
@@ -9095,10 +8555,9 @@
           <a:lstStyle/>
           <a:p>
             <a:r>
-              <a:rPr lang="en-US" dirty="0" smtClean="0"/>
+              <a:rPr lang="en-US" dirty="0"/>
               <a:t>System Requirements</a:t>
             </a:r>
-            <a:endParaRPr lang="en-US" dirty="0"/>
           </a:p>
         </p:txBody>
       </p:sp>
@@ -9126,29 +8585,7 @@
           <a:p>
             <a:r>
               <a:rPr lang="en-US" dirty="0"/>
-              <a:t>2.1	The system shall be implemented as a client-server system wherein the </a:t>
-            </a:r>
-            <a:r>
-              <a:rPr lang="en-US" dirty="0" smtClean="0"/>
-              <a:t>Web User Interface (</a:t>
-            </a:r>
-            <a:r>
-              <a:rPr lang="en-US" dirty="0" err="1" smtClean="0"/>
-              <a:t>WebUI</a:t>
-            </a:r>
-            <a:r>
-              <a:rPr lang="en-US" dirty="0" smtClean="0"/>
-              <a:t>) communicates with </a:t>
-            </a:r>
-            <a:r>
-              <a:rPr lang="en-US" dirty="0"/>
-              <a:t>the test engine and test server over the internet.</a:t>
-            </a:r>
-          </a:p>
-          <a:p>
-            <a:r>
-              <a:rPr lang="en-US" dirty="0"/>
-              <a:t>2.2	Client access to the system shall be provided through a </a:t>
+              <a:t>2.1	The system shall be implemented as a client-server system wherein the Web User Interface (</a:t>
             </a:r>
             <a:r>
               <a:rPr lang="en-US" dirty="0" err="1"/>
@@ -9156,49 +8593,13 @@
             </a:r>
             <a:r>
               <a:rPr lang="en-US" dirty="0"/>
-              <a:t> to be accessed via a standard web 	browser.</a:t>
-            </a:r>
-          </a:p>
-          <a:p>
-            <a:pPr lvl="1"/>
-            <a:r>
-              <a:rPr lang="en-US" dirty="0" smtClean="0"/>
-              <a:t>2.2.1</a:t>
-            </a:r>
-            <a:r>
-              <a:rPr lang="en-US" dirty="0"/>
-              <a:t>	The system shall support the Firefox web browser.</a:t>
-            </a:r>
-          </a:p>
-          <a:p>
-            <a:pPr lvl="1"/>
-            <a:r>
-              <a:rPr lang="en-US" dirty="0" smtClean="0"/>
-              <a:t>2.2.2</a:t>
-            </a:r>
-            <a:r>
-              <a:rPr lang="en-US" dirty="0"/>
-              <a:t>	The system should support the Microsoft Edge and Google Chrome web browsers.</a:t>
-            </a:r>
-          </a:p>
-          <a:p>
-            <a:r>
-              <a:rPr lang="en-US" dirty="0"/>
-              <a:t>2.3	The system shall employ a database in which to store all test data, including configuration data, 	test cases, and test results.</a:t>
-            </a:r>
-          </a:p>
-          <a:p>
-            <a:r>
-              <a:rPr lang="en-US" dirty="0"/>
-              <a:t>2.4	The system shall employ a test server, which will provide the business logic and serve as the </a:t>
-            </a:r>
-            <a:r>
-              <a:rPr lang="en-US" dirty="0" smtClean="0"/>
-              <a:t>API between </a:t>
-            </a:r>
-            <a:r>
-              <a:rPr lang="en-US" dirty="0"/>
-              <a:t>the database and the </a:t>
+              <a:t>) communicates with the test engine and test server over the internet.</a:t>
+            </a:r>
+          </a:p>
+          <a:p>
+            <a:r>
+              <a:rPr lang="en-US" dirty="0"/>
+              <a:t>2.2	Client access to the system shall be provided through a </a:t>
             </a:r>
             <a:r>
               <a:rPr lang="en-US" dirty="0" err="1"/>
@@ -9206,35 +8607,53 @@
             </a:r>
             <a:r>
               <a:rPr lang="en-US" dirty="0"/>
+              <a:t> to be accessed via a standard web 	browser.</a:t>
+            </a:r>
+          </a:p>
+          <a:p>
+            <a:pPr lvl="1"/>
+            <a:r>
+              <a:rPr lang="en-US" dirty="0"/>
+              <a:t>2.2.1	The system shall support the Firefox web browser.</a:t>
+            </a:r>
+          </a:p>
+          <a:p>
+            <a:pPr lvl="1"/>
+            <a:r>
+              <a:rPr lang="en-US" dirty="0"/>
+              <a:t>2.2.2	The system should support the Microsoft Edge and Google Chrome web browsers.</a:t>
+            </a:r>
+          </a:p>
+          <a:p>
+            <a:r>
+              <a:rPr lang="en-US" dirty="0"/>
+              <a:t>2.3	The system shall employ a database in which to store all test data, including configuration data, 	test cases, and test results.</a:t>
+            </a:r>
+          </a:p>
+          <a:p>
+            <a:r>
+              <a:rPr lang="en-US" dirty="0"/>
+              <a:t>2.4	The system shall employ a test server, which will provide the business logic and serve as the API between the database and the </a:t>
+            </a:r>
+            <a:r>
+              <a:rPr lang="en-US" dirty="0" err="1"/>
+              <a:t>WebUI</a:t>
+            </a:r>
+            <a:r>
+              <a:rPr lang="en-US" dirty="0"/>
               <a:t>.</a:t>
             </a:r>
           </a:p>
           <a:p>
             <a:r>
               <a:rPr lang="en-US" dirty="0"/>
-              <a:t>2.5	The system shall be hosted on a cloud platform to support ease of resource acquisition and </a:t>
-            </a:r>
-            <a:r>
-              <a:rPr lang="en-US" dirty="0" smtClean="0"/>
-              <a:t>hosting</a:t>
-            </a:r>
-            <a:r>
-              <a:rPr lang="en-US" dirty="0"/>
-              <a:t>, automatic scaling of system resources, built-in network infrastructure, managed services 	where needed.</a:t>
-            </a:r>
-          </a:p>
-          <a:p>
-            <a:r>
-              <a:rPr lang="en-US" dirty="0"/>
-              <a:t>2.6	The system shall have a development environment for use by the software engineering and </a:t>
-            </a:r>
-            <a:r>
-              <a:rPr lang="en-US" dirty="0" smtClean="0"/>
-              <a:t>development </a:t>
-            </a:r>
-            <a:r>
-              <a:rPr lang="en-US" dirty="0"/>
-              <a:t>teams.</a:t>
+              <a:t>2.5	The system shall be hosted on a cloud platform to support ease of resource acquisition and hosting, automatic scaling of system resources, built-in network infrastructure, managed services 	where needed.</a:t>
+            </a:r>
+          </a:p>
+          <a:p>
+            <a:r>
+              <a:rPr lang="en-US" dirty="0"/>
+              <a:t>2.6	The system shall have a development environment for use by the software engineering and development teams.</a:t>
             </a:r>
           </a:p>
           <a:p>
@@ -9252,13 +8671,6 @@
   <p:clrMapOvr>
     <a:masterClrMapping/>
   </p:clrMapOvr>
-  <p:timing>
-    <p:tnLst>
-      <p:par>
-        <p:cTn id="1" dur="indefinite" restart="never" nodeType="tmRoot"/>
-      </p:par>
-    </p:tnLst>
-  </p:timing>
 </p:sld>
 </file>
 

</xml_diff>

<commit_message>
Update Test Framework Midterm Presentation 001.pptx
</commit_message>
<xml_diff>
--- a/Test Framework Midterm Presentation 001.pptx
+++ b/Test Framework Midterm Presentation 001.pptx
@@ -883,7 +883,7 @@
             <a:fld id="{B61BEF0D-F0BB-DE4B-95CE-6DB70DBA9567}" type="datetimeFigureOut">
               <a:rPr lang="en-US" dirty="0"/>
               <a:pPr/>
-              <a:t>7/29/2020</a:t>
+              <a:t>8/8/2020</a:t>
             </a:fld>
             <a:endParaRPr lang="en-US" dirty="0"/>
           </a:p>
@@ -1131,7 +1131,7 @@
             <a:fld id="{B61BEF0D-F0BB-DE4B-95CE-6DB70DBA9567}" type="datetimeFigureOut">
               <a:rPr lang="en-US" dirty="0"/>
               <a:pPr/>
-              <a:t>7/29/2020</a:t>
+              <a:t>8/8/2020</a:t>
             </a:fld>
             <a:endParaRPr lang="en-US" dirty="0"/>
           </a:p>
@@ -1442,7 +1442,7 @@
             <a:fld id="{B61BEF0D-F0BB-DE4B-95CE-6DB70DBA9567}" type="datetimeFigureOut">
               <a:rPr lang="en-US" dirty="0"/>
               <a:pPr/>
-              <a:t>7/29/2020</a:t>
+              <a:t>8/8/2020</a:t>
             </a:fld>
             <a:endParaRPr lang="en-US" dirty="0"/>
           </a:p>
@@ -1772,7 +1772,7 @@
             <a:fld id="{B61BEF0D-F0BB-DE4B-95CE-6DB70DBA9567}" type="datetimeFigureOut">
               <a:rPr lang="en-US" dirty="0"/>
               <a:pPr/>
-              <a:t>7/29/2020</a:t>
+              <a:t>8/8/2020</a:t>
             </a:fld>
             <a:endParaRPr lang="en-US" dirty="0"/>
           </a:p>
@@ -2083,7 +2083,7 @@
             <a:fld id="{B61BEF0D-F0BB-DE4B-95CE-6DB70DBA9567}" type="datetimeFigureOut">
               <a:rPr lang="en-US" dirty="0"/>
               <a:pPr/>
-              <a:t>7/29/2020</a:t>
+              <a:t>8/8/2020</a:t>
             </a:fld>
             <a:endParaRPr lang="en-US" dirty="0"/>
           </a:p>
@@ -2473,7 +2473,7 @@
             <a:fld id="{B61BEF0D-F0BB-DE4B-95CE-6DB70DBA9567}" type="datetimeFigureOut">
               <a:rPr lang="en-US" dirty="0"/>
               <a:pPr/>
-              <a:t>7/29/2020</a:t>
+              <a:t>8/8/2020</a:t>
             </a:fld>
             <a:endParaRPr lang="en-US" dirty="0"/>
           </a:p>
@@ -2639,7 +2639,7 @@
           <a:p>
             <a:fld id="{55C6B4A9-1611-4792-9094-5F34BCA07E0B}" type="datetimeFigureOut">
               <a:rPr lang="en-US" dirty="0"/>
-              <a:t>7/29/2020</a:t>
+              <a:t>8/8/2020</a:t>
             </a:fld>
             <a:endParaRPr lang="en-US" dirty="0"/>
           </a:p>
@@ -2815,7 +2815,7 @@
             <a:fld id="{B61BEF0D-F0BB-DE4B-95CE-6DB70DBA9567}" type="datetimeFigureOut">
               <a:rPr lang="en-US" dirty="0"/>
               <a:pPr/>
-              <a:t>7/29/2020</a:t>
+              <a:t>8/8/2020</a:t>
             </a:fld>
             <a:endParaRPr lang="en-US" dirty="0"/>
           </a:p>
@@ -2981,7 +2981,7 @@
           <a:p>
             <a:fld id="{42A54C80-263E-416B-A8E0-580EDEADCBDC}" type="datetimeFigureOut">
               <a:rPr lang="en-US" dirty="0"/>
-              <a:t>7/29/2020</a:t>
+              <a:t>8/8/2020</a:t>
             </a:fld>
             <a:endParaRPr lang="en-US" dirty="0"/>
           </a:p>
@@ -3224,7 +3224,7 @@
             <a:fld id="{B61BEF0D-F0BB-DE4B-95CE-6DB70DBA9567}" type="datetimeFigureOut">
               <a:rPr lang="en-US" dirty="0"/>
               <a:pPr/>
-              <a:t>7/29/2020</a:t>
+              <a:t>8/8/2020</a:t>
             </a:fld>
             <a:endParaRPr lang="en-US" dirty="0"/>
           </a:p>
@@ -3452,7 +3452,7 @@
           <a:p>
             <a:fld id="{42A54C80-263E-416B-A8E0-580EDEADCBDC}" type="datetimeFigureOut">
               <a:rPr lang="en-US" dirty="0"/>
-              <a:t>7/29/2020</a:t>
+              <a:t>8/8/2020</a:t>
             </a:fld>
             <a:endParaRPr lang="en-US" dirty="0"/>
           </a:p>
@@ -3822,7 +3822,7 @@
             <a:fld id="{B61BEF0D-F0BB-DE4B-95CE-6DB70DBA9567}" type="datetimeFigureOut">
               <a:rPr lang="en-US" dirty="0"/>
               <a:pPr/>
-              <a:t>7/29/2020</a:t>
+              <a:t>8/8/2020</a:t>
             </a:fld>
             <a:endParaRPr lang="en-US" dirty="0"/>
           </a:p>
@@ -3942,7 +3942,7 @@
             <a:fld id="{B61BEF0D-F0BB-DE4B-95CE-6DB70DBA9567}" type="datetimeFigureOut">
               <a:rPr lang="en-US" dirty="0"/>
               <a:pPr/>
-              <a:t>7/29/2020</a:t>
+              <a:t>8/8/2020</a:t>
             </a:fld>
             <a:endParaRPr lang="en-US" dirty="0"/>
           </a:p>
@@ -4034,7 +4034,7 @@
             <a:fld id="{B61BEF0D-F0BB-DE4B-95CE-6DB70DBA9567}" type="datetimeFigureOut">
               <a:rPr lang="en-US" dirty="0"/>
               <a:pPr/>
-              <a:t>7/29/2020</a:t>
+              <a:t>8/8/2020</a:t>
             </a:fld>
             <a:endParaRPr lang="en-US" dirty="0"/>
           </a:p>
@@ -4285,7 +4285,7 @@
           <a:p>
             <a:fld id="{42A54C80-263E-416B-A8E0-580EDEADCBDC}" type="datetimeFigureOut">
               <a:rPr lang="en-US" dirty="0"/>
-              <a:t>7/29/2020</a:t>
+              <a:t>8/8/2020</a:t>
             </a:fld>
             <a:endParaRPr lang="en-US" dirty="0"/>
           </a:p>
@@ -4587,7 +4587,7 @@
             <a:fld id="{B61BEF0D-F0BB-DE4B-95CE-6DB70DBA9567}" type="datetimeFigureOut">
               <a:rPr lang="en-US" dirty="0"/>
               <a:pPr/>
-              <a:t>7/29/2020</a:t>
+              <a:t>8/8/2020</a:t>
             </a:fld>
             <a:endParaRPr lang="en-US" dirty="0"/>
           </a:p>
@@ -5285,7 +5285,7 @@
             <a:fld id="{B61BEF0D-F0BB-DE4B-95CE-6DB70DBA9567}" type="datetimeFigureOut">
               <a:rPr lang="en-US" dirty="0"/>
               <a:pPr/>
-              <a:t>7/29/2020</a:t>
+              <a:t>8/8/2020</a:t>
             </a:fld>
             <a:endParaRPr lang="en-US" dirty="0"/>
           </a:p>
@@ -6621,25 +6621,96 @@
           </a:p>
         </p:txBody>
       </p:sp>
-      <p:sp>
-        <p:nvSpPr>
-          <p:cNvPr id="3" name="Content Placeholder 2"/>
-          <p:cNvSpPr>
-            <a:spLocks noGrp="1"/>
-          </p:cNvSpPr>
-          <p:nvPr>
-            <p:ph idx="1"/>
-          </p:nvPr>
-        </p:nvSpPr>
-        <p:spPr/>
-        <p:txBody>
-          <a:bodyPr/>
-          <a:lstStyle/>
-          <a:p>
-            <a:endParaRPr lang="en-US" dirty="0"/>
-          </a:p>
-        </p:txBody>
-      </p:sp>
+      <p:pic>
+        <p:nvPicPr>
+          <p:cNvPr id="9" name="Picture 8">
+            <a:extLst>
+              <a:ext uri="{FF2B5EF4-FFF2-40B4-BE49-F238E27FC236}">
+                <a16:creationId xmlns:a16="http://schemas.microsoft.com/office/drawing/2014/main" id="{3AA46D10-FDAD-4FDF-879C-3D7BDBD38A0C}"/>
+              </a:ext>
+            </a:extLst>
+          </p:cNvPr>
+          <p:cNvPicPr>
+            <a:picLocks noChangeAspect="1"/>
+          </p:cNvPicPr>
+          <p:nvPr/>
+        </p:nvPicPr>
+        <p:blipFill>
+          <a:blip r:embed="rId2"/>
+          <a:stretch>
+            <a:fillRect/>
+          </a:stretch>
+        </p:blipFill>
+        <p:spPr>
+          <a:xfrm>
+            <a:off x="677334" y="1672359"/>
+            <a:ext cx="4767334" cy="2057400"/>
+          </a:xfrm>
+          <a:prstGeom prst="rect">
+            <a:avLst/>
+          </a:prstGeom>
+        </p:spPr>
+      </p:pic>
+      <p:pic>
+        <p:nvPicPr>
+          <p:cNvPr id="11" name="Picture 10">
+            <a:extLst>
+              <a:ext uri="{FF2B5EF4-FFF2-40B4-BE49-F238E27FC236}">
+                <a16:creationId xmlns:a16="http://schemas.microsoft.com/office/drawing/2014/main" id="{199F2A54-2DBF-4AD1-89D0-FCBED4D40BAD}"/>
+              </a:ext>
+            </a:extLst>
+          </p:cNvPr>
+          <p:cNvPicPr>
+            <a:picLocks noChangeAspect="1"/>
+          </p:cNvPicPr>
+          <p:nvPr/>
+        </p:nvPicPr>
+        <p:blipFill>
+          <a:blip r:embed="rId3"/>
+          <a:stretch>
+            <a:fillRect/>
+          </a:stretch>
+        </p:blipFill>
+        <p:spPr>
+          <a:xfrm>
+            <a:off x="677334" y="4156941"/>
+            <a:ext cx="4698242" cy="2057400"/>
+          </a:xfrm>
+          <a:prstGeom prst="rect">
+            <a:avLst/>
+          </a:prstGeom>
+        </p:spPr>
+      </p:pic>
+      <p:pic>
+        <p:nvPicPr>
+          <p:cNvPr id="13" name="Picture 12">
+            <a:extLst>
+              <a:ext uri="{FF2B5EF4-FFF2-40B4-BE49-F238E27FC236}">
+                <a16:creationId xmlns:a16="http://schemas.microsoft.com/office/drawing/2014/main" id="{1F923096-7DC3-4570-86BE-53B9C19BBBCC}"/>
+              </a:ext>
+            </a:extLst>
+          </p:cNvPr>
+          <p:cNvPicPr>
+            <a:picLocks noChangeAspect="1"/>
+          </p:cNvPicPr>
+          <p:nvPr/>
+        </p:nvPicPr>
+        <p:blipFill>
+          <a:blip r:embed="rId4"/>
+          <a:stretch>
+            <a:fillRect/>
+          </a:stretch>
+        </p:blipFill>
+        <p:spPr>
+          <a:xfrm>
+            <a:off x="5695343" y="2870201"/>
+            <a:ext cx="4606119" cy="2057400"/>
+          </a:xfrm>
+          <a:prstGeom prst="rect">
+            <a:avLst/>
+          </a:prstGeom>
+        </p:spPr>
+      </p:pic>
     </p:spTree>
     <p:extLst>
       <p:ext uri="{BB962C8B-B14F-4D97-AF65-F5344CB8AC3E}">
@@ -6692,25 +6763,36 @@
           </a:p>
         </p:txBody>
       </p:sp>
-      <p:sp>
-        <p:nvSpPr>
-          <p:cNvPr id="3" name="Content Placeholder 2"/>
-          <p:cNvSpPr>
-            <a:spLocks noGrp="1"/>
-          </p:cNvSpPr>
-          <p:nvPr>
-            <p:ph idx="1"/>
-          </p:nvPr>
-        </p:nvSpPr>
-        <p:spPr/>
-        <p:txBody>
-          <a:bodyPr/>
-          <a:lstStyle/>
-          <a:p>
-            <a:endParaRPr lang="en-US"/>
-          </a:p>
-        </p:txBody>
-      </p:sp>
+      <p:pic>
+        <p:nvPicPr>
+          <p:cNvPr id="5" name="Picture 4">
+            <a:extLst>
+              <a:ext uri="{FF2B5EF4-FFF2-40B4-BE49-F238E27FC236}">
+                <a16:creationId xmlns:a16="http://schemas.microsoft.com/office/drawing/2014/main" id="{13B04C9D-E45A-4DE2-AF80-B1367C691FAE}"/>
+              </a:ext>
+            </a:extLst>
+          </p:cNvPr>
+          <p:cNvPicPr>
+            <a:picLocks noChangeAspect="1"/>
+          </p:cNvPicPr>
+          <p:nvPr/>
+        </p:nvPicPr>
+        <p:blipFill>
+          <a:blip r:embed="rId2"/>
+          <a:stretch>
+            <a:fillRect/>
+          </a:stretch>
+        </p:blipFill>
+        <p:spPr>
+          <a:xfrm>
+            <a:off x="1000125" y="1283854"/>
+            <a:ext cx="7389591" cy="5506893"/>
+          </a:xfrm>
+          <a:prstGeom prst="rect">
+            <a:avLst/>
+          </a:prstGeom>
+        </p:spPr>
+      </p:pic>
     </p:spTree>
     <p:extLst>
       <p:ext uri="{BB962C8B-B14F-4D97-AF65-F5344CB8AC3E}">
@@ -6763,25 +6845,66 @@
           </a:p>
         </p:txBody>
       </p:sp>
-      <p:sp>
-        <p:nvSpPr>
-          <p:cNvPr id="3" name="Content Placeholder 2"/>
-          <p:cNvSpPr>
-            <a:spLocks noGrp="1"/>
-          </p:cNvSpPr>
-          <p:nvPr>
-            <p:ph idx="1"/>
-          </p:nvPr>
-        </p:nvSpPr>
-        <p:spPr/>
-        <p:txBody>
-          <a:bodyPr/>
-          <a:lstStyle/>
-          <a:p>
-            <a:endParaRPr lang="en-US"/>
-          </a:p>
-        </p:txBody>
-      </p:sp>
+      <p:pic>
+        <p:nvPicPr>
+          <p:cNvPr id="5" name="Picture 4">
+            <a:extLst>
+              <a:ext uri="{FF2B5EF4-FFF2-40B4-BE49-F238E27FC236}">
+                <a16:creationId xmlns:a16="http://schemas.microsoft.com/office/drawing/2014/main" id="{C9AEC1BA-FA4A-4D68-9D25-D43E9CFFC02C}"/>
+              </a:ext>
+            </a:extLst>
+          </p:cNvPr>
+          <p:cNvPicPr>
+            <a:picLocks noChangeAspect="1"/>
+          </p:cNvPicPr>
+          <p:nvPr/>
+        </p:nvPicPr>
+        <p:blipFill>
+          <a:blip r:embed="rId2"/>
+          <a:stretch>
+            <a:fillRect/>
+          </a:stretch>
+        </p:blipFill>
+        <p:spPr>
+          <a:xfrm>
+            <a:off x="6479310" y="1565564"/>
+            <a:ext cx="2308222" cy="3237923"/>
+          </a:xfrm>
+          <a:prstGeom prst="rect">
+            <a:avLst/>
+          </a:prstGeom>
+        </p:spPr>
+      </p:pic>
+      <p:pic>
+        <p:nvPicPr>
+          <p:cNvPr id="9" name="Picture 8">
+            <a:extLst>
+              <a:ext uri="{FF2B5EF4-FFF2-40B4-BE49-F238E27FC236}">
+                <a16:creationId xmlns:a16="http://schemas.microsoft.com/office/drawing/2014/main" id="{B50AD3E8-FD4C-4543-9C8F-D6BCED40866F}"/>
+              </a:ext>
+            </a:extLst>
+          </p:cNvPr>
+          <p:cNvPicPr>
+            <a:picLocks noChangeAspect="1"/>
+          </p:cNvPicPr>
+          <p:nvPr/>
+        </p:nvPicPr>
+        <p:blipFill>
+          <a:blip r:embed="rId3"/>
+          <a:stretch>
+            <a:fillRect/>
+          </a:stretch>
+        </p:blipFill>
+        <p:spPr>
+          <a:xfrm>
+            <a:off x="888886" y="1422398"/>
+            <a:ext cx="6076894" cy="5036705"/>
+          </a:xfrm>
+          <a:prstGeom prst="rect">
+            <a:avLst/>
+          </a:prstGeom>
+        </p:spPr>
+      </p:pic>
     </p:spTree>
     <p:extLst>
       <p:ext uri="{BB962C8B-B14F-4D97-AF65-F5344CB8AC3E}">

</xml_diff>

<commit_message>
Save changes for user roles
</commit_message>
<xml_diff>
--- a/Test Framework Midterm Presentation 001.pptx
+++ b/Test Framework Midterm Presentation 001.pptx
@@ -883,7 +883,7 @@
             <a:fld id="{B61BEF0D-F0BB-DE4B-95CE-6DB70DBA9567}" type="datetimeFigureOut">
               <a:rPr lang="en-US" dirty="0"/>
               <a:pPr/>
-              <a:t>8/8/2020</a:t>
+              <a:t>8/9/2020</a:t>
             </a:fld>
             <a:endParaRPr lang="en-US" dirty="0"/>
           </a:p>
@@ -1131,7 +1131,7 @@
             <a:fld id="{B61BEF0D-F0BB-DE4B-95CE-6DB70DBA9567}" type="datetimeFigureOut">
               <a:rPr lang="en-US" dirty="0"/>
               <a:pPr/>
-              <a:t>8/8/2020</a:t>
+              <a:t>8/9/2020</a:t>
             </a:fld>
             <a:endParaRPr lang="en-US" dirty="0"/>
           </a:p>
@@ -1442,7 +1442,7 @@
             <a:fld id="{B61BEF0D-F0BB-DE4B-95CE-6DB70DBA9567}" type="datetimeFigureOut">
               <a:rPr lang="en-US" dirty="0"/>
               <a:pPr/>
-              <a:t>8/8/2020</a:t>
+              <a:t>8/9/2020</a:t>
             </a:fld>
             <a:endParaRPr lang="en-US" dirty="0"/>
           </a:p>
@@ -1772,7 +1772,7 @@
             <a:fld id="{B61BEF0D-F0BB-DE4B-95CE-6DB70DBA9567}" type="datetimeFigureOut">
               <a:rPr lang="en-US" dirty="0"/>
               <a:pPr/>
-              <a:t>8/8/2020</a:t>
+              <a:t>8/9/2020</a:t>
             </a:fld>
             <a:endParaRPr lang="en-US" dirty="0"/>
           </a:p>
@@ -2083,7 +2083,7 @@
             <a:fld id="{B61BEF0D-F0BB-DE4B-95CE-6DB70DBA9567}" type="datetimeFigureOut">
               <a:rPr lang="en-US" dirty="0"/>
               <a:pPr/>
-              <a:t>8/8/2020</a:t>
+              <a:t>8/9/2020</a:t>
             </a:fld>
             <a:endParaRPr lang="en-US" dirty="0"/>
           </a:p>
@@ -2473,7 +2473,7 @@
             <a:fld id="{B61BEF0D-F0BB-DE4B-95CE-6DB70DBA9567}" type="datetimeFigureOut">
               <a:rPr lang="en-US" dirty="0"/>
               <a:pPr/>
-              <a:t>8/8/2020</a:t>
+              <a:t>8/9/2020</a:t>
             </a:fld>
             <a:endParaRPr lang="en-US" dirty="0"/>
           </a:p>
@@ -2639,7 +2639,7 @@
           <a:p>
             <a:fld id="{55C6B4A9-1611-4792-9094-5F34BCA07E0B}" type="datetimeFigureOut">
               <a:rPr lang="en-US" dirty="0"/>
-              <a:t>8/8/2020</a:t>
+              <a:t>8/9/2020</a:t>
             </a:fld>
             <a:endParaRPr lang="en-US" dirty="0"/>
           </a:p>
@@ -2815,7 +2815,7 @@
             <a:fld id="{B61BEF0D-F0BB-DE4B-95CE-6DB70DBA9567}" type="datetimeFigureOut">
               <a:rPr lang="en-US" dirty="0"/>
               <a:pPr/>
-              <a:t>8/8/2020</a:t>
+              <a:t>8/9/2020</a:t>
             </a:fld>
             <a:endParaRPr lang="en-US" dirty="0"/>
           </a:p>
@@ -2981,7 +2981,7 @@
           <a:p>
             <a:fld id="{42A54C80-263E-416B-A8E0-580EDEADCBDC}" type="datetimeFigureOut">
               <a:rPr lang="en-US" dirty="0"/>
-              <a:t>8/8/2020</a:t>
+              <a:t>8/9/2020</a:t>
             </a:fld>
             <a:endParaRPr lang="en-US" dirty="0"/>
           </a:p>
@@ -3224,7 +3224,7 @@
             <a:fld id="{B61BEF0D-F0BB-DE4B-95CE-6DB70DBA9567}" type="datetimeFigureOut">
               <a:rPr lang="en-US" dirty="0"/>
               <a:pPr/>
-              <a:t>8/8/2020</a:t>
+              <a:t>8/9/2020</a:t>
             </a:fld>
             <a:endParaRPr lang="en-US" dirty="0"/>
           </a:p>
@@ -3452,7 +3452,7 @@
           <a:p>
             <a:fld id="{42A54C80-263E-416B-A8E0-580EDEADCBDC}" type="datetimeFigureOut">
               <a:rPr lang="en-US" dirty="0"/>
-              <a:t>8/8/2020</a:t>
+              <a:t>8/9/2020</a:t>
             </a:fld>
             <a:endParaRPr lang="en-US" dirty="0"/>
           </a:p>
@@ -3822,7 +3822,7 @@
             <a:fld id="{B61BEF0D-F0BB-DE4B-95CE-6DB70DBA9567}" type="datetimeFigureOut">
               <a:rPr lang="en-US" dirty="0"/>
               <a:pPr/>
-              <a:t>8/8/2020</a:t>
+              <a:t>8/9/2020</a:t>
             </a:fld>
             <a:endParaRPr lang="en-US" dirty="0"/>
           </a:p>
@@ -3942,7 +3942,7 @@
             <a:fld id="{B61BEF0D-F0BB-DE4B-95CE-6DB70DBA9567}" type="datetimeFigureOut">
               <a:rPr lang="en-US" dirty="0"/>
               <a:pPr/>
-              <a:t>8/8/2020</a:t>
+              <a:t>8/9/2020</a:t>
             </a:fld>
             <a:endParaRPr lang="en-US" dirty="0"/>
           </a:p>
@@ -4034,7 +4034,7 @@
             <a:fld id="{B61BEF0D-F0BB-DE4B-95CE-6DB70DBA9567}" type="datetimeFigureOut">
               <a:rPr lang="en-US" dirty="0"/>
               <a:pPr/>
-              <a:t>8/8/2020</a:t>
+              <a:t>8/9/2020</a:t>
             </a:fld>
             <a:endParaRPr lang="en-US" dirty="0"/>
           </a:p>
@@ -4285,7 +4285,7 @@
           <a:p>
             <a:fld id="{42A54C80-263E-416B-A8E0-580EDEADCBDC}" type="datetimeFigureOut">
               <a:rPr lang="en-US" dirty="0"/>
-              <a:t>8/8/2020</a:t>
+              <a:t>8/9/2020</a:t>
             </a:fld>
             <a:endParaRPr lang="en-US" dirty="0"/>
           </a:p>
@@ -4587,7 +4587,7 @@
             <a:fld id="{B61BEF0D-F0BB-DE4B-95CE-6DB70DBA9567}" type="datetimeFigureOut">
               <a:rPr lang="en-US" dirty="0"/>
               <a:pPr/>
-              <a:t>8/8/2020</a:t>
+              <a:t>8/9/2020</a:t>
             </a:fld>
             <a:endParaRPr lang="en-US" dirty="0"/>
           </a:p>
@@ -5285,7 +5285,7 @@
             <a:fld id="{B61BEF0D-F0BB-DE4B-95CE-6DB70DBA9567}" type="datetimeFigureOut">
               <a:rPr lang="en-US" dirty="0"/>
               <a:pPr/>
-              <a:t>8/8/2020</a:t>
+              <a:t>8/9/2020</a:t>
             </a:fld>
             <a:endParaRPr lang="en-US" dirty="0"/>
           </a:p>
@@ -6626,7 +6626,7 @@
           <p:cNvPr id="9" name="Picture 8">
             <a:extLst>
               <a:ext uri="{FF2B5EF4-FFF2-40B4-BE49-F238E27FC236}">
-                <a16:creationId xmlns:a16="http://schemas.microsoft.com/office/drawing/2014/main" id="{3AA46D10-FDAD-4FDF-879C-3D7BDBD38A0C}"/>
+                <a16:creationId xmlns:a16="http://schemas.microsoft.com/office/drawing/2014/main" xmlns="" id="{3AA46D10-FDAD-4FDF-879C-3D7BDBD38A0C}"/>
               </a:ext>
             </a:extLst>
           </p:cNvPr>
@@ -6656,7 +6656,7 @@
           <p:cNvPr id="11" name="Picture 10">
             <a:extLst>
               <a:ext uri="{FF2B5EF4-FFF2-40B4-BE49-F238E27FC236}">
-                <a16:creationId xmlns:a16="http://schemas.microsoft.com/office/drawing/2014/main" id="{199F2A54-2DBF-4AD1-89D0-FCBED4D40BAD}"/>
+                <a16:creationId xmlns:a16="http://schemas.microsoft.com/office/drawing/2014/main" xmlns="" id="{199F2A54-2DBF-4AD1-89D0-FCBED4D40BAD}"/>
               </a:ext>
             </a:extLst>
           </p:cNvPr>
@@ -6686,7 +6686,7 @@
           <p:cNvPr id="13" name="Picture 12">
             <a:extLst>
               <a:ext uri="{FF2B5EF4-FFF2-40B4-BE49-F238E27FC236}">
-                <a16:creationId xmlns:a16="http://schemas.microsoft.com/office/drawing/2014/main" id="{1F923096-7DC3-4570-86BE-53B9C19BBBCC}"/>
+                <a16:creationId xmlns:a16="http://schemas.microsoft.com/office/drawing/2014/main" xmlns="" id="{1F923096-7DC3-4570-86BE-53B9C19BBBCC}"/>
               </a:ext>
             </a:extLst>
           </p:cNvPr>
@@ -6768,7 +6768,7 @@
           <p:cNvPr id="5" name="Picture 4">
             <a:extLst>
               <a:ext uri="{FF2B5EF4-FFF2-40B4-BE49-F238E27FC236}">
-                <a16:creationId xmlns:a16="http://schemas.microsoft.com/office/drawing/2014/main" id="{13B04C9D-E45A-4DE2-AF80-B1367C691FAE}"/>
+                <a16:creationId xmlns:a16="http://schemas.microsoft.com/office/drawing/2014/main" xmlns="" id="{13B04C9D-E45A-4DE2-AF80-B1367C691FAE}"/>
               </a:ext>
             </a:extLst>
           </p:cNvPr>
@@ -6850,7 +6850,7 @@
           <p:cNvPr id="5" name="Picture 4">
             <a:extLst>
               <a:ext uri="{FF2B5EF4-FFF2-40B4-BE49-F238E27FC236}">
-                <a16:creationId xmlns:a16="http://schemas.microsoft.com/office/drawing/2014/main" id="{C9AEC1BA-FA4A-4D68-9D25-D43E9CFFC02C}"/>
+                <a16:creationId xmlns:a16="http://schemas.microsoft.com/office/drawing/2014/main" xmlns="" id="{C9AEC1BA-FA4A-4D68-9D25-D43E9CFFC02C}"/>
               </a:ext>
             </a:extLst>
           </p:cNvPr>
@@ -6880,7 +6880,7 @@
           <p:cNvPr id="9" name="Picture 8">
             <a:extLst>
               <a:ext uri="{FF2B5EF4-FFF2-40B4-BE49-F238E27FC236}">
-                <a16:creationId xmlns:a16="http://schemas.microsoft.com/office/drawing/2014/main" id="{B50AD3E8-FD4C-4543-9C8F-D6BCED40866F}"/>
+                <a16:creationId xmlns:a16="http://schemas.microsoft.com/office/drawing/2014/main" xmlns="" id="{B50AD3E8-FD4C-4543-9C8F-D6BCED40866F}"/>
               </a:ext>
             </a:extLst>
           </p:cNvPr>
@@ -8266,7 +8266,7 @@
           <p:cNvPr id="6" name="Picture 5">
             <a:extLst>
               <a:ext uri="{FF2B5EF4-FFF2-40B4-BE49-F238E27FC236}">
-                <a16:creationId xmlns:a16="http://schemas.microsoft.com/office/drawing/2014/main" id="{42F62902-0B99-45F6-8313-405C7CFCB586}"/>
+                <a16:creationId xmlns:a16="http://schemas.microsoft.com/office/drawing/2014/main" xmlns="" id="{42F62902-0B99-45F6-8313-405C7CFCB586}"/>
               </a:ext>
             </a:extLst>
           </p:cNvPr>
@@ -8515,21 +8515,34 @@
             </a:pPr>
             <a:r>
               <a:rPr lang="en-US" dirty="0"/>
-              <a:t>The system will be used by a range of professional IT development staff.  This is a system that the developers, architects, engineers, and others should be able to learn to use quickly, enable quick testing of program code, get results back and view logs or other test output.  The system should have:</a:t>
-            </a:r>
+              <a:t>The system will be used by a range of professional IT development staff.  This is a system that the developers, architects, engineers, and others should be able to learn to use quickly, enable quick testing of program code, get results back and view logs or other test output.  The </a:t>
+            </a:r>
+            <a:r>
+              <a:rPr lang="en-US" dirty="0" smtClean="0"/>
+              <a:t>system shall have:</a:t>
+            </a:r>
+            <a:endParaRPr lang="en-US" dirty="0"/>
           </a:p>
           <a:p>
             <a:pPr lvl="0"/>
             <a:r>
-              <a:rPr lang="en-US" dirty="0"/>
-              <a:t>Graphic User Interface (GUI). </a:t>
+              <a:rPr lang="en-US" dirty="0" smtClean="0"/>
+              <a:t>Graphic </a:t>
+            </a:r>
+            <a:r>
+              <a:rPr lang="en-US" dirty="0"/>
+              <a:t>User Interface (GUI). </a:t>
             </a:r>
           </a:p>
           <a:p>
             <a:pPr lvl="0"/>
             <a:r>
-              <a:rPr lang="en-US" dirty="0"/>
-              <a:t>Web enabled front end.</a:t>
+              <a:rPr lang="en-US" dirty="0" smtClean="0"/>
+              <a:t>Web </a:t>
+            </a:r>
+            <a:r>
+              <a:rPr lang="en-US" dirty="0"/>
+              <a:t>enabled front end.</a:t>
             </a:r>
           </a:p>
           <a:p>
@@ -8628,7 +8641,31 @@
           <a:bodyPr/>
           <a:lstStyle/>
           <a:p>
-            <a:endParaRPr lang="en-US"/>
+            <a:r>
+              <a:rPr lang="en-US" dirty="0" smtClean="0"/>
+              <a:t>Local User – user with locally installed test engine on PC/laptop.  Able to register with Test Server to register test engine in database.  Able </a:t>
+            </a:r>
+            <a:r>
+              <a:rPr lang="en-US" dirty="0"/>
+              <a:t>t</a:t>
+            </a:r>
+            <a:r>
+              <a:rPr lang="en-US" dirty="0" smtClean="0"/>
+              <a:t>o run tests locally.  Uses UI with internal engine.</a:t>
+            </a:r>
+          </a:p>
+          <a:p>
+            <a:r>
+              <a:rPr lang="en-US" dirty="0" smtClean="0"/>
+              <a:t>Remote User – user with same capability as local user, but has ability to view available test engines across the web and to use other hardware, servers,  infrastructure for test purposes as well as capability to view archived results.</a:t>
+            </a:r>
+          </a:p>
+          <a:p>
+            <a:r>
+              <a:rPr lang="en-US" dirty="0" smtClean="0"/>
+              <a:t>Administrator – user with the ability to install application remotely, update application services, add remote users, de-register test engines, perform HA/DR testing.  </a:t>
+            </a:r>
+            <a:endParaRPr lang="en-US" dirty="0"/>
           </a:p>
         </p:txBody>
       </p:sp>

</xml_diff>

<commit_message>
Updates to backup slides to include priorities and changed system usability from should to shall in Master Requirements Doc
</commit_message>
<xml_diff>
--- a/Test Framework Midterm Presentation 001.pptx
+++ b/Test Framework Midterm Presentation 001.pptx
@@ -29,8 +29,9 @@
     <p:sldId id="277" r:id="rId23"/>
     <p:sldId id="278" r:id="rId24"/>
     <p:sldId id="279" r:id="rId25"/>
-    <p:sldId id="280" r:id="rId26"/>
-    <p:sldId id="281" r:id="rId27"/>
+    <p:sldId id="282" r:id="rId26"/>
+    <p:sldId id="280" r:id="rId27"/>
+    <p:sldId id="281" r:id="rId28"/>
   </p:sldIdLst>
   <p:sldSz cx="12192000" cy="6858000"/>
   <p:notesSz cx="6858000" cy="9144000"/>
@@ -6626,7 +6627,7 @@
           <p:cNvPr id="9" name="Picture 8">
             <a:extLst>
               <a:ext uri="{FF2B5EF4-FFF2-40B4-BE49-F238E27FC236}">
-                <a16:creationId xmlns:a16="http://schemas.microsoft.com/office/drawing/2014/main" xmlns="" id="{3AA46D10-FDAD-4FDF-879C-3D7BDBD38A0C}"/>
+                <a16:creationId xmlns="" xmlns:a16="http://schemas.microsoft.com/office/drawing/2014/main" id="{3AA46D10-FDAD-4FDF-879C-3D7BDBD38A0C}"/>
               </a:ext>
             </a:extLst>
           </p:cNvPr>
@@ -6656,7 +6657,7 @@
           <p:cNvPr id="11" name="Picture 10">
             <a:extLst>
               <a:ext uri="{FF2B5EF4-FFF2-40B4-BE49-F238E27FC236}">
-                <a16:creationId xmlns:a16="http://schemas.microsoft.com/office/drawing/2014/main" xmlns="" id="{199F2A54-2DBF-4AD1-89D0-FCBED4D40BAD}"/>
+                <a16:creationId xmlns="" xmlns:a16="http://schemas.microsoft.com/office/drawing/2014/main" id="{199F2A54-2DBF-4AD1-89D0-FCBED4D40BAD}"/>
               </a:ext>
             </a:extLst>
           </p:cNvPr>
@@ -6686,7 +6687,7 @@
           <p:cNvPr id="13" name="Picture 12">
             <a:extLst>
               <a:ext uri="{FF2B5EF4-FFF2-40B4-BE49-F238E27FC236}">
-                <a16:creationId xmlns:a16="http://schemas.microsoft.com/office/drawing/2014/main" xmlns="" id="{1F923096-7DC3-4570-86BE-53B9C19BBBCC}"/>
+                <a16:creationId xmlns="" xmlns:a16="http://schemas.microsoft.com/office/drawing/2014/main" id="{1F923096-7DC3-4570-86BE-53B9C19BBBCC}"/>
               </a:ext>
             </a:extLst>
           </p:cNvPr>
@@ -6768,7 +6769,7 @@
           <p:cNvPr id="5" name="Picture 4">
             <a:extLst>
               <a:ext uri="{FF2B5EF4-FFF2-40B4-BE49-F238E27FC236}">
-                <a16:creationId xmlns:a16="http://schemas.microsoft.com/office/drawing/2014/main" xmlns="" id="{13B04C9D-E45A-4DE2-AF80-B1367C691FAE}"/>
+                <a16:creationId xmlns="" xmlns:a16="http://schemas.microsoft.com/office/drawing/2014/main" id="{13B04C9D-E45A-4DE2-AF80-B1367C691FAE}"/>
               </a:ext>
             </a:extLst>
           </p:cNvPr>
@@ -6850,7 +6851,7 @@
           <p:cNvPr id="5" name="Picture 4">
             <a:extLst>
               <a:ext uri="{FF2B5EF4-FFF2-40B4-BE49-F238E27FC236}">
-                <a16:creationId xmlns:a16="http://schemas.microsoft.com/office/drawing/2014/main" xmlns="" id="{C9AEC1BA-FA4A-4D68-9D25-D43E9CFFC02C}"/>
+                <a16:creationId xmlns="" xmlns:a16="http://schemas.microsoft.com/office/drawing/2014/main" id="{C9AEC1BA-FA4A-4D68-9D25-D43E9CFFC02C}"/>
               </a:ext>
             </a:extLst>
           </p:cNvPr>
@@ -6880,7 +6881,7 @@
           <p:cNvPr id="9" name="Picture 8">
             <a:extLst>
               <a:ext uri="{FF2B5EF4-FFF2-40B4-BE49-F238E27FC236}">
-                <a16:creationId xmlns:a16="http://schemas.microsoft.com/office/drawing/2014/main" xmlns="" id="{B50AD3E8-FD4C-4543-9C8F-D6BCED40866F}"/>
+                <a16:creationId xmlns="" xmlns:a16="http://schemas.microsoft.com/office/drawing/2014/main" id="{B50AD3E8-FD4C-4543-9C8F-D6BCED40866F}"/>
               </a:ext>
             </a:extLst>
           </p:cNvPr>
@@ -7243,13 +7244,17 @@
           <a:p>
             <a:r>
               <a:rPr lang="en-US" dirty="0"/>
-              <a:t>	The system shall support 24/7 availability. Routine downtime in a particular region necessary for maintenance or enhancement to the system shall take place after 21:00 EST on Saturday and shall end before 23:00 EST on Sunday. </a:t>
-            </a:r>
-          </a:p>
-          <a:p>
-            <a:r>
-              <a:rPr lang="en-US" dirty="0"/>
-              <a:t>3.1.1     Any scheduled downtime which takes place outside of the designated hours shall be reported to users no less than 48 hours in advance. In the case of emergency system outage, the notice period shall be waived but users shall be informed as soon as possible of any unplanned system outages.</a:t>
+              <a:t>	</a:t>
+            </a:r>
+            <a:r>
+              <a:rPr lang="en-US" dirty="0"/>
+              <a:t>The system shall support 24/7 availability. Routine downtime in a particular region necessary for 	maintenance or enhancement to the system shall take place after 21:00 EST on Saturday 	and shall end before 23:00 EST on Sunday. [1]</a:t>
+            </a:r>
+          </a:p>
+          <a:p>
+            <a:r>
+              <a:rPr lang="en-US" dirty="0"/>
+              <a:t>3.1.1     Any scheduled downtime which takes place outside of the designated hours shall be reported to 	users no less than 48 hours in advance. In the case of emergency system outage, the notice 	period shall be waived but users shall be informed as soon as possible of any unplanned system 	outages. [1]</a:t>
             </a:r>
           </a:p>
           <a:p>
@@ -7261,25 +7266,25 @@
           <a:p>
             <a:r>
               <a:rPr lang="en-US" dirty="0"/>
-              <a:t>	The system shall be able to quickly recover from outages due to unforeseen circumstances while 	minimizing downtime. The system shall support the ability to create and issue automated alerts when downtime is encountered for any of the reasons stated below.</a:t>
-            </a:r>
-          </a:p>
-          <a:p>
-            <a:r>
-              <a:rPr lang="en-US" dirty="0"/>
-              <a:t>3.2.1     In the event of an unplanned outage due to the loss of a particular region or availability zone, the system shall immediately fail over to another region or availability zone as determined by the cloud provider.</a:t>
-            </a:r>
-          </a:p>
-          <a:p>
-            <a:r>
-              <a:rPr lang="en-US" dirty="0"/>
-              <a:t>3.2.2      In the event of an unplanned outage due to the failure of an instance on which the system is hosted, the system shall immediately fail over to a backup instance. In the event a backup instance does not exist, the system shall have the ability to immediately spin up a new instance and fail over to it using automated deployment.</a:t>
-            </a:r>
-          </a:p>
-          <a:p>
-            <a:r>
-              <a:rPr lang="en-US" dirty="0"/>
-              <a:t>3.2.3.    In the event of an unplanned outage in any or all regions due to a software error, the system shall support the ability to quickly identify and create a restore point from the last known working backup. This process shall take no more than 1 hour to complete from the time the software malfunction is identified.</a:t>
+              <a:t>	The system shall be able to quickly recover from outages due to unforeseen circumstances while 	minimizing downtime. The system shall support the ability to create and issue automated alerts 	when downtime is encountered for any of the reasons stated below. [1]</a:t>
+            </a:r>
+          </a:p>
+          <a:p>
+            <a:r>
+              <a:rPr lang="en-US" dirty="0"/>
+              <a:t>3.2.1     In the event of an unplanned outage due to the loss of a particular region or availability zone, 	the system shall immediately fail over to another region or availability zone as determined by 	the cloud provider. [1]</a:t>
+            </a:r>
+          </a:p>
+          <a:p>
+            <a:r>
+              <a:rPr lang="en-US" dirty="0"/>
+              <a:t>3.2.2      In the event of an unplanned outage due to the failure of an instance on which the system is          	hosted, the system shall immediately fail over to a backup instance. In the event a backup 	instance does not exist, the system shall have the ability to immediately spin up a new instance 	and fail over to it using automated deployment. [1]</a:t>
+            </a:r>
+          </a:p>
+          <a:p>
+            <a:r>
+              <a:rPr lang="en-US" dirty="0"/>
+              <a:t>3.2.3.    In the event of an unplanned outage in any or all regions due to a software error, the system 	shall support the ability to quickly identify and create a restore point from the last known 	working backup. This process shall take no more than 1 hour to complete from the time the 	software malfunction is identified. [1]</a:t>
             </a:r>
           </a:p>
           <a:p>
@@ -7364,31 +7369,43 @@
           <a:p>
             <a:r>
               <a:rPr lang="en-US" dirty="0"/>
-              <a:t>	The system shall support high availability by being quickly accessible to users attempting to 	access it from any geographic region. </a:t>
-            </a:r>
-          </a:p>
-          <a:p>
-            <a:r>
-              <a:rPr lang="en-US" dirty="0"/>
-              <a:t>3.3.1    The system homepage shall take no more than an average of five (5) seconds to load from the 	    	time the URL is input from a web browser in any geographic region. This average shall be taken 	from 10 consecutive attempts to access the homepage. </a:t>
-            </a:r>
-          </a:p>
-          <a:p>
-            <a:r>
-              <a:rPr lang="en-US" dirty="0"/>
-              <a:t>3.3.2    Navigation actions (paging, links, etc.) should take no more than an average of three (3) seconds     	to load from the time the action is triggered. This average shall be taken from 10 consecutive 	attempts to perform the action.</a:t>
-            </a:r>
-          </a:p>
-          <a:p>
-            <a:r>
-              <a:rPr lang="en-US" dirty="0"/>
-              <a:t>3.3.3	The system shall maintain all program code in scripts that can be deployed to the cloud platform.</a:t>
-            </a:r>
-          </a:p>
-          <a:p>
-            <a:r>
-              <a:rPr lang="en-US" dirty="0"/>
-              <a:t>	3.3.3.1	Backup copies of all scripts shall be located in a separate region.</a:t>
+              <a:t>	</a:t>
+            </a:r>
+            <a:r>
+              <a:rPr lang="en-US" dirty="0"/>
+              <a:t>The system shall support high availability by being quickly accessible to users attempting to 	access it from any geographic region. [1]</a:t>
+            </a:r>
+          </a:p>
+          <a:p>
+            <a:r>
+              <a:rPr lang="en-US" dirty="0"/>
+              <a:t>3.3.1    The system homepage shall take no more than an average of five (5) seconds to load from the 	    	time the URL is input from a web browser in any geographic region. This average shall be taken 	from 10 consecutive attempts to access the homepage. [1]</a:t>
+            </a:r>
+          </a:p>
+          <a:p>
+            <a:r>
+              <a:rPr lang="en-US" dirty="0"/>
+              <a:t>3.3.2    Navigation actions (paging, links, etc.) should take no more than an average of three (3) seconds     	to load from the time the action is triggered. This average shall be taken from 10 consecutive 	attempts to perform the action. [1]</a:t>
+            </a:r>
+          </a:p>
+          <a:p>
+            <a:r>
+              <a:rPr lang="en-US" dirty="0"/>
+              <a:t>3.3.3	The system shall maintain all program code in scripts that can be deployed to the cloud platform. </a:t>
+            </a:r>
+            <a:r>
+              <a:rPr lang="en-US" dirty="0" smtClean="0"/>
+              <a:t>[</a:t>
+            </a:r>
+            <a:r>
+              <a:rPr lang="en-US" dirty="0"/>
+              <a:t>1]</a:t>
+            </a:r>
+          </a:p>
+          <a:p>
+            <a:r>
+              <a:rPr lang="en-US" dirty="0"/>
+              <a:t>	3.3.3.1	Backup copies of all scripts shall be located in a separate region. [2]</a:t>
             </a:r>
           </a:p>
           <a:p>
@@ -7461,7 +7478,7 @@
         <p:spPr/>
         <p:txBody>
           <a:bodyPr>
-            <a:normAutofit fontScale="85000" lnSpcReduction="10000"/>
+            <a:normAutofit fontScale="92500" lnSpcReduction="10000"/>
           </a:bodyPr>
           <a:lstStyle/>
           <a:p>
@@ -7473,59 +7490,37 @@
           <a:p>
             <a:r>
               <a:rPr lang="en-US" dirty="0"/>
-              <a:t>The software developer(s) shall have the ability to run individual unit tests of program code as well as multiple tests simultaneously. They need to be able to stress performance, ensure scalability, and diagnose system interface issues.</a:t>
-            </a:r>
-          </a:p>
-          <a:p>
-            <a:r>
-              <a:rPr lang="en-US" dirty="0"/>
-              <a:t>4.1.1	The test engine shall be an application that can run on the Windows platform.</a:t>
-            </a:r>
-          </a:p>
-          <a:p>
-            <a:r>
-              <a:rPr lang="en-US" dirty="0"/>
-              <a:t>4.1.2	The test engine should run on Linux and Mac platforms.</a:t>
-            </a:r>
-          </a:p>
-          <a:p>
-            <a:r>
-              <a:rPr lang="en-US" dirty="0"/>
-              <a:t>4.1.3	The user shall have the ability to install the test engine on multiple machines (redundancy, performance, latency).</a:t>
-            </a:r>
-          </a:p>
-          <a:p>
-            <a:r>
-              <a:rPr lang="en-US" dirty="0"/>
-              <a:t>4.1.4	The test engine shall not require changing and recompiling the program each time a test is run.</a:t>
-            </a:r>
-          </a:p>
-          <a:p>
-            <a:r>
-              <a:rPr lang="en-US" dirty="0"/>
-              <a:t>4.1.5	The system shall have two user interfaces – a </a:t>
-            </a:r>
-            <a:r>
-              <a:rPr lang="en-US" dirty="0" err="1"/>
-              <a:t>WebUI</a:t>
-            </a:r>
-            <a:r>
-              <a:rPr lang="en-US" dirty="0"/>
-              <a:t> for remote users and a desktop interface 	for locally installed users.</a:t>
-            </a:r>
-          </a:p>
-          <a:p>
-            <a:r>
-              <a:rPr lang="en-US" dirty="0"/>
-              <a:t>4.1.5	The system shall be available on demand remotely via the </a:t>
-            </a:r>
-            <a:r>
-              <a:rPr lang="en-US" dirty="0" err="1"/>
-              <a:t>WebUI</a:t>
-            </a:r>
-            <a:r>
-              <a:rPr lang="en-US" dirty="0"/>
-              <a:t> and locally via the desktop 	interface.</a:t>
+              <a:t>The software developer(s) shall have the ability to run individual unit tests of program code as well as multiple tests simultaneously. They need to be able to stress performance, ensure scalability, and diagnose system interface issues. [0]</a:t>
+            </a:r>
+          </a:p>
+          <a:p>
+            <a:r>
+              <a:rPr lang="en-US" dirty="0"/>
+              <a:t>4.1.1	The test engine shall be an application that can run on the Windows platform. [0]</a:t>
+            </a:r>
+          </a:p>
+          <a:p>
+            <a:r>
+              <a:rPr lang="en-US" dirty="0"/>
+              <a:t>4.1.2	The test engine should run on Linux and Mac platforms. [1]</a:t>
+            </a:r>
+          </a:p>
+          <a:p>
+            <a:r>
+              <a:rPr lang="en-US" dirty="0"/>
+              <a:t>4.1.3	The user shall have the ability to install the test engine on multiple machines (redundancy, performance, latency). [0]</a:t>
+            </a:r>
+          </a:p>
+          <a:p>
+            <a:r>
+              <a:rPr lang="en-US" dirty="0"/>
+              <a:t>4.1.4	The test engine shall not require changing and recompiling the program each time a test is run. 	[0]</a:t>
+            </a:r>
+          </a:p>
+          <a:p>
+            <a:r>
+              <a:rPr lang="en-US" dirty="0"/>
+              <a:t>4.1.5	The system shall have a desktop interface for locally installed users. [0]</a:t>
             </a:r>
           </a:p>
           <a:p>
@@ -7598,13 +7593,13 @@
         <p:spPr/>
         <p:txBody>
           <a:bodyPr>
-            <a:normAutofit fontScale="92500" lnSpcReduction="10000"/>
+            <a:normAutofit lnSpcReduction="10000"/>
           </a:bodyPr>
           <a:lstStyle/>
           <a:p>
             <a:r>
               <a:rPr lang="en-US" dirty="0"/>
-              <a:t>4.1.6	The </a:t>
+              <a:t>4.1.6	The system shall have a </a:t>
             </a:r>
             <a:r>
               <a:rPr lang="en-US" dirty="0" err="1"/>
@@ -7612,48 +7607,13 @@
             </a:r>
             <a:r>
               <a:rPr lang="en-US" dirty="0"/>
-              <a:t> and desktop interface shall:</a:t>
-            </a:r>
-          </a:p>
-          <a:p>
-            <a:pPr lvl="1"/>
-            <a:r>
-              <a:rPr lang="en-US" dirty="0"/>
-              <a:t>4.1.6.1	  Display all possible tests and allow the user to select all tests they wish to run.</a:t>
-            </a:r>
-          </a:p>
-          <a:p>
-            <a:pPr lvl="1"/>
-            <a:r>
-              <a:rPr lang="en-US" dirty="0"/>
-              <a:t>4.1.6.2	  Display the selected list of all tests to be run (container object on GUI).</a:t>
-            </a:r>
-          </a:p>
-          <a:p>
-            <a:pPr lvl="1"/>
-            <a:r>
-              <a:rPr lang="en-US" dirty="0"/>
-              <a:t>4.1.6.3	  Show test progress and status on the GUI.</a:t>
-            </a:r>
-          </a:p>
-          <a:p>
-            <a:pPr lvl="1"/>
-            <a:r>
-              <a:rPr lang="en-US" dirty="0"/>
-              <a:t>4.1.6.4	  Display the results of each test in real-time.</a:t>
-            </a:r>
-          </a:p>
-          <a:p>
-            <a:pPr lvl="1"/>
-            <a:r>
-              <a:rPr lang="en-US" dirty="0"/>
-              <a:t>4.1.6.5  Allow the user to specify an output file in which to log the test results.</a:t>
-            </a:r>
-          </a:p>
-          <a:p>
-            <a:r>
-              <a:rPr lang="en-US" dirty="0"/>
-              <a:t>4.1.7	The </a:t>
+              <a:t> for remote users. [1]</a:t>
+            </a:r>
+          </a:p>
+          <a:p>
+            <a:r>
+              <a:rPr lang="en-US" dirty="0"/>
+              <a:t>4.1.7	The system shall be available on demand remotely via the </a:t>
             </a:r>
             <a:r>
               <a:rPr lang="en-US" dirty="0" err="1"/>
@@ -7661,25 +7621,43 @@
             </a:r>
             <a:r>
               <a:rPr lang="en-US" dirty="0"/>
-              <a:t> shall also have the ability to:</a:t>
-            </a:r>
-          </a:p>
-          <a:p>
-            <a:r>
-              <a:rPr lang="en-US" dirty="0"/>
-              <a:t>		4.1.7.1 Execute tests on available clients.</a:t>
-            </a:r>
-          </a:p>
-          <a:p>
-            <a:r>
-              <a:rPr lang="en-US" dirty="0"/>
-              <a:t>		4.1.7.2 Export current and prior test results for specific clients.</a:t>
-            </a:r>
-          </a:p>
-          <a:p>
-            <a:r>
-              <a:rPr lang="en-US" dirty="0"/>
-              <a:t>4.1.8	The application shall log all test results to the output file specified in the GUI.</a:t>
+              <a:t>. [1]</a:t>
+            </a:r>
+          </a:p>
+          <a:p>
+            <a:r>
+              <a:rPr lang="en-US" dirty="0"/>
+              <a:t>4.1.8	The desktop interface shall:</a:t>
+            </a:r>
+          </a:p>
+          <a:p>
+            <a:r>
+              <a:rPr lang="en-US" dirty="0"/>
+              <a:t>4.1.8.1	Display all possible tests and allow the user to select all tests they wish to run. 			[0]</a:t>
+            </a:r>
+          </a:p>
+          <a:p>
+            <a:r>
+              <a:rPr lang="en-US" dirty="0"/>
+              <a:t>4.1.8.2	Display the selected list of all tests to be run (container object on GUI). [0]</a:t>
+            </a:r>
+          </a:p>
+          <a:p>
+            <a:r>
+              <a:rPr lang="en-US" dirty="0"/>
+              <a:t>4.1.8.3	Show test progress and status on the GUI. [0]</a:t>
+            </a:r>
+          </a:p>
+          <a:p>
+            <a:r>
+              <a:rPr lang="en-US" dirty="0"/>
+              <a:t>4.1.8.4	Display the results of each test in real-time. [1]</a:t>
+            </a:r>
+          </a:p>
+          <a:p>
+            <a:r>
+              <a:rPr lang="en-US" dirty="0"/>
+              <a:t>4.1.8.5	Allow the user to specify an output file in which to log the test results. [1]</a:t>
             </a:r>
           </a:p>
           <a:p>
@@ -7749,12 +7727,7 @@
             <p:ph idx="1"/>
           </p:nvPr>
         </p:nvSpPr>
-        <p:spPr>
-          <a:xfrm>
-            <a:off x="677334" y="1380227"/>
-            <a:ext cx="8596668" cy="4661136"/>
-          </a:xfrm>
-        </p:spPr>
+        <p:spPr/>
         <p:txBody>
           <a:bodyPr>
             <a:normAutofit fontScale="92500" lnSpcReduction="20000"/>
@@ -7762,62 +7735,64 @@
           <a:lstStyle/>
           <a:p>
             <a:r>
-              <a:rPr lang="en-US" b="1" dirty="0"/>
-              <a:t>4.2 	User Requirement 2: Logging and Results Viewing</a:t>
-            </a:r>
-          </a:p>
-          <a:p>
-            <a:r>
-              <a:rPr lang="en-US" dirty="0"/>
-              <a:t>The Software / System Architect(s) shall have the ability to view the results of the test as each test completes. He/she shall also have the ability to view the log files where all results and relevant output are stored.</a:t>
-            </a:r>
-          </a:p>
-          <a:p>
-            <a:r>
-              <a:rPr lang="en-US" dirty="0"/>
-              <a:t>4.2.1	The system shall handle exceptions thrown by the application during testing with clear user 	output.</a:t>
-            </a:r>
-          </a:p>
-          <a:p>
-            <a:r>
-              <a:rPr lang="en-US" dirty="0"/>
-              <a:t>4.2.2	The system shall display whether each test failed or succeeded.</a:t>
-            </a:r>
-          </a:p>
-          <a:p>
-            <a:r>
-              <a:rPr lang="en-US" dirty="0"/>
-              <a:t>4.2.3	The log component shall show different levels of logging (INFO, DEBUG, ERROR).</a:t>
-            </a:r>
-          </a:p>
-          <a:p>
-            <a:r>
-              <a:rPr lang="en-US" dirty="0"/>
-              <a:t>4.2.3.1	INFO shall describe specific information for test pass/fail reporting.</a:t>
-            </a:r>
-          </a:p>
-          <a:p>
-            <a:r>
-              <a:rPr lang="en-US" dirty="0"/>
-              <a:t>4.2.3.2	DEBUG shall describe information provided by the programmer/developer to aid in debugging the test.</a:t>
-            </a:r>
-          </a:p>
-          <a:p>
-            <a:r>
-              <a:rPr lang="en-US" dirty="0"/>
-              <a:t>4.2.3.3	ERROR shall describe the most detailed debugging output for examination of software test failures.</a:t>
-            </a:r>
-          </a:p>
-          <a:p>
-            <a:r>
-              <a:rPr lang="en-US" dirty="0"/>
-              <a:t>4.2.4	The log shall display the time and date stamp for each test.</a:t>
-            </a:r>
-          </a:p>
-          <a:p>
-            <a:r>
-              <a:rPr lang="en-US" dirty="0"/>
-              <a:t>4.2.5	The log shall display the duration of each test.</a:t>
+              <a:rPr lang="en-US" dirty="0"/>
+              <a:t>4.1.9	The </a:t>
+            </a:r>
+            <a:r>
+              <a:rPr lang="en-US" dirty="0" err="1"/>
+              <a:t>WebUI</a:t>
+            </a:r>
+            <a:r>
+              <a:rPr lang="en-US" dirty="0"/>
+              <a:t> shall:</a:t>
+            </a:r>
+          </a:p>
+          <a:p>
+            <a:r>
+              <a:rPr lang="en-US" dirty="0"/>
+              <a:t>4.1.9.1	Display all possible tests and allow the user to select all tests they wish to run. 			[1]</a:t>
+            </a:r>
+          </a:p>
+          <a:p>
+            <a:r>
+              <a:rPr lang="en-US" dirty="0"/>
+              <a:t>4.1.9.2	Display the selected list of all tests to be run (container object on GUI). [1]</a:t>
+            </a:r>
+          </a:p>
+          <a:p>
+            <a:r>
+              <a:rPr lang="en-US" dirty="0"/>
+              <a:t>4.1.9.3	Show test progress and status on the GUI. [1]</a:t>
+            </a:r>
+          </a:p>
+          <a:p>
+            <a:r>
+              <a:rPr lang="en-US" dirty="0"/>
+              <a:t>4.1.9.4	Display the results of each test in real-time. [2]</a:t>
+            </a:r>
+          </a:p>
+          <a:p>
+            <a:r>
+              <a:rPr lang="en-US" dirty="0"/>
+              <a:t>4.1.9.5	Allow the user to specify an output file in which to log the test results. [2]</a:t>
+            </a:r>
+          </a:p>
+          <a:p>
+            <a:r>
+              <a:rPr lang="en-US" dirty="0"/>
+              <a:t>              	       4.1.9.1	 Execute tests on available clients. [1]</a:t>
+            </a:r>
+          </a:p>
+          <a:p>
+            <a:r>
+              <a:rPr lang="en-US" dirty="0"/>
+              <a:t>	       4.1.9.2	 Export current and prior test results for specific clients. [2]</a:t>
+            </a:r>
+          </a:p>
+          <a:p>
+            <a:r>
+              <a:rPr lang="en-US" dirty="0"/>
+              <a:t>4.1.10	The application shall log all test results to the output file specified in the GUI. [0]</a:t>
             </a:r>
           </a:p>
           <a:p>
@@ -7828,7 +7803,7 @@
     </p:spTree>
     <p:extLst>
       <p:ext uri="{BB962C8B-B14F-4D97-AF65-F5344CB8AC3E}">
-        <p14:creationId xmlns:p14="http://schemas.microsoft.com/office/powerpoint/2010/main" val="142538623"/>
+        <p14:creationId xmlns:p14="http://schemas.microsoft.com/office/powerpoint/2010/main" val="862683440"/>
       </p:ext>
     </p:extLst>
   </p:cSld>
@@ -7887,6 +7862,144 @@
             <p:ph idx="1"/>
           </p:nvPr>
         </p:nvSpPr>
+        <p:spPr>
+          <a:xfrm>
+            <a:off x="677334" y="1380227"/>
+            <a:ext cx="8596668" cy="4661136"/>
+          </a:xfrm>
+        </p:spPr>
+        <p:txBody>
+          <a:bodyPr>
+            <a:normAutofit fontScale="92500" lnSpcReduction="20000"/>
+          </a:bodyPr>
+          <a:lstStyle/>
+          <a:p>
+            <a:r>
+              <a:rPr lang="en-US" b="1" dirty="0"/>
+              <a:t>4.2 	User Requirement 2: Logging and Results Viewing</a:t>
+            </a:r>
+          </a:p>
+          <a:p>
+            <a:r>
+              <a:rPr lang="en-US" dirty="0"/>
+              <a:t>The Software / System Architect(s) shall have the ability to view the results of the test as each test completes. He/she shall also have the ability to view the log files where all results and relevant output are stored. [0]</a:t>
+            </a:r>
+          </a:p>
+          <a:p>
+            <a:r>
+              <a:rPr lang="en-US" dirty="0"/>
+              <a:t>4.2.1	The system shall handle exceptions thrown by the application during testing with clear user 	output. [0]</a:t>
+            </a:r>
+          </a:p>
+          <a:p>
+            <a:r>
+              <a:rPr lang="en-US" dirty="0"/>
+              <a:t>4.2.2	The system shall display whether each test failed or succeeded. [0]</a:t>
+            </a:r>
+          </a:p>
+          <a:p>
+            <a:r>
+              <a:rPr lang="en-US" dirty="0"/>
+              <a:t>4.2.3	The log component shall show different levels of logging (INFO, DEBUG, ERROR). [1]</a:t>
+            </a:r>
+          </a:p>
+          <a:p>
+            <a:r>
+              <a:rPr lang="en-US" dirty="0"/>
+              <a:t>4.2.3.1	INFO shall describe specific information for test pass/fail reporting.</a:t>
+            </a:r>
+          </a:p>
+          <a:p>
+            <a:r>
+              <a:rPr lang="en-US" dirty="0"/>
+              <a:t>4.2.3.2	DEBUG shall describe information provided by the programmer/developer to aid in debugging the test.</a:t>
+            </a:r>
+          </a:p>
+          <a:p>
+            <a:r>
+              <a:rPr lang="en-US" dirty="0"/>
+              <a:t>4.2.3.3	ERROR shall describe the most detailed debugging output for examination of software test failures.</a:t>
+            </a:r>
+          </a:p>
+          <a:p>
+            <a:r>
+              <a:rPr lang="en-US" dirty="0"/>
+              <a:t>4.2.4	The log shall display the time and date stamp for each test. [1]</a:t>
+            </a:r>
+          </a:p>
+          <a:p>
+            <a:r>
+              <a:rPr lang="en-US" dirty="0"/>
+              <a:t>4.2.5	The log shall display the duration of each test. [1]</a:t>
+            </a:r>
+          </a:p>
+          <a:p>
+            <a:endParaRPr lang="en-US" dirty="0"/>
+          </a:p>
+        </p:txBody>
+      </p:sp>
+    </p:spTree>
+    <p:extLst>
+      <p:ext uri="{BB962C8B-B14F-4D97-AF65-F5344CB8AC3E}">
+        <p14:creationId xmlns:p14="http://schemas.microsoft.com/office/powerpoint/2010/main" val="142538623"/>
+      </p:ext>
+    </p:extLst>
+  </p:cSld>
+  <p:clrMapOvr>
+    <a:masterClrMapping/>
+  </p:clrMapOvr>
+</p:sld>
+</file>
+
+<file path=ppt/slides/slide27.xml><?xml version="1.0" encoding="utf-8"?>
+<p:sld xmlns:a="http://schemas.openxmlformats.org/drawingml/2006/main" xmlns:r="http://schemas.openxmlformats.org/officeDocument/2006/relationships" xmlns:p="http://schemas.openxmlformats.org/presentationml/2006/main">
+  <p:cSld>
+    <p:spTree>
+      <p:nvGrpSpPr>
+        <p:cNvPr id="1" name=""/>
+        <p:cNvGrpSpPr/>
+        <p:nvPr/>
+      </p:nvGrpSpPr>
+      <p:grpSpPr>
+        <a:xfrm>
+          <a:off x="0" y="0"/>
+          <a:ext cx="0" cy="0"/>
+          <a:chOff x="0" y="0"/>
+          <a:chExt cx="0" cy="0"/>
+        </a:xfrm>
+      </p:grpSpPr>
+      <p:sp>
+        <p:nvSpPr>
+          <p:cNvPr id="2" name="Title 1"/>
+          <p:cNvSpPr>
+            <a:spLocks noGrp="1"/>
+          </p:cNvSpPr>
+          <p:nvPr>
+            <p:ph type="title"/>
+          </p:nvPr>
+        </p:nvSpPr>
+        <p:spPr/>
+        <p:txBody>
+          <a:bodyPr/>
+          <a:lstStyle/>
+          <a:p>
+            <a:r>
+              <a:rPr lang="en-US" dirty="0"/>
+              <a:t>User Requirements</a:t>
+            </a:r>
+          </a:p>
+        </p:txBody>
+      </p:sp>
+      <p:sp>
+        <p:nvSpPr>
+          <p:cNvPr id="3" name="Content Placeholder 2"/>
+          <p:cNvSpPr>
+            <a:spLocks noGrp="1"/>
+          </p:cNvSpPr>
+          <p:nvPr>
+            <p:ph idx="1"/>
+          </p:nvPr>
+        </p:nvSpPr>
         <p:spPr/>
         <p:txBody>
           <a:bodyPr/>
@@ -7900,19 +8013,19 @@
           <a:p>
             <a:r>
               <a:rPr lang="en-US" dirty="0"/>
-              <a:t>Test Engineers and QA personnel shall have the ability to provide a test case where several tests are sent in quick succession to demonstrate the application executes tests concurrently.</a:t>
-            </a:r>
-          </a:p>
-          <a:p>
-            <a:r>
-              <a:rPr lang="en-US" dirty="0"/>
-              <a:t>4.3.1	The test case shall consist of several tests of varying duration that can run simultaneously.</a:t>
-            </a:r>
-          </a:p>
-          <a:p>
-            <a:r>
-              <a:rPr lang="en-US" dirty="0"/>
-              <a:t>4.3.2	Upon completion, the system shall post a ready status message and await the next test.</a:t>
+              <a:t>Test Engineers and QA personnel shall have the ability to provide a test case where several tests are sent in quick succession to demonstrate the application executes tests concurrently. [0]</a:t>
+            </a:r>
+          </a:p>
+          <a:p>
+            <a:r>
+              <a:rPr lang="en-US" dirty="0"/>
+              <a:t>4.3.1	The test case shall consist of several tests of varying duration that can run simultaneously. [0]</a:t>
+            </a:r>
+          </a:p>
+          <a:p>
+            <a:r>
+              <a:rPr lang="en-US" dirty="0"/>
+              <a:t>4.3.2	Upon completion, the system shall post a ready status message and await the next test. [0]</a:t>
             </a:r>
           </a:p>
           <a:p>
@@ -8266,7 +8379,7 @@
           <p:cNvPr id="6" name="Picture 5">
             <a:extLst>
               <a:ext uri="{FF2B5EF4-FFF2-40B4-BE49-F238E27FC236}">
-                <a16:creationId xmlns:a16="http://schemas.microsoft.com/office/drawing/2014/main" xmlns="" id="{42F62902-0B99-45F6-8313-405C7CFCB586}"/>
+                <a16:creationId xmlns="" xmlns:a16="http://schemas.microsoft.com/office/drawing/2014/main" id="{42F62902-0B99-45F6-8313-405C7CFCB586}"/>
               </a:ext>
             </a:extLst>
           </p:cNvPr>

</xml_diff>

<commit_message>
Move overview slide up one; i.e. before descriptions. Add local execution, non-web/cloud, bullet point.
</commit_message>
<xml_diff>
--- a/Test Framework Midterm Presentation 001.pptx
+++ b/Test Framework Midterm Presentation 001.pptx
@@ -8,8 +8,8 @@
     <p:sldId id="256" r:id="rId2"/>
     <p:sldId id="257" r:id="rId3"/>
     <p:sldId id="258" r:id="rId4"/>
-    <p:sldId id="260" r:id="rId5"/>
-    <p:sldId id="259" r:id="rId6"/>
+    <p:sldId id="259" r:id="rId5"/>
+    <p:sldId id="260" r:id="rId6"/>
     <p:sldId id="261" r:id="rId7"/>
     <p:sldId id="268" r:id="rId8"/>
     <p:sldId id="275" r:id="rId9"/>
@@ -884,7 +884,7 @@
             <a:fld id="{B61BEF0D-F0BB-DE4B-95CE-6DB70DBA9567}" type="datetimeFigureOut">
               <a:rPr lang="en-US" dirty="0"/>
               <a:pPr/>
-              <a:t>8/9/2020</a:t>
+              <a:t>8/11/2020</a:t>
             </a:fld>
             <a:endParaRPr lang="en-US" dirty="0"/>
           </a:p>
@@ -1132,7 +1132,7 @@
             <a:fld id="{B61BEF0D-F0BB-DE4B-95CE-6DB70DBA9567}" type="datetimeFigureOut">
               <a:rPr lang="en-US" dirty="0"/>
               <a:pPr/>
-              <a:t>8/9/2020</a:t>
+              <a:t>8/11/2020</a:t>
             </a:fld>
             <a:endParaRPr lang="en-US" dirty="0"/>
           </a:p>
@@ -1443,7 +1443,7 @@
             <a:fld id="{B61BEF0D-F0BB-DE4B-95CE-6DB70DBA9567}" type="datetimeFigureOut">
               <a:rPr lang="en-US" dirty="0"/>
               <a:pPr/>
-              <a:t>8/9/2020</a:t>
+              <a:t>8/11/2020</a:t>
             </a:fld>
             <a:endParaRPr lang="en-US" dirty="0"/>
           </a:p>
@@ -1773,7 +1773,7 @@
             <a:fld id="{B61BEF0D-F0BB-DE4B-95CE-6DB70DBA9567}" type="datetimeFigureOut">
               <a:rPr lang="en-US" dirty="0"/>
               <a:pPr/>
-              <a:t>8/9/2020</a:t>
+              <a:t>8/11/2020</a:t>
             </a:fld>
             <a:endParaRPr lang="en-US" dirty="0"/>
           </a:p>
@@ -2084,7 +2084,7 @@
             <a:fld id="{B61BEF0D-F0BB-DE4B-95CE-6DB70DBA9567}" type="datetimeFigureOut">
               <a:rPr lang="en-US" dirty="0"/>
               <a:pPr/>
-              <a:t>8/9/2020</a:t>
+              <a:t>8/11/2020</a:t>
             </a:fld>
             <a:endParaRPr lang="en-US" dirty="0"/>
           </a:p>
@@ -2474,7 +2474,7 @@
             <a:fld id="{B61BEF0D-F0BB-DE4B-95CE-6DB70DBA9567}" type="datetimeFigureOut">
               <a:rPr lang="en-US" dirty="0"/>
               <a:pPr/>
-              <a:t>8/9/2020</a:t>
+              <a:t>8/11/2020</a:t>
             </a:fld>
             <a:endParaRPr lang="en-US" dirty="0"/>
           </a:p>
@@ -2640,7 +2640,7 @@
           <a:p>
             <a:fld id="{55C6B4A9-1611-4792-9094-5F34BCA07E0B}" type="datetimeFigureOut">
               <a:rPr lang="en-US" dirty="0"/>
-              <a:t>8/9/2020</a:t>
+              <a:t>8/11/2020</a:t>
             </a:fld>
             <a:endParaRPr lang="en-US" dirty="0"/>
           </a:p>
@@ -2816,7 +2816,7 @@
             <a:fld id="{B61BEF0D-F0BB-DE4B-95CE-6DB70DBA9567}" type="datetimeFigureOut">
               <a:rPr lang="en-US" dirty="0"/>
               <a:pPr/>
-              <a:t>8/9/2020</a:t>
+              <a:t>8/11/2020</a:t>
             </a:fld>
             <a:endParaRPr lang="en-US" dirty="0"/>
           </a:p>
@@ -2982,7 +2982,7 @@
           <a:p>
             <a:fld id="{42A54C80-263E-416B-A8E0-580EDEADCBDC}" type="datetimeFigureOut">
               <a:rPr lang="en-US" dirty="0"/>
-              <a:t>8/9/2020</a:t>
+              <a:t>8/11/2020</a:t>
             </a:fld>
             <a:endParaRPr lang="en-US" dirty="0"/>
           </a:p>
@@ -3225,7 +3225,7 @@
             <a:fld id="{B61BEF0D-F0BB-DE4B-95CE-6DB70DBA9567}" type="datetimeFigureOut">
               <a:rPr lang="en-US" dirty="0"/>
               <a:pPr/>
-              <a:t>8/9/2020</a:t>
+              <a:t>8/11/2020</a:t>
             </a:fld>
             <a:endParaRPr lang="en-US" dirty="0"/>
           </a:p>
@@ -3453,7 +3453,7 @@
           <a:p>
             <a:fld id="{42A54C80-263E-416B-A8E0-580EDEADCBDC}" type="datetimeFigureOut">
               <a:rPr lang="en-US" dirty="0"/>
-              <a:t>8/9/2020</a:t>
+              <a:t>8/11/2020</a:t>
             </a:fld>
             <a:endParaRPr lang="en-US" dirty="0"/>
           </a:p>
@@ -3823,7 +3823,7 @@
             <a:fld id="{B61BEF0D-F0BB-DE4B-95CE-6DB70DBA9567}" type="datetimeFigureOut">
               <a:rPr lang="en-US" dirty="0"/>
               <a:pPr/>
-              <a:t>8/9/2020</a:t>
+              <a:t>8/11/2020</a:t>
             </a:fld>
             <a:endParaRPr lang="en-US" dirty="0"/>
           </a:p>
@@ -3943,7 +3943,7 @@
             <a:fld id="{B61BEF0D-F0BB-DE4B-95CE-6DB70DBA9567}" type="datetimeFigureOut">
               <a:rPr lang="en-US" dirty="0"/>
               <a:pPr/>
-              <a:t>8/9/2020</a:t>
+              <a:t>8/11/2020</a:t>
             </a:fld>
             <a:endParaRPr lang="en-US" dirty="0"/>
           </a:p>
@@ -4035,7 +4035,7 @@
             <a:fld id="{B61BEF0D-F0BB-DE4B-95CE-6DB70DBA9567}" type="datetimeFigureOut">
               <a:rPr lang="en-US" dirty="0"/>
               <a:pPr/>
-              <a:t>8/9/2020</a:t>
+              <a:t>8/11/2020</a:t>
             </a:fld>
             <a:endParaRPr lang="en-US" dirty="0"/>
           </a:p>
@@ -4286,7 +4286,7 @@
           <a:p>
             <a:fld id="{42A54C80-263E-416B-A8E0-580EDEADCBDC}" type="datetimeFigureOut">
               <a:rPr lang="en-US" dirty="0"/>
-              <a:t>8/9/2020</a:t>
+              <a:t>8/11/2020</a:t>
             </a:fld>
             <a:endParaRPr lang="en-US" dirty="0"/>
           </a:p>
@@ -4588,7 +4588,7 @@
             <a:fld id="{B61BEF0D-F0BB-DE4B-95CE-6DB70DBA9567}" type="datetimeFigureOut">
               <a:rPr lang="en-US" dirty="0"/>
               <a:pPr/>
-              <a:t>8/9/2020</a:t>
+              <a:t>8/11/2020</a:t>
             </a:fld>
             <a:endParaRPr lang="en-US" dirty="0"/>
           </a:p>
@@ -5286,7 +5286,7 @@
             <a:fld id="{B61BEF0D-F0BB-DE4B-95CE-6DB70DBA9567}" type="datetimeFigureOut">
               <a:rPr lang="en-US" dirty="0"/>
               <a:pPr/>
-              <a:t>8/9/2020</a:t>
+              <a:t>8/11/2020</a:t>
             </a:fld>
             <a:endParaRPr lang="en-US" dirty="0"/>
           </a:p>
@@ -6627,7 +6627,7 @@
           <p:cNvPr id="9" name="Picture 8">
             <a:extLst>
               <a:ext uri="{FF2B5EF4-FFF2-40B4-BE49-F238E27FC236}">
-                <a16:creationId xmlns="" xmlns:a16="http://schemas.microsoft.com/office/drawing/2014/main" id="{3AA46D10-FDAD-4FDF-879C-3D7BDBD38A0C}"/>
+                <a16:creationId xmlns:a16="http://schemas.microsoft.com/office/drawing/2014/main" id="{3AA46D10-FDAD-4FDF-879C-3D7BDBD38A0C}"/>
               </a:ext>
             </a:extLst>
           </p:cNvPr>
@@ -6657,7 +6657,7 @@
           <p:cNvPr id="11" name="Picture 10">
             <a:extLst>
               <a:ext uri="{FF2B5EF4-FFF2-40B4-BE49-F238E27FC236}">
-                <a16:creationId xmlns="" xmlns:a16="http://schemas.microsoft.com/office/drawing/2014/main" id="{199F2A54-2DBF-4AD1-89D0-FCBED4D40BAD}"/>
+                <a16:creationId xmlns:a16="http://schemas.microsoft.com/office/drawing/2014/main" id="{199F2A54-2DBF-4AD1-89D0-FCBED4D40BAD}"/>
               </a:ext>
             </a:extLst>
           </p:cNvPr>
@@ -6687,7 +6687,7 @@
           <p:cNvPr id="13" name="Picture 12">
             <a:extLst>
               <a:ext uri="{FF2B5EF4-FFF2-40B4-BE49-F238E27FC236}">
-                <a16:creationId xmlns="" xmlns:a16="http://schemas.microsoft.com/office/drawing/2014/main" id="{1F923096-7DC3-4570-86BE-53B9C19BBBCC}"/>
+                <a16:creationId xmlns:a16="http://schemas.microsoft.com/office/drawing/2014/main" id="{1F923096-7DC3-4570-86BE-53B9C19BBBCC}"/>
               </a:ext>
             </a:extLst>
           </p:cNvPr>
@@ -6769,7 +6769,7 @@
           <p:cNvPr id="5" name="Picture 4">
             <a:extLst>
               <a:ext uri="{FF2B5EF4-FFF2-40B4-BE49-F238E27FC236}">
-                <a16:creationId xmlns="" xmlns:a16="http://schemas.microsoft.com/office/drawing/2014/main" id="{13B04C9D-E45A-4DE2-AF80-B1367C691FAE}"/>
+                <a16:creationId xmlns:a16="http://schemas.microsoft.com/office/drawing/2014/main" id="{13B04C9D-E45A-4DE2-AF80-B1367C691FAE}"/>
               </a:ext>
             </a:extLst>
           </p:cNvPr>
@@ -6851,7 +6851,7 @@
           <p:cNvPr id="5" name="Picture 4">
             <a:extLst>
               <a:ext uri="{FF2B5EF4-FFF2-40B4-BE49-F238E27FC236}">
-                <a16:creationId xmlns="" xmlns:a16="http://schemas.microsoft.com/office/drawing/2014/main" id="{C9AEC1BA-FA4A-4D68-9D25-D43E9CFFC02C}"/>
+                <a16:creationId xmlns:a16="http://schemas.microsoft.com/office/drawing/2014/main" id="{C9AEC1BA-FA4A-4D68-9D25-D43E9CFFC02C}"/>
               </a:ext>
             </a:extLst>
           </p:cNvPr>
@@ -6881,7 +6881,7 @@
           <p:cNvPr id="9" name="Picture 8">
             <a:extLst>
               <a:ext uri="{FF2B5EF4-FFF2-40B4-BE49-F238E27FC236}">
-                <a16:creationId xmlns="" xmlns:a16="http://schemas.microsoft.com/office/drawing/2014/main" id="{B50AD3E8-FD4C-4543-9C8F-D6BCED40866F}"/>
+                <a16:creationId xmlns:a16="http://schemas.microsoft.com/office/drawing/2014/main" id="{B50AD3E8-FD4C-4543-9C8F-D6BCED40866F}"/>
               </a:ext>
             </a:extLst>
           </p:cNvPr>
@@ -7244,11 +7244,7 @@
           <a:p>
             <a:r>
               <a:rPr lang="en-US" dirty="0"/>
-              <a:t>	</a:t>
-            </a:r>
-            <a:r>
-              <a:rPr lang="en-US" dirty="0"/>
-              <a:t>The system shall support 24/7 availability. Routine downtime in a particular region necessary for 	maintenance or enhancement to the system shall take place after 21:00 EST on Saturday 	and shall end before 23:00 EST on Sunday. [1]</a:t>
+              <a:t>	The system shall support 24/7 availability. Routine downtime in a particular region necessary for 	maintenance or enhancement to the system shall take place after 21:00 EST on Saturday 	and shall end before 23:00 EST on Sunday. [1]</a:t>
             </a:r>
           </a:p>
           <a:p>
@@ -7369,11 +7365,7 @@
           <a:p>
             <a:r>
               <a:rPr lang="en-US" dirty="0"/>
-              <a:t>	</a:t>
-            </a:r>
-            <a:r>
-              <a:rPr lang="en-US" dirty="0"/>
-              <a:t>The system shall support high availability by being quickly accessible to users attempting to 	access it from any geographic region. [1]</a:t>
+              <a:t>	The system shall support high availability by being quickly accessible to users attempting to 	access it from any geographic region. [1]</a:t>
             </a:r>
           </a:p>
           <a:p>
@@ -7391,15 +7383,7 @@
           <a:p>
             <a:r>
               <a:rPr lang="en-US" dirty="0"/>
-              <a:t>3.3.3	The system shall maintain all program code in scripts that can be deployed to the cloud platform. </a:t>
-            </a:r>
-            <a:r>
-              <a:rPr lang="en-US" dirty="0" smtClean="0"/>
-              <a:t>[</a:t>
-            </a:r>
-            <a:r>
-              <a:rPr lang="en-US" dirty="0"/>
-              <a:t>1]</a:t>
+              <a:t>3.3.3	The system shall maintain all program code in scripts that can be deployed to the cloud platform. [1]</a:t>
             </a:r>
           </a:p>
           <a:p>
@@ -8108,6 +8092,12 @@
           <a:p>
             <a:r>
               <a:rPr lang="en-US" dirty="0"/>
+              <a:t>Ability to run locally; i.e. sans web / cloud hosted.</a:t>
+            </a:r>
+          </a:p>
+          <a:p>
+            <a:r>
+              <a:rPr lang="en-US" dirty="0"/>
               <a:t>Can test multiple program modules or blocks of program code simultaneously.</a:t>
             </a:r>
           </a:p>
@@ -8189,197 +8179,12 @@
           </a:p>
         </p:txBody>
       </p:sp>
-      <p:sp>
-        <p:nvSpPr>
-          <p:cNvPr id="3" name="Content Placeholder 2"/>
-          <p:cNvSpPr>
-            <a:spLocks noGrp="1"/>
-          </p:cNvSpPr>
-          <p:nvPr>
-            <p:ph idx="1"/>
-          </p:nvPr>
-        </p:nvSpPr>
-        <p:spPr>
-          <a:xfrm>
-            <a:off x="677334" y="1397479"/>
-            <a:ext cx="8596668" cy="4942936"/>
-          </a:xfrm>
-        </p:spPr>
-        <p:txBody>
-          <a:bodyPr>
-            <a:normAutofit fontScale="85000" lnSpcReduction="20000"/>
-          </a:bodyPr>
-          <a:lstStyle/>
-          <a:p>
-            <a:pPr marL="0" indent="0">
-              <a:buNone/>
-            </a:pPr>
-            <a:r>
-              <a:rPr lang="en-US" dirty="0"/>
-              <a:t>The key components are:</a:t>
-            </a:r>
-          </a:p>
-          <a:p>
-            <a:r>
-              <a:rPr lang="en-US" dirty="0"/>
-              <a:t>Users</a:t>
-            </a:r>
-          </a:p>
-          <a:p>
-            <a:pPr lvl="1"/>
-            <a:r>
-              <a:rPr lang="en-US" dirty="0"/>
-              <a:t>Local User</a:t>
-            </a:r>
-          </a:p>
-          <a:p>
-            <a:pPr lvl="1"/>
-            <a:r>
-              <a:rPr lang="en-US" dirty="0"/>
-              <a:t>Remote User</a:t>
-            </a:r>
-          </a:p>
-          <a:p>
-            <a:pPr marL="457200" lvl="1" indent="0">
-              <a:buNone/>
-            </a:pPr>
-            <a:endParaRPr lang="en-US" dirty="0"/>
-          </a:p>
-          <a:p>
-            <a:r>
-              <a:rPr lang="en-US" dirty="0"/>
-              <a:t>Web User Interface</a:t>
-            </a:r>
-          </a:p>
-          <a:p>
-            <a:pPr marL="0" indent="0">
-              <a:buNone/>
-            </a:pPr>
-            <a:endParaRPr lang="en-US" dirty="0"/>
-          </a:p>
-          <a:p>
-            <a:r>
-              <a:rPr lang="en-US" dirty="0"/>
-              <a:t>Test Server</a:t>
-            </a:r>
-          </a:p>
-          <a:p>
-            <a:pPr lvl="1"/>
-            <a:r>
-              <a:rPr lang="en-US" dirty="0"/>
-              <a:t>Test Server</a:t>
-            </a:r>
-          </a:p>
-          <a:p>
-            <a:pPr lvl="1"/>
-            <a:r>
-              <a:rPr lang="en-US" dirty="0"/>
-              <a:t>Database</a:t>
-            </a:r>
-          </a:p>
-          <a:p>
-            <a:pPr marL="457200" lvl="1" indent="0">
-              <a:buNone/>
-            </a:pPr>
-            <a:endParaRPr lang="en-US" dirty="0"/>
-          </a:p>
-          <a:p>
-            <a:r>
-              <a:rPr lang="en-US" dirty="0"/>
-              <a:t>Test System</a:t>
-            </a:r>
-          </a:p>
-          <a:p>
-            <a:pPr lvl="1"/>
-            <a:r>
-              <a:rPr lang="en-US" dirty="0"/>
-              <a:t>Test Engine</a:t>
-            </a:r>
-          </a:p>
-          <a:p>
-            <a:pPr lvl="1"/>
-            <a:r>
-              <a:rPr lang="en-US" dirty="0"/>
-              <a:t>Test Cases</a:t>
-            </a:r>
-          </a:p>
-          <a:p>
-            <a:pPr lvl="1"/>
-            <a:r>
-              <a:rPr lang="en-US" dirty="0"/>
-              <a:t>Desktop User Interface</a:t>
-            </a:r>
-          </a:p>
-          <a:p>
-            <a:pPr lvl="1"/>
-            <a:r>
-              <a:rPr lang="en-US" dirty="0"/>
-              <a:t>Test Results</a:t>
-            </a:r>
-          </a:p>
-          <a:p>
-            <a:endParaRPr lang="en-US" dirty="0"/>
-          </a:p>
-        </p:txBody>
-      </p:sp>
-    </p:spTree>
-    <p:extLst>
-      <p:ext uri="{BB962C8B-B14F-4D97-AF65-F5344CB8AC3E}">
-        <p14:creationId xmlns:p14="http://schemas.microsoft.com/office/powerpoint/2010/main" val="1906326792"/>
-      </p:ext>
-    </p:extLst>
-  </p:cSld>
-  <p:clrMapOvr>
-    <a:masterClrMapping/>
-  </p:clrMapOvr>
-</p:sld>
-</file>
-
-<file path=ppt/slides/slide5.xml><?xml version="1.0" encoding="utf-8"?>
-<p:sld xmlns:a="http://schemas.openxmlformats.org/drawingml/2006/main" xmlns:r="http://schemas.openxmlformats.org/officeDocument/2006/relationships" xmlns:p="http://schemas.openxmlformats.org/presentationml/2006/main">
-  <p:cSld>
-    <p:spTree>
-      <p:nvGrpSpPr>
-        <p:cNvPr id="1" name=""/>
-        <p:cNvGrpSpPr/>
-        <p:nvPr/>
-      </p:nvGrpSpPr>
-      <p:grpSpPr>
-        <a:xfrm>
-          <a:off x="0" y="0"/>
-          <a:ext cx="0" cy="0"/>
-          <a:chOff x="0" y="0"/>
-          <a:chExt cx="0" cy="0"/>
-        </a:xfrm>
-      </p:grpSpPr>
-      <p:sp>
-        <p:nvSpPr>
-          <p:cNvPr id="2" name="Title 1"/>
-          <p:cNvSpPr>
-            <a:spLocks noGrp="1"/>
-          </p:cNvSpPr>
-          <p:nvPr>
-            <p:ph type="title"/>
-          </p:nvPr>
-        </p:nvSpPr>
-        <p:spPr/>
-        <p:txBody>
-          <a:bodyPr/>
-          <a:lstStyle/>
-          <a:p>
-            <a:r>
-              <a:rPr lang="en-US" dirty="0"/>
-              <a:t>System Overview</a:t>
-            </a:r>
-          </a:p>
-        </p:txBody>
-      </p:sp>
       <p:pic>
         <p:nvPicPr>
           <p:cNvPr id="6" name="Picture 5">
             <a:extLst>
               <a:ext uri="{FF2B5EF4-FFF2-40B4-BE49-F238E27FC236}">
-                <a16:creationId xmlns="" xmlns:a16="http://schemas.microsoft.com/office/drawing/2014/main" id="{42F62902-0B99-45F6-8313-405C7CFCB586}"/>
+                <a16:creationId xmlns:a16="http://schemas.microsoft.com/office/drawing/2014/main" id="{42F62902-0B99-45F6-8313-405C7CFCB586}"/>
               </a:ext>
             </a:extLst>
           </p:cNvPr>
@@ -8417,6 +8222,191 @@
 </p:sld>
 </file>
 
+<file path=ppt/slides/slide5.xml><?xml version="1.0" encoding="utf-8"?>
+<p:sld xmlns:a="http://schemas.openxmlformats.org/drawingml/2006/main" xmlns:r="http://schemas.openxmlformats.org/officeDocument/2006/relationships" xmlns:p="http://schemas.openxmlformats.org/presentationml/2006/main">
+  <p:cSld>
+    <p:spTree>
+      <p:nvGrpSpPr>
+        <p:cNvPr id="1" name=""/>
+        <p:cNvGrpSpPr/>
+        <p:nvPr/>
+      </p:nvGrpSpPr>
+      <p:grpSpPr>
+        <a:xfrm>
+          <a:off x="0" y="0"/>
+          <a:ext cx="0" cy="0"/>
+          <a:chOff x="0" y="0"/>
+          <a:chExt cx="0" cy="0"/>
+        </a:xfrm>
+      </p:grpSpPr>
+      <p:sp>
+        <p:nvSpPr>
+          <p:cNvPr id="2" name="Title 1"/>
+          <p:cNvSpPr>
+            <a:spLocks noGrp="1"/>
+          </p:cNvSpPr>
+          <p:nvPr>
+            <p:ph type="title"/>
+          </p:nvPr>
+        </p:nvSpPr>
+        <p:spPr/>
+        <p:txBody>
+          <a:bodyPr/>
+          <a:lstStyle/>
+          <a:p>
+            <a:r>
+              <a:rPr lang="en-US" dirty="0"/>
+              <a:t>System Overview</a:t>
+            </a:r>
+          </a:p>
+        </p:txBody>
+      </p:sp>
+      <p:sp>
+        <p:nvSpPr>
+          <p:cNvPr id="3" name="Content Placeholder 2"/>
+          <p:cNvSpPr>
+            <a:spLocks noGrp="1"/>
+          </p:cNvSpPr>
+          <p:nvPr>
+            <p:ph idx="1"/>
+          </p:nvPr>
+        </p:nvSpPr>
+        <p:spPr>
+          <a:xfrm>
+            <a:off x="677334" y="1397479"/>
+            <a:ext cx="8596668" cy="4942936"/>
+          </a:xfrm>
+        </p:spPr>
+        <p:txBody>
+          <a:bodyPr>
+            <a:normAutofit fontScale="85000" lnSpcReduction="20000"/>
+          </a:bodyPr>
+          <a:lstStyle/>
+          <a:p>
+            <a:pPr marL="0" indent="0">
+              <a:buNone/>
+            </a:pPr>
+            <a:r>
+              <a:rPr lang="en-US" dirty="0"/>
+              <a:t>The key components are:</a:t>
+            </a:r>
+          </a:p>
+          <a:p>
+            <a:r>
+              <a:rPr lang="en-US" dirty="0"/>
+              <a:t>Users</a:t>
+            </a:r>
+          </a:p>
+          <a:p>
+            <a:pPr lvl="1"/>
+            <a:r>
+              <a:rPr lang="en-US" dirty="0"/>
+              <a:t>Local User</a:t>
+            </a:r>
+          </a:p>
+          <a:p>
+            <a:pPr lvl="1"/>
+            <a:r>
+              <a:rPr lang="en-US" dirty="0"/>
+              <a:t>Remote User</a:t>
+            </a:r>
+          </a:p>
+          <a:p>
+            <a:pPr marL="457200" lvl="1" indent="0">
+              <a:buNone/>
+            </a:pPr>
+            <a:endParaRPr lang="en-US" dirty="0"/>
+          </a:p>
+          <a:p>
+            <a:r>
+              <a:rPr lang="en-US" dirty="0"/>
+              <a:t>Web User Interface</a:t>
+            </a:r>
+          </a:p>
+          <a:p>
+            <a:pPr marL="0" indent="0">
+              <a:buNone/>
+            </a:pPr>
+            <a:endParaRPr lang="en-US" dirty="0"/>
+          </a:p>
+          <a:p>
+            <a:r>
+              <a:rPr lang="en-US" dirty="0"/>
+              <a:t>Test Server</a:t>
+            </a:r>
+          </a:p>
+          <a:p>
+            <a:pPr lvl="1"/>
+            <a:r>
+              <a:rPr lang="en-US" dirty="0"/>
+              <a:t>Test Server</a:t>
+            </a:r>
+          </a:p>
+          <a:p>
+            <a:pPr lvl="1"/>
+            <a:r>
+              <a:rPr lang="en-US" dirty="0"/>
+              <a:t>Database</a:t>
+            </a:r>
+          </a:p>
+          <a:p>
+            <a:pPr marL="457200" lvl="1" indent="0">
+              <a:buNone/>
+            </a:pPr>
+            <a:endParaRPr lang="en-US" dirty="0"/>
+          </a:p>
+          <a:p>
+            <a:r>
+              <a:rPr lang="en-US" dirty="0"/>
+              <a:t>Test System</a:t>
+            </a:r>
+          </a:p>
+          <a:p>
+            <a:pPr lvl="1"/>
+            <a:r>
+              <a:rPr lang="en-US" dirty="0"/>
+              <a:t>Test Engine</a:t>
+            </a:r>
+          </a:p>
+          <a:p>
+            <a:pPr lvl="1"/>
+            <a:r>
+              <a:rPr lang="en-US" dirty="0"/>
+              <a:t>Test Cases</a:t>
+            </a:r>
+          </a:p>
+          <a:p>
+            <a:pPr lvl="1"/>
+            <a:r>
+              <a:rPr lang="en-US" dirty="0"/>
+              <a:t>Desktop User Interface</a:t>
+            </a:r>
+          </a:p>
+          <a:p>
+            <a:pPr lvl="1"/>
+            <a:r>
+              <a:rPr lang="en-US" dirty="0"/>
+              <a:t>Test Results</a:t>
+            </a:r>
+          </a:p>
+          <a:p>
+            <a:endParaRPr lang="en-US" dirty="0"/>
+          </a:p>
+        </p:txBody>
+      </p:sp>
+    </p:spTree>
+    <p:extLst>
+      <p:ext uri="{BB962C8B-B14F-4D97-AF65-F5344CB8AC3E}">
+        <p14:creationId xmlns:p14="http://schemas.microsoft.com/office/powerpoint/2010/main" val="1906326792"/>
+      </p:ext>
+    </p:extLst>
+  </p:cSld>
+  <p:clrMapOvr>
+    <a:masterClrMapping/>
+  </p:clrMapOvr>
+</p:sld>
+</file>
+
 <file path=ppt/slides/slide6.xml><?xml version="1.0" encoding="utf-8"?>
 <p:sld xmlns:a="http://schemas.openxmlformats.org/drawingml/2006/main" xmlns:r="http://schemas.openxmlformats.org/officeDocument/2006/relationships" xmlns:p="http://schemas.openxmlformats.org/presentationml/2006/main">
   <p:cSld>
@@ -8628,34 +8618,21 @@
             </a:pPr>
             <a:r>
               <a:rPr lang="en-US" dirty="0"/>
-              <a:t>The system will be used by a range of professional IT development staff.  This is a system that the developers, architects, engineers, and others should be able to learn to use quickly, enable quick testing of program code, get results back and view logs or other test output.  The </a:t>
-            </a:r>
-            <a:r>
-              <a:rPr lang="en-US" dirty="0" smtClean="0"/>
-              <a:t>system shall have:</a:t>
-            </a:r>
-            <a:endParaRPr lang="en-US" dirty="0"/>
+              <a:t>The system will be used by a range of professional IT development staff.  This is a system that the developers, architects, engineers, and others should be able to learn to use quickly, enable quick testing of program code, get results back and view logs or other test output.  The system shall have:</a:t>
+            </a:r>
           </a:p>
           <a:p>
             <a:pPr lvl="0"/>
             <a:r>
-              <a:rPr lang="en-US" dirty="0" smtClean="0"/>
-              <a:t>Graphic </a:t>
-            </a:r>
-            <a:r>
-              <a:rPr lang="en-US" dirty="0"/>
-              <a:t>User Interface (GUI). </a:t>
+              <a:rPr lang="en-US" dirty="0"/>
+              <a:t>Graphic User Interface (GUI). </a:t>
             </a:r>
           </a:p>
           <a:p>
             <a:pPr lvl="0"/>
             <a:r>
-              <a:rPr lang="en-US" dirty="0" smtClean="0"/>
-              <a:t>Web </a:t>
-            </a:r>
-            <a:r>
-              <a:rPr lang="en-US" dirty="0"/>
-              <a:t>enabled front end.</a:t>
+              <a:rPr lang="en-US" dirty="0"/>
+              <a:t>Web enabled front end.</a:t>
             </a:r>
           </a:p>
           <a:p>
@@ -8755,30 +8732,21 @@
           <a:lstStyle/>
           <a:p>
             <a:r>
-              <a:rPr lang="en-US" dirty="0" smtClean="0"/>
-              <a:t>Local User – user with locally installed test engine on PC/laptop.  Able to register with Test Server to register test engine in database.  Able </a:t>
-            </a:r>
-            <a:r>
-              <a:rPr lang="en-US" dirty="0"/>
-              <a:t>t</a:t>
-            </a:r>
-            <a:r>
-              <a:rPr lang="en-US" dirty="0" smtClean="0"/>
-              <a:t>o run tests locally.  Uses UI with internal engine.</a:t>
-            </a:r>
-          </a:p>
-          <a:p>
-            <a:r>
-              <a:rPr lang="en-US" dirty="0" smtClean="0"/>
+              <a:rPr lang="en-US" dirty="0"/>
+              <a:t>Local User – user with locally installed test engine on PC/laptop.  Able to register with Test Server to register test engine in database.  Able to run tests locally.  Uses UI with internal engine.</a:t>
+            </a:r>
+          </a:p>
+          <a:p>
+            <a:r>
+              <a:rPr lang="en-US" dirty="0"/>
               <a:t>Remote User – user with same capability as local user, but has ability to view available test engines across the web and to use other hardware, servers,  infrastructure for test purposes as well as capability to view archived results.</a:t>
             </a:r>
           </a:p>
           <a:p>
             <a:r>
-              <a:rPr lang="en-US" dirty="0" smtClean="0"/>
+              <a:rPr lang="en-US" dirty="0"/>
               <a:t>Administrator – user with the ability to install application remotely, update application services, add remote users, de-register test engines, perform HA/DR testing.  </a:t>
             </a:r>
-            <a:endParaRPr lang="en-US" dirty="0"/>
           </a:p>
         </p:txBody>
       </p:sp>

</xml_diff>

<commit_message>
Powerpoint and requirements doc updates
</commit_message>
<xml_diff>
--- a/Test Framework Midterm Presentation 001.pptx
+++ b/Test Framework Midterm Presentation 001.pptx
@@ -15,23 +15,24 @@
     <p:sldId id="275" r:id="rId9"/>
     <p:sldId id="262" r:id="rId10"/>
     <p:sldId id="269" r:id="rId11"/>
-    <p:sldId id="264" r:id="rId12"/>
-    <p:sldId id="263" r:id="rId13"/>
-    <p:sldId id="265" r:id="rId14"/>
-    <p:sldId id="270" r:id="rId15"/>
-    <p:sldId id="271" r:id="rId16"/>
-    <p:sldId id="266" r:id="rId17"/>
-    <p:sldId id="272" r:id="rId18"/>
-    <p:sldId id="267" r:id="rId19"/>
-    <p:sldId id="273" r:id="rId20"/>
-    <p:sldId id="274" r:id="rId21"/>
-    <p:sldId id="276" r:id="rId22"/>
-    <p:sldId id="277" r:id="rId23"/>
-    <p:sldId id="278" r:id="rId24"/>
-    <p:sldId id="279" r:id="rId25"/>
-    <p:sldId id="282" r:id="rId26"/>
-    <p:sldId id="280" r:id="rId27"/>
-    <p:sldId id="281" r:id="rId28"/>
+    <p:sldId id="283" r:id="rId12"/>
+    <p:sldId id="264" r:id="rId13"/>
+    <p:sldId id="263" r:id="rId14"/>
+    <p:sldId id="265" r:id="rId15"/>
+    <p:sldId id="270" r:id="rId16"/>
+    <p:sldId id="271" r:id="rId17"/>
+    <p:sldId id="266" r:id="rId18"/>
+    <p:sldId id="272" r:id="rId19"/>
+    <p:sldId id="267" r:id="rId20"/>
+    <p:sldId id="273" r:id="rId21"/>
+    <p:sldId id="274" r:id="rId22"/>
+    <p:sldId id="276" r:id="rId23"/>
+    <p:sldId id="277" r:id="rId24"/>
+    <p:sldId id="278" r:id="rId25"/>
+    <p:sldId id="279" r:id="rId26"/>
+    <p:sldId id="282" r:id="rId27"/>
+    <p:sldId id="280" r:id="rId28"/>
+    <p:sldId id="281" r:id="rId29"/>
   </p:sldIdLst>
   <p:sldSz cx="12192000" cy="6858000"/>
   <p:notesSz cx="6858000" cy="9144000"/>
@@ -6004,83 +6005,59 @@
         </p:nvSpPr>
         <p:spPr>
           <a:xfrm>
-            <a:off x="677334" y="1656272"/>
+            <a:off x="677334" y="1463767"/>
             <a:ext cx="8596668" cy="4908429"/>
           </a:xfrm>
         </p:spPr>
         <p:txBody>
           <a:bodyPr>
-            <a:normAutofit fontScale="77500" lnSpcReduction="20000"/>
+            <a:normAutofit/>
           </a:bodyPr>
           <a:lstStyle/>
           <a:p>
             <a:r>
               <a:rPr lang="en-US" dirty="0"/>
-              <a:t>2.7	The system shall have a test environment to allow other users to test changes and impact before committing them to production.  </a:t>
+              <a:t>2.7	The system shall have a test environment to allow other users to test changes and impact before committing them to production. [2]</a:t>
             </a:r>
           </a:p>
           <a:p>
             <a:pPr lvl="1"/>
             <a:r>
               <a:rPr lang="en-US" dirty="0"/>
-              <a:t>2.7.1	The test environment shall be implemented in multiple zones and multiple regions to enable testing of HA/DR requirements rather than taking production down.</a:t>
-            </a:r>
-          </a:p>
-          <a:p>
-            <a:r>
-              <a:rPr lang="en-US" dirty="0"/>
-              <a:t>2.8	The system shall have a production environment that is used by multiple users implemented in multiple regions and multiple availability zones.</a:t>
-            </a:r>
-          </a:p>
-          <a:p>
-            <a:r>
-              <a:rPr lang="en-US" dirty="0"/>
-              <a:t>2.9	The application will allow the tests to run asynchronously so that no one test will hold up the 	other tests by tying up resources and starving the other processes (threads).</a:t>
+              <a:t>2.7.1	The test environment shall be implemented in multiple zones and multiple regions to enable testing of HA/DR requirements rather than taking production down. [3]</a:t>
+            </a:r>
+          </a:p>
+          <a:p>
+            <a:r>
+              <a:rPr lang="en-US" dirty="0"/>
+              <a:t>2.8	The system shall have a production environment that is used by multiple users implemented in multiple regions and multiple availability zones. [2]</a:t>
+            </a:r>
+          </a:p>
+          <a:p>
+            <a:r>
+              <a:rPr lang="en-US" dirty="0"/>
+              <a:t>2.9	The application will allow the tests to run asynchronously so that no one test will hold up the 	other tests by tying up resources and starving the other processes (threads). [0]</a:t>
             </a:r>
           </a:p>
           <a:p>
             <a:pPr lvl="1"/>
             <a:r>
               <a:rPr lang="en-US" dirty="0"/>
-              <a:t>2.9.1	The system shall allow specification of the thread pool size.</a:t>
+              <a:t>2.9.1	The system shall allow specification of the thread pool size. [1]</a:t>
             </a:r>
           </a:p>
           <a:p>
             <a:pPr lvl="1"/>
             <a:r>
               <a:rPr lang="en-US" dirty="0"/>
-              <a:t>2.9.2	The starting default minimum thread count shall be 5.</a:t>
+              <a:t>2.9.2	The starting default minimum thread count shall be 5. [1]</a:t>
             </a:r>
           </a:p>
           <a:p>
             <a:pPr lvl="1"/>
             <a:r>
               <a:rPr lang="en-US" dirty="0"/>
-              <a:t>2.9.3	The starting default maximum thread count shall be 15 (this keeps the application from spawning too many threads).</a:t>
-            </a:r>
-          </a:p>
-          <a:p>
-            <a:r>
-              <a:rPr lang="en-US" dirty="0"/>
-              <a:t>2.10	The system shall allow the ability to create additional environments for specialized testing upon demand.</a:t>
-            </a:r>
-          </a:p>
-          <a:p>
-            <a:r>
-              <a:rPr lang="en-US" dirty="0"/>
-              <a:t>2.11  	System source code and data shall be stored in a fault-tolerant, distributed file system such as Amazon S3 or HDFS where it can be accessible and deployed to support disaster recovery and availability requirements.</a:t>
-            </a:r>
-          </a:p>
-          <a:p>
-            <a:r>
-              <a:rPr lang="en-US" dirty="0"/>
-              <a:t>2.12    	System source code shall be deployed to cloud instances hosted in several regions and availability zones. </a:t>
-            </a:r>
-          </a:p>
-          <a:p>
-            <a:r>
-              <a:rPr lang="en-US" dirty="0"/>
-              <a:t>2.13	Access to the system shall be controlled using defined, cloud managed IAM roles, which will allow for configurable levels of access to and control over the system and its resources.</a:t>
+              <a:t>2.9.3	The starting default maximum thread count shall be 15 (this keeps the application from spawning too many threads). [1]</a:t>
             </a:r>
           </a:p>
           <a:p>
@@ -6120,7 +6097,13 @@
       </p:grpSpPr>
       <p:sp>
         <p:nvSpPr>
-          <p:cNvPr id="2" name="Title 1"/>
+          <p:cNvPr id="2" name="Title 1">
+            <a:extLst>
+              <a:ext uri="{FF2B5EF4-FFF2-40B4-BE49-F238E27FC236}">
+                <a16:creationId xmlns:a16="http://schemas.microsoft.com/office/drawing/2014/main" id="{3016A5BA-F72A-4CD9-AF4C-68ADAC202004}"/>
+              </a:ext>
+            </a:extLst>
+          </p:cNvPr>
           <p:cNvSpPr>
             <a:spLocks noGrp="1"/>
           </p:cNvSpPr>
@@ -6135,14 +6118,20 @@
           <a:p>
             <a:r>
               <a:rPr lang="en-US" dirty="0"/>
-              <a:t>User Requirements</a:t>
-            </a:r>
-          </a:p>
-        </p:txBody>
-      </p:sp>
-      <p:sp>
-        <p:nvSpPr>
-          <p:cNvPr id="3" name="Content Placeholder 2"/>
+              <a:t>System Requirements</a:t>
+            </a:r>
+          </a:p>
+        </p:txBody>
+      </p:sp>
+      <p:sp>
+        <p:nvSpPr>
+          <p:cNvPr id="3" name="Content Placeholder 2">
+            <a:extLst>
+              <a:ext uri="{FF2B5EF4-FFF2-40B4-BE49-F238E27FC236}">
+                <a16:creationId xmlns:a16="http://schemas.microsoft.com/office/drawing/2014/main" id="{BAC61804-0702-4E9C-9632-1F546949E17F}"/>
+              </a:ext>
+            </a:extLst>
+          </p:cNvPr>
           <p:cNvSpPr>
             <a:spLocks noGrp="1"/>
           </p:cNvSpPr>
@@ -6152,60 +6141,43 @@
         </p:nvSpPr>
         <p:spPr>
           <a:xfrm>
-            <a:off x="677334" y="1930400"/>
-            <a:ext cx="8596668" cy="4238441"/>
+            <a:off x="677334" y="1488613"/>
+            <a:ext cx="8596668" cy="3880773"/>
           </a:xfrm>
         </p:spPr>
         <p:txBody>
-          <a:bodyPr>
-            <a:normAutofit lnSpcReduction="10000"/>
-          </a:bodyPr>
-          <a:lstStyle/>
-          <a:p>
-            <a:r>
-              <a:rPr lang="en-US" b="1" dirty="0"/>
-              <a:t>4.1 	User Requirement 1: Unit Test Execution</a:t>
-            </a:r>
-          </a:p>
-          <a:p>
-            <a:r>
-              <a:rPr lang="en-US" dirty="0"/>
-              <a:t>The software developer(s) shall have the ability to run individual unit tests of program code as well as multiple tests simultaneously. They need to be able to stress performance, ensure scalability, and diagnose system interface issues.</a:t>
-            </a:r>
-          </a:p>
-          <a:p>
-            <a:r>
-              <a:rPr lang="en-US" b="1" dirty="0"/>
-              <a:t>4.2 	User Requirement 2: Logging and Results Viewing</a:t>
-            </a:r>
-          </a:p>
-          <a:p>
-            <a:r>
-              <a:rPr lang="en-US" dirty="0"/>
-              <a:t>The Software / System Architect(s) shall have the ability to view the results of the test as each test completes. He/she shall also have the ability to view the log files where all results and relevant output are stored.</a:t>
-            </a:r>
-          </a:p>
-          <a:p>
-            <a:r>
-              <a:rPr lang="en-US" b="1" dirty="0"/>
-              <a:t>4.3 	User Requirement 3: Concurrent Test Execution</a:t>
-            </a:r>
-          </a:p>
-          <a:p>
-            <a:r>
-              <a:rPr lang="en-US" dirty="0"/>
-              <a:t>Test Engineers and QA personnel shall have the ability to provide a test case where several tests are sent in quick succession to demonstrate the application executes tests concurrently.</a:t>
-            </a:r>
-          </a:p>
-          <a:p>
-            <a:endParaRPr lang="en-US" dirty="0"/>
+          <a:bodyPr/>
+          <a:lstStyle/>
+          <a:p>
+            <a:r>
+              <a:rPr lang="en-US" dirty="0"/>
+              <a:t>2.10	The system shall allow the ability to create additional environments for specialized testing upon demand. [2]</a:t>
+            </a:r>
+          </a:p>
+          <a:p>
+            <a:r>
+              <a:rPr lang="en-US" dirty="0"/>
+              <a:t>2.11  System source code and data shall be stored in a fault-tolerant, distributed file system such as Amazon S3 or HDFS where it can be accessible and deployed to support disaster recovery and availability requirements. [2]</a:t>
+            </a:r>
+          </a:p>
+          <a:p>
+            <a:r>
+              <a:rPr lang="en-US" dirty="0"/>
+              <a:t>2.12  System source code shall be deployed to cloud instances hosted in several regions and availability zones. [2]</a:t>
+            </a:r>
+          </a:p>
+          <a:p>
+            <a:r>
+              <a:rPr lang="en-US" dirty="0"/>
+              <a:t>2.13	Access to the system shall be controlled using defined, cloud managed IAM roles, which will allow for configurable levels of access to and control over the system and its resources. [1]</a:t>
+            </a:r>
           </a:p>
         </p:txBody>
       </p:sp>
     </p:spTree>
     <p:extLst>
       <p:ext uri="{BB962C8B-B14F-4D97-AF65-F5344CB8AC3E}">
-        <p14:creationId xmlns:p14="http://schemas.microsoft.com/office/powerpoint/2010/main" val="1620122310"/>
+        <p14:creationId xmlns:p14="http://schemas.microsoft.com/office/powerpoint/2010/main" val="3899169147"/>
       </p:ext>
     </p:extLst>
   </p:cSld>
@@ -6249,7 +6221,7 @@
           <a:p>
             <a:r>
               <a:rPr lang="en-US" dirty="0"/>
-              <a:t>Availability and Business Continuity</a:t>
+              <a:t>User Requirements</a:t>
             </a:r>
           </a:p>
         </p:txBody>
@@ -6264,7 +6236,12 @@
             <p:ph idx="1"/>
           </p:nvPr>
         </p:nvSpPr>
-        <p:spPr/>
+        <p:spPr>
+          <a:xfrm>
+            <a:off x="677334" y="1545389"/>
+            <a:ext cx="8596668" cy="4238441"/>
+          </a:xfrm>
+        </p:spPr>
         <p:txBody>
           <a:bodyPr>
             <a:normAutofit lnSpcReduction="10000"/>
@@ -6273,37 +6250,37 @@
           <a:p>
             <a:r>
               <a:rPr lang="en-US" b="1" dirty="0"/>
-              <a:t>3.1 	Availability Requirement 1: Continuous System Uptime</a:t>
-            </a:r>
-          </a:p>
-          <a:p>
-            <a:r>
-              <a:rPr lang="en-US" dirty="0"/>
-              <a:t>The system shall support 24/7 availability. Routine downtime in a particular region necessary for maintenance or enhancement to the system shall take place after 21:00 EST on Saturday and shall end before 23:00 EST on Sunday. </a:t>
+              <a:t>4.1 	User Requirement 1: Unit Test Execution [0]</a:t>
+            </a:r>
+          </a:p>
+          <a:p>
+            <a:r>
+              <a:rPr lang="en-US" dirty="0"/>
+              <a:t>The software developer(s) shall have the ability to run individual unit tests of program code as well as multiple tests simultaneously. They need to be able to stress performance, ensure scalability, and diagnose system interface issues.</a:t>
             </a:r>
           </a:p>
           <a:p>
             <a:r>
               <a:rPr lang="en-US" b="1" dirty="0"/>
-              <a:t>3.2 	Availability Requirement 2: Recovery Time</a:t>
-            </a:r>
-          </a:p>
-          <a:p>
-            <a:r>
-              <a:rPr lang="en-US" dirty="0"/>
-              <a:t>The system shall be able to quickly recover from outages due to unforeseen circumstances while minimizing downtime. The system shall support the ability to create and issue automated alerts 	when downtime is encountered for any of the reasons stated below.</a:t>
+              <a:t>4.2 	User Requirement 2: Logging and Results Viewing [0]</a:t>
+            </a:r>
+          </a:p>
+          <a:p>
+            <a:r>
+              <a:rPr lang="en-US" dirty="0"/>
+              <a:t>The Software / System Architect(s) shall have the ability to view the results of the test as each test completes. He/she shall also have the ability to view the log files where all results and relevant output are stored.</a:t>
             </a:r>
           </a:p>
           <a:p>
             <a:r>
               <a:rPr lang="en-US" b="1" dirty="0"/>
-              <a:t>3.3 	Availability Requirement 3: High Availability</a:t>
-            </a:r>
-          </a:p>
-          <a:p>
-            <a:r>
-              <a:rPr lang="en-US" dirty="0"/>
-              <a:t>The system shall support high availability by being quickly accessible to users attempting to access it from any geographic region. </a:t>
+              <a:t>4.3 	User Requirement 3: Concurrent Test Execution [0]</a:t>
+            </a:r>
+          </a:p>
+          <a:p>
+            <a:r>
+              <a:rPr lang="en-US" dirty="0"/>
+              <a:t>Test Engineers and QA personnel shall have the ability to provide a test case where several tests are sent in quick succession to demonstrate the application executes tests concurrently.</a:t>
             </a:r>
           </a:p>
           <a:p>
@@ -6314,7 +6291,7 @@
     </p:spTree>
     <p:extLst>
       <p:ext uri="{BB962C8B-B14F-4D97-AF65-F5344CB8AC3E}">
-        <p14:creationId xmlns:p14="http://schemas.microsoft.com/office/powerpoint/2010/main" val="3799260406"/>
+        <p14:creationId xmlns:p14="http://schemas.microsoft.com/office/powerpoint/2010/main" val="1620122310"/>
       </p:ext>
     </p:extLst>
   </p:cSld>
@@ -6358,7 +6335,7 @@
           <a:p>
             <a:r>
               <a:rPr lang="en-US" dirty="0"/>
-              <a:t>Technical Constraints</a:t>
+              <a:t>Availability and Business Continuity</a:t>
             </a:r>
           </a:p>
         </p:txBody>
@@ -6373,34 +6350,62 @@
             <p:ph idx="1"/>
           </p:nvPr>
         </p:nvSpPr>
-        <p:spPr/>
-        <p:txBody>
-          <a:bodyPr/>
-          <a:lstStyle/>
-          <a:p>
-            <a:r>
-              <a:rPr lang="en-US" dirty="0"/>
-              <a:t>5.1.1	The system shall be developed using the C++ programming language and the C++ Standard Template Library (STL). </a:t>
-            </a:r>
-          </a:p>
-          <a:p>
-            <a:r>
-              <a:rPr lang="en-US" dirty="0"/>
-              <a:t>5.1.2	The system shall be developed using a publicly available source code editor which supports 	the C++ language. </a:t>
-            </a:r>
-          </a:p>
-          <a:p>
-            <a:r>
-              <a:rPr lang="en-US" dirty="0"/>
-              <a:t>5.1.3    The system shall have at least 75% unit test coverage of the source code. </a:t>
-            </a:r>
+        <p:spPr>
+          <a:xfrm>
+            <a:off x="677334" y="1488613"/>
+            <a:ext cx="8596668" cy="3880773"/>
+          </a:xfrm>
+        </p:spPr>
+        <p:txBody>
+          <a:bodyPr>
+            <a:normAutofit lnSpcReduction="10000"/>
+          </a:bodyPr>
+          <a:lstStyle/>
+          <a:p>
+            <a:r>
+              <a:rPr lang="en-US" b="1" dirty="0"/>
+              <a:t>3.1 	Availability Requirement 1: Continuous System Uptime [1]</a:t>
+            </a:r>
+          </a:p>
+          <a:p>
+            <a:r>
+              <a:rPr lang="en-US" dirty="0"/>
+              <a:t>The system shall support 24/7 availability. Routine downtime in a particular region necessary for maintenance or enhancement to the system shall take place after 21:00 EST on Saturday and shall end before 23:00 EST on Sunday. </a:t>
+            </a:r>
+          </a:p>
+          <a:p>
+            <a:r>
+              <a:rPr lang="en-US" b="1" dirty="0"/>
+              <a:t>3.2 	Availability Requirement 2: Recovery Time [1]</a:t>
+            </a:r>
+          </a:p>
+          <a:p>
+            <a:r>
+              <a:rPr lang="en-US" dirty="0"/>
+              <a:t>The system shall be able to quickly recover from outages due to unforeseen circumstances while minimizing downtime. The system shall support the ability to create and issue automated alerts 	when downtime is encountered for any of the reasons stated below.</a:t>
+            </a:r>
+          </a:p>
+          <a:p>
+            <a:r>
+              <a:rPr lang="en-US" b="1" dirty="0"/>
+              <a:t>3.3 	Availability Requirement 3: High Availability [1]</a:t>
+            </a:r>
+          </a:p>
+          <a:p>
+            <a:r>
+              <a:rPr lang="en-US" dirty="0"/>
+              <a:t>The system shall support high availability by being quickly accessible to users attempting to access it from any geographic region. </a:t>
+            </a:r>
+          </a:p>
+          <a:p>
+            <a:endParaRPr lang="en-US" dirty="0"/>
           </a:p>
         </p:txBody>
       </p:sp>
     </p:spTree>
     <p:extLst>
       <p:ext uri="{BB962C8B-B14F-4D97-AF65-F5344CB8AC3E}">
-        <p14:creationId xmlns:p14="http://schemas.microsoft.com/office/powerpoint/2010/main" val="2085517183"/>
+        <p14:creationId xmlns:p14="http://schemas.microsoft.com/office/powerpoint/2010/main" val="3799260406"/>
       </p:ext>
     </p:extLst>
   </p:cSld>
@@ -6444,7 +6449,7 @@
           <a:p>
             <a:r>
               <a:rPr lang="en-US" dirty="0"/>
-              <a:t>Operational Constraints</a:t>
+              <a:t>Technical Constraints</a:t>
             </a:r>
           </a:p>
         </p:txBody>
@@ -6461,8 +6466,8 @@
         </p:nvSpPr>
         <p:spPr>
           <a:xfrm>
-            <a:off x="677334" y="1664899"/>
-            <a:ext cx="8596668" cy="4376464"/>
+            <a:off x="677334" y="1488613"/>
+            <a:ext cx="8596668" cy="3880773"/>
           </a:xfrm>
         </p:spPr>
         <p:txBody>
@@ -6472,25 +6477,28 @@
           <a:lstStyle/>
           <a:p>
             <a:r>
-              <a:rPr lang="en-US" dirty="0"/>
-              <a:t>5.2.1     Granting access to a new user of the system shall take no more than 1 business day to complete.</a:t>
-            </a:r>
-          </a:p>
-          <a:p>
-            <a:r>
-              <a:rPr lang="en-US" dirty="0"/>
-              <a:t>5.2.2     Modifying or removing a user’s access to the system shall take no more than 1 business day to complete. </a:t>
-            </a:r>
-          </a:p>
-          <a:p>
-            <a:endParaRPr lang="en-US" dirty="0"/>
+              <a:rPr lang="en-US" sz="2000" dirty="0"/>
+              <a:t>5.1.1	The system shall be developed using the C++ programming language and the C++ Standard Template Library (STL). [0]</a:t>
+            </a:r>
+          </a:p>
+          <a:p>
+            <a:r>
+              <a:rPr lang="en-US" sz="2000" dirty="0"/>
+              <a:t>5.1.2	The system shall be developed using a publicly available source code editor which supports the C++ language. [0]</a:t>
+            </a:r>
+          </a:p>
+          <a:p>
+            <a:r>
+              <a:rPr lang="en-US" sz="2000" dirty="0"/>
+              <a:t>5.1.3    The system shall have at least 75% unit test coverage of the source code. [1]</a:t>
+            </a:r>
           </a:p>
         </p:txBody>
       </p:sp>
     </p:spTree>
     <p:extLst>
       <p:ext uri="{BB962C8B-B14F-4D97-AF65-F5344CB8AC3E}">
-        <p14:creationId xmlns:p14="http://schemas.microsoft.com/office/powerpoint/2010/main" val="4044683445"/>
+        <p14:creationId xmlns:p14="http://schemas.microsoft.com/office/powerpoint/2010/main" val="2085517183"/>
       </p:ext>
     </p:extLst>
   </p:cSld>
@@ -6534,6 +6542,93 @@
           <a:p>
             <a:r>
               <a:rPr lang="en-US" dirty="0"/>
+              <a:t>Operational Constraints</a:t>
+            </a:r>
+          </a:p>
+        </p:txBody>
+      </p:sp>
+      <p:sp>
+        <p:nvSpPr>
+          <p:cNvPr id="3" name="Content Placeholder 2"/>
+          <p:cNvSpPr>
+            <a:spLocks noGrp="1"/>
+          </p:cNvSpPr>
+          <p:nvPr>
+            <p:ph idx="1"/>
+          </p:nvPr>
+        </p:nvSpPr>
+        <p:spPr>
+          <a:xfrm>
+            <a:off x="677334" y="1536562"/>
+            <a:ext cx="8596668" cy="4376464"/>
+          </a:xfrm>
+        </p:spPr>
+        <p:txBody>
+          <a:bodyPr>
+            <a:normAutofit/>
+          </a:bodyPr>
+          <a:lstStyle/>
+          <a:p>
+            <a:r>
+              <a:rPr lang="en-US" sz="2000" dirty="0"/>
+              <a:t>5.2.1     Granting access to a new user of the system shall take no more than 1 business day to complete. [0]</a:t>
+            </a:r>
+          </a:p>
+          <a:p>
+            <a:r>
+              <a:rPr lang="en-US" sz="2000" dirty="0"/>
+              <a:t>5.2.2     Modifying or removing a user’s access to the system shall take no more than 1 business day to complete. [0]</a:t>
+            </a:r>
+          </a:p>
+        </p:txBody>
+      </p:sp>
+    </p:spTree>
+    <p:extLst>
+      <p:ext uri="{BB962C8B-B14F-4D97-AF65-F5344CB8AC3E}">
+        <p14:creationId xmlns:p14="http://schemas.microsoft.com/office/powerpoint/2010/main" val="4044683445"/>
+      </p:ext>
+    </p:extLst>
+  </p:cSld>
+  <p:clrMapOvr>
+    <a:masterClrMapping/>
+  </p:clrMapOvr>
+</p:sld>
+</file>
+
+<file path=ppt/slides/slide16.xml><?xml version="1.0" encoding="utf-8"?>
+<p:sld xmlns:a="http://schemas.openxmlformats.org/drawingml/2006/main" xmlns:r="http://schemas.openxmlformats.org/officeDocument/2006/relationships" xmlns:p="http://schemas.openxmlformats.org/presentationml/2006/main">
+  <p:cSld>
+    <p:spTree>
+      <p:nvGrpSpPr>
+        <p:cNvPr id="1" name=""/>
+        <p:cNvGrpSpPr/>
+        <p:nvPr/>
+      </p:nvGrpSpPr>
+      <p:grpSpPr>
+        <a:xfrm>
+          <a:off x="0" y="0"/>
+          <a:ext cx="0" cy="0"/>
+          <a:chOff x="0" y="0"/>
+          <a:chExt cx="0" cy="0"/>
+        </a:xfrm>
+      </p:grpSpPr>
+      <p:sp>
+        <p:nvSpPr>
+          <p:cNvPr id="2" name="Title 1"/>
+          <p:cNvSpPr>
+            <a:spLocks noGrp="1"/>
+          </p:cNvSpPr>
+          <p:nvPr>
+            <p:ph type="title"/>
+          </p:nvPr>
+        </p:nvSpPr>
+        <p:spPr/>
+        <p:txBody>
+          <a:bodyPr/>
+          <a:lstStyle/>
+          <a:p>
+            <a:r>
+              <a:rPr lang="en-US" dirty="0"/>
               <a:t>Business Constraints</a:t>
             </a:r>
           </a:p>
@@ -6549,20 +6644,25 @@
             <p:ph idx="1"/>
           </p:nvPr>
         </p:nvSpPr>
-        <p:spPr/>
+        <p:spPr>
+          <a:xfrm>
+            <a:off x="677334" y="1488613"/>
+            <a:ext cx="8596668" cy="3880773"/>
+          </a:xfrm>
+        </p:spPr>
         <p:txBody>
           <a:bodyPr/>
           <a:lstStyle/>
           <a:p>
             <a:r>
-              <a:rPr lang="en-US" dirty="0"/>
-              <a:t>5.3.1	Disaster recovery shall be cost-effective and managed through the fault tolerance and high availability features of the cloud-based system architecture.</a:t>
-            </a:r>
-          </a:p>
-          <a:p>
-            <a:r>
-              <a:rPr lang="en-US" dirty="0"/>
-              <a:t>5.3.2 User training shall take no more than 1 business day to complete, regardless of the user’s role. </a:t>
+              <a:rPr lang="en-US" sz="2000" dirty="0"/>
+              <a:t>5.3.1	Disaster recovery shall be cost-effective and managed through the fault tolerance and high availability features of the cloud-based system architecture. [1]</a:t>
+            </a:r>
+          </a:p>
+          <a:p>
+            <a:r>
+              <a:rPr lang="en-US" sz="2000" dirty="0"/>
+              <a:t>5.3.2      User training shall take no more than 1 business day to complete, regardless of the user’s role. [2]</a:t>
             </a:r>
           </a:p>
           <a:p>
@@ -6583,7 +6683,7 @@
 </p:sld>
 </file>
 
-<file path=ppt/slides/slide16.xml><?xml version="1.0" encoding="utf-8"?>
+<file path=ppt/slides/slide17.xml><?xml version="1.0" encoding="utf-8"?>
 <p:sld xmlns:a="http://schemas.openxmlformats.org/drawingml/2006/main" xmlns:r="http://schemas.openxmlformats.org/officeDocument/2006/relationships" xmlns:p="http://schemas.openxmlformats.org/presentationml/2006/main">
   <p:cSld>
     <p:spTree>
@@ -6725,7 +6825,7 @@
 </p:sld>
 </file>
 
-<file path=ppt/slides/slide17.xml><?xml version="1.0" encoding="utf-8"?>
+<file path=ppt/slides/slide18.xml><?xml version="1.0" encoding="utf-8"?>
 <p:sld xmlns:a="http://schemas.openxmlformats.org/drawingml/2006/main" xmlns:r="http://schemas.openxmlformats.org/officeDocument/2006/relationships" xmlns:p="http://schemas.openxmlformats.org/presentationml/2006/main">
   <p:cSld>
     <p:spTree>
@@ -6807,7 +6907,7 @@
 </p:sld>
 </file>
 
-<file path=ppt/slides/slide18.xml><?xml version="1.0" encoding="utf-8"?>
+<file path=ppt/slides/slide19.xml><?xml version="1.0" encoding="utf-8"?>
 <p:sld xmlns:a="http://schemas.openxmlformats.org/drawingml/2006/main" xmlns:r="http://schemas.openxmlformats.org/officeDocument/2006/relationships" xmlns:p="http://schemas.openxmlformats.org/presentationml/2006/main">
   <p:cSld>
     <p:spTree>
@@ -6919,80 +7019,6 @@
 </p:sld>
 </file>
 
-<file path=ppt/slides/slide19.xml><?xml version="1.0" encoding="utf-8"?>
-<p:sld xmlns:a="http://schemas.openxmlformats.org/drawingml/2006/main" xmlns:r="http://schemas.openxmlformats.org/officeDocument/2006/relationships" xmlns:p="http://schemas.openxmlformats.org/presentationml/2006/main">
-  <p:cSld>
-    <p:spTree>
-      <p:nvGrpSpPr>
-        <p:cNvPr id="1" name=""/>
-        <p:cNvGrpSpPr/>
-        <p:nvPr/>
-      </p:nvGrpSpPr>
-      <p:grpSpPr>
-        <a:xfrm>
-          <a:off x="0" y="0"/>
-          <a:ext cx="0" cy="0"/>
-          <a:chOff x="0" y="0"/>
-          <a:chExt cx="0" cy="0"/>
-        </a:xfrm>
-      </p:grpSpPr>
-      <p:sp>
-        <p:nvSpPr>
-          <p:cNvPr id="2" name="Title 1"/>
-          <p:cNvSpPr>
-            <a:spLocks noGrp="1"/>
-          </p:cNvSpPr>
-          <p:nvPr>
-            <p:ph type="title"/>
-          </p:nvPr>
-        </p:nvSpPr>
-        <p:spPr/>
-        <p:txBody>
-          <a:bodyPr/>
-          <a:lstStyle/>
-          <a:p>
-            <a:r>
-              <a:rPr lang="en-US" dirty="0"/>
-              <a:t>Thank You</a:t>
-            </a:r>
-          </a:p>
-        </p:txBody>
-      </p:sp>
-      <p:sp>
-        <p:nvSpPr>
-          <p:cNvPr id="3" name="Content Placeholder 2"/>
-          <p:cNvSpPr>
-            <a:spLocks noGrp="1"/>
-          </p:cNvSpPr>
-          <p:nvPr>
-            <p:ph idx="1"/>
-          </p:nvPr>
-        </p:nvSpPr>
-        <p:spPr/>
-        <p:txBody>
-          <a:bodyPr/>
-          <a:lstStyle/>
-          <a:p>
-            <a:r>
-              <a:rPr lang="en-US" dirty="0"/>
-              <a:t>Questions?</a:t>
-            </a:r>
-          </a:p>
-        </p:txBody>
-      </p:sp>
-    </p:spTree>
-    <p:extLst>
-      <p:ext uri="{BB962C8B-B14F-4D97-AF65-F5344CB8AC3E}">
-        <p14:creationId xmlns:p14="http://schemas.microsoft.com/office/powerpoint/2010/main" val="3990466175"/>
-      </p:ext>
-    </p:extLst>
-  </p:cSld>
-  <p:clrMapOvr>
-    <a:masterClrMapping/>
-  </p:clrMapOvr>
-</p:sld>
-</file>
-
 <file path=ppt/slides/slide2.xml><?xml version="1.0" encoding="utf-8"?>
 <p:sld xmlns:a="http://schemas.openxmlformats.org/drawingml/2006/main" xmlns:r="http://schemas.openxmlformats.org/officeDocument/2006/relationships" xmlns:p="http://schemas.openxmlformats.org/presentationml/2006/main">
   <p:cSld>
@@ -7044,7 +7070,7 @@
         </p:nvSpPr>
         <p:spPr>
           <a:xfrm>
-            <a:off x="677334" y="1759789"/>
+            <a:off x="677334" y="1487073"/>
             <a:ext cx="8596668" cy="4281573"/>
           </a:xfrm>
         </p:spPr>
@@ -7138,7 +7164,7 @@
           <a:p>
             <a:r>
               <a:rPr lang="en-US" dirty="0"/>
-              <a:t>Backup</a:t>
+              <a:t>Thank You</a:t>
             </a:r>
           </a:p>
         </p:txBody>
@@ -7158,14 +7184,17 @@
           <a:bodyPr/>
           <a:lstStyle/>
           <a:p>
-            <a:endParaRPr lang="en-US"/>
+            <a:r>
+              <a:rPr lang="en-US" dirty="0"/>
+              <a:t>Questions?</a:t>
+            </a:r>
           </a:p>
         </p:txBody>
       </p:sp>
     </p:spTree>
     <p:extLst>
       <p:ext uri="{BB962C8B-B14F-4D97-AF65-F5344CB8AC3E}">
-        <p14:creationId xmlns:p14="http://schemas.microsoft.com/office/powerpoint/2010/main" val="2771322857"/>
+        <p14:creationId xmlns:p14="http://schemas.microsoft.com/office/powerpoint/2010/main" val="3990466175"/>
       </p:ext>
     </p:extLst>
   </p:cSld>
@@ -7209,7 +7238,7 @@
           <a:p>
             <a:r>
               <a:rPr lang="en-US" dirty="0"/>
-              <a:t>Availability and Business Continuity</a:t>
+              <a:t>Backup</a:t>
             </a:r>
           </a:p>
         </p:txBody>
@@ -7224,74 +7253,19 @@
             <p:ph idx="1"/>
           </p:nvPr>
         </p:nvSpPr>
-        <p:spPr>
-          <a:xfrm>
-            <a:off x="677334" y="1595886"/>
-            <a:ext cx="8596668" cy="4848045"/>
-          </a:xfrm>
-        </p:spPr>
-        <p:txBody>
-          <a:bodyPr>
-            <a:normAutofit fontScale="70000" lnSpcReduction="20000"/>
-          </a:bodyPr>
-          <a:lstStyle/>
-          <a:p>
-            <a:r>
-              <a:rPr lang="en-US" b="1" dirty="0"/>
-              <a:t>3.1 	Availability Requirement 1: Continuous System Uptime</a:t>
-            </a:r>
-          </a:p>
-          <a:p>
-            <a:r>
-              <a:rPr lang="en-US" dirty="0"/>
-              <a:t>	The system shall support 24/7 availability. Routine downtime in a particular region necessary for 	maintenance or enhancement to the system shall take place after 21:00 EST on Saturday 	and shall end before 23:00 EST on Sunday. [1]</a:t>
-            </a:r>
-          </a:p>
-          <a:p>
-            <a:r>
-              <a:rPr lang="en-US" dirty="0"/>
-              <a:t>3.1.1     Any scheduled downtime which takes place outside of the designated hours shall be reported to 	users no less than 48 hours in advance. In the case of emergency system outage, the notice 	period shall be waived but users shall be informed as soon as possible of any unplanned system 	outages. [1]</a:t>
-            </a:r>
-          </a:p>
-          <a:p>
-            <a:r>
-              <a:rPr lang="en-US" b="1" dirty="0"/>
-              <a:t>3.2 	Availability Requirement 2: Recovery Time</a:t>
-            </a:r>
-          </a:p>
-          <a:p>
-            <a:r>
-              <a:rPr lang="en-US" dirty="0"/>
-              <a:t>	The system shall be able to quickly recover from outages due to unforeseen circumstances while 	minimizing downtime. The system shall support the ability to create and issue automated alerts 	when downtime is encountered for any of the reasons stated below. [1]</a:t>
-            </a:r>
-          </a:p>
-          <a:p>
-            <a:r>
-              <a:rPr lang="en-US" dirty="0"/>
-              <a:t>3.2.1     In the event of an unplanned outage due to the loss of a particular region or availability zone, 	the system shall immediately fail over to another region or availability zone as determined by 	the cloud provider. [1]</a:t>
-            </a:r>
-          </a:p>
-          <a:p>
-            <a:r>
-              <a:rPr lang="en-US" dirty="0"/>
-              <a:t>3.2.2      In the event of an unplanned outage due to the failure of an instance on which the system is          	hosted, the system shall immediately fail over to a backup instance. In the event a backup 	instance does not exist, the system shall have the ability to immediately spin up a new instance 	and fail over to it using automated deployment. [1]</a:t>
-            </a:r>
-          </a:p>
-          <a:p>
-            <a:r>
-              <a:rPr lang="en-US" dirty="0"/>
-              <a:t>3.2.3.    In the event of an unplanned outage in any or all regions due to a software error, the system 	shall support the ability to quickly identify and create a restore point from the last known 	working backup. This process shall take no more than 1 hour to complete from the time the 	software malfunction is identified. [1]</a:t>
-            </a:r>
-          </a:p>
-          <a:p>
-            <a:endParaRPr lang="en-US" dirty="0"/>
+        <p:spPr/>
+        <p:txBody>
+          <a:bodyPr/>
+          <a:lstStyle/>
+          <a:p>
+            <a:endParaRPr lang="en-US"/>
           </a:p>
         </p:txBody>
       </p:sp>
     </p:spTree>
     <p:extLst>
       <p:ext uri="{BB962C8B-B14F-4D97-AF65-F5344CB8AC3E}">
-        <p14:creationId xmlns:p14="http://schemas.microsoft.com/office/powerpoint/2010/main" val="1676500678"/>
+        <p14:creationId xmlns:p14="http://schemas.microsoft.com/office/powerpoint/2010/main" val="2771322857"/>
       </p:ext>
     </p:extLst>
   </p:cSld>
@@ -7350,46 +7324,63 @@
             <p:ph idx="1"/>
           </p:nvPr>
         </p:nvSpPr>
-        <p:spPr/>
+        <p:spPr>
+          <a:xfrm>
+            <a:off x="677334" y="1595886"/>
+            <a:ext cx="8596668" cy="4848045"/>
+          </a:xfrm>
+        </p:spPr>
         <p:txBody>
           <a:bodyPr>
-            <a:normAutofit fontScale="92500" lnSpcReduction="20000"/>
+            <a:normAutofit fontScale="70000" lnSpcReduction="20000"/>
           </a:bodyPr>
           <a:lstStyle/>
           <a:p>
             <a:r>
               <a:rPr lang="en-US" b="1" dirty="0"/>
-              <a:t>3.3 	Availability Requirement 3: High Availability</a:t>
-            </a:r>
-          </a:p>
-          <a:p>
-            <a:r>
-              <a:rPr lang="en-US" dirty="0"/>
-              <a:t>	The system shall support high availability by being quickly accessible to users attempting to 	access it from any geographic region. [1]</a:t>
-            </a:r>
-          </a:p>
-          <a:p>
-            <a:r>
-              <a:rPr lang="en-US" dirty="0"/>
-              <a:t>3.3.1    The system homepage shall take no more than an average of five (5) seconds to load from the 	    	time the URL is input from a web browser in any geographic region. This average shall be taken 	from 10 consecutive attempts to access the homepage. [1]</a:t>
-            </a:r>
-          </a:p>
-          <a:p>
-            <a:r>
-              <a:rPr lang="en-US" dirty="0"/>
-              <a:t>3.3.2    Navigation actions (paging, links, etc.) should take no more than an average of three (3) seconds     	to load from the time the action is triggered. This average shall be taken from 10 consecutive 	attempts to perform the action. [1]</a:t>
-            </a:r>
-          </a:p>
-          <a:p>
-            <a:r>
-              <a:rPr lang="en-US" dirty="0"/>
-              <a:t>3.3.3	The system shall maintain all program code in scripts that can be deployed to the cloud platform. [1]</a:t>
-            </a:r>
-          </a:p>
-          <a:p>
-            <a:r>
-              <a:rPr lang="en-US" dirty="0"/>
-              <a:t>	3.3.3.1	Backup copies of all scripts shall be located in a separate region. [2]</a:t>
+              <a:t>3.1 	Availability Requirement 1: Continuous System Uptime</a:t>
+            </a:r>
+          </a:p>
+          <a:p>
+            <a:r>
+              <a:rPr lang="en-US" dirty="0"/>
+              <a:t>	The system shall support 24/7 availability. Routine downtime in a particular region necessary for 	maintenance or enhancement to the system shall take place after 21:00 EST on Saturday 	and shall end before 23:00 EST on Sunday. [1]</a:t>
+            </a:r>
+          </a:p>
+          <a:p>
+            <a:r>
+              <a:rPr lang="en-US" dirty="0"/>
+              <a:t>3.1.1     Any scheduled downtime which takes place outside of the designated hours shall be reported to 	users no less than 48 hours in advance. In the case of emergency system outage, the notice 	period shall be waived but users shall be informed as soon as possible of any unplanned system 	outages. [1]</a:t>
+            </a:r>
+          </a:p>
+          <a:p>
+            <a:r>
+              <a:rPr lang="en-US" b="1" dirty="0"/>
+              <a:t>3.2 	Availability Requirement 2: Recovery Time</a:t>
+            </a:r>
+          </a:p>
+          <a:p>
+            <a:r>
+              <a:rPr lang="en-US" dirty="0"/>
+              <a:t>	The system shall be able to quickly recover from outages due to unforeseen circumstances while 	minimizing downtime. The system shall support the ability to create and issue automated alerts 	when downtime is encountered for any of the reasons stated below. [1]</a:t>
+            </a:r>
+          </a:p>
+          <a:p>
+            <a:r>
+              <a:rPr lang="en-US" dirty="0"/>
+              <a:t>3.2.1     In the event of an unplanned outage due to the loss of a particular region or availability zone, 	the system shall immediately fail over to another region or availability zone as determined by 	the cloud provider. [1]</a:t>
+            </a:r>
+          </a:p>
+          <a:p>
+            <a:r>
+              <a:rPr lang="en-US" dirty="0"/>
+              <a:t>3.2.2      In the event of an unplanned outage due to the failure of an instance on which the system is          	hosted, the system shall immediately fail over to a backup instance. In the event a backup 	instance does not exist, the system shall have the ability to immediately spin up a new instance 	and fail over to it using automated deployment. [1]</a:t>
+            </a:r>
+          </a:p>
+          <a:p>
+            <a:r>
+              <a:rPr lang="en-US" dirty="0"/>
+              <a:t>3.2.3.    In the event of an unplanned outage in any or all regions due to a software error, the system 	shall support the ability to quickly identify and create a restore point from the last known 	working backup. This process shall take no more than 1 hour to complete from the time the 	software malfunction is identified. [1]</a:t>
             </a:r>
           </a:p>
           <a:p>
@@ -7400,7 +7391,7 @@
     </p:spTree>
     <p:extLst>
       <p:ext uri="{BB962C8B-B14F-4D97-AF65-F5344CB8AC3E}">
-        <p14:creationId xmlns:p14="http://schemas.microsoft.com/office/powerpoint/2010/main" val="2344295902"/>
+        <p14:creationId xmlns:p14="http://schemas.microsoft.com/office/powerpoint/2010/main" val="1676500678"/>
       </p:ext>
     </p:extLst>
   </p:cSld>
@@ -7444,7 +7435,7 @@
           <a:p>
             <a:r>
               <a:rPr lang="en-US" dirty="0"/>
-              <a:t>User Requirements</a:t>
+              <a:t>Availability and Business Continuity</a:t>
             </a:r>
           </a:p>
         </p:txBody>
@@ -7468,43 +7459,37 @@
           <a:p>
             <a:r>
               <a:rPr lang="en-US" b="1" dirty="0"/>
-              <a:t>4.1 	User Requirement 1: Unit Test Execution</a:t>
-            </a:r>
-          </a:p>
-          <a:p>
-            <a:r>
-              <a:rPr lang="en-US" dirty="0"/>
-              <a:t>The software developer(s) shall have the ability to run individual unit tests of program code as well as multiple tests simultaneously. They need to be able to stress performance, ensure scalability, and diagnose system interface issues. [0]</a:t>
-            </a:r>
-          </a:p>
-          <a:p>
-            <a:r>
-              <a:rPr lang="en-US" dirty="0"/>
-              <a:t>4.1.1	The test engine shall be an application that can run on the Windows platform. [0]</a:t>
-            </a:r>
-          </a:p>
-          <a:p>
-            <a:r>
-              <a:rPr lang="en-US" dirty="0"/>
-              <a:t>4.1.2	The test engine should run on Linux and Mac platforms. [1]</a:t>
-            </a:r>
-          </a:p>
-          <a:p>
-            <a:r>
-              <a:rPr lang="en-US" dirty="0"/>
-              <a:t>4.1.3	The user shall have the ability to install the test engine on multiple machines (redundancy, performance, latency). [0]</a:t>
-            </a:r>
-          </a:p>
-          <a:p>
-            <a:r>
-              <a:rPr lang="en-US" dirty="0"/>
-              <a:t>4.1.4	The test engine shall not require changing and recompiling the program each time a test is run. 	[0]</a:t>
-            </a:r>
-          </a:p>
-          <a:p>
-            <a:r>
-              <a:rPr lang="en-US" dirty="0"/>
-              <a:t>4.1.5	The system shall have a desktop interface for locally installed users. [0]</a:t>
+              <a:t>3.3 	Availability Requirement 3: High Availability</a:t>
+            </a:r>
+          </a:p>
+          <a:p>
+            <a:r>
+              <a:rPr lang="en-US" dirty="0"/>
+              <a:t>	The system shall support high availability by being quickly accessible to users attempting to 	access it from any geographic region. [1]</a:t>
+            </a:r>
+          </a:p>
+          <a:p>
+            <a:r>
+              <a:rPr lang="en-US" dirty="0"/>
+              <a:t>3.3.1    The system homepage shall take no more than an average of five (5) seconds to load from the time the URL is input from a web browser in any geographic region. This average shall be taken 	from 10 consecutive attempts to access the homepage. [1]</a:t>
+            </a:r>
+          </a:p>
+          <a:p>
+            <a:r>
+              <a:rPr lang="en-US" dirty="0"/>
+              <a:t>3.3.2    Navigation actions (paging, links, etc.) should take no more than an average of three (3) seconds to load from the time the action is triggered. This average shall be taken from 10 consecutive attempts to perform the action. [1]</a:t>
+            </a:r>
+          </a:p>
+          <a:p>
+            <a:r>
+              <a:rPr lang="en-US" dirty="0"/>
+              <a:t>3.3.3	The system shall maintain all program code in scripts that can be deployed to the cloud platform. [1]</a:t>
+            </a:r>
+          </a:p>
+          <a:p>
+            <a:r>
+              <a:rPr lang="en-US" dirty="0"/>
+              <a:t>	3.3.3.1	Backup copies of all scripts shall be located in a separate region. [2]</a:t>
             </a:r>
           </a:p>
           <a:p>
@@ -7515,7 +7500,7 @@
     </p:spTree>
     <p:extLst>
       <p:ext uri="{BB962C8B-B14F-4D97-AF65-F5344CB8AC3E}">
-        <p14:creationId xmlns:p14="http://schemas.microsoft.com/office/powerpoint/2010/main" val="328278511"/>
+        <p14:creationId xmlns:p14="http://schemas.microsoft.com/office/powerpoint/2010/main" val="2344295902"/>
       </p:ext>
     </p:extLst>
   </p:cSld>
@@ -7577,71 +7562,49 @@
         <p:spPr/>
         <p:txBody>
           <a:bodyPr>
-            <a:normAutofit lnSpcReduction="10000"/>
+            <a:normAutofit fontScale="92500" lnSpcReduction="10000"/>
           </a:bodyPr>
           <a:lstStyle/>
           <a:p>
             <a:r>
-              <a:rPr lang="en-US" dirty="0"/>
-              <a:t>4.1.6	The system shall have a </a:t>
-            </a:r>
-            <a:r>
-              <a:rPr lang="en-US" dirty="0" err="1"/>
-              <a:t>WebUI</a:t>
-            </a:r>
-            <a:r>
-              <a:rPr lang="en-US" dirty="0"/>
-              <a:t> for remote users. [1]</a:t>
-            </a:r>
-          </a:p>
-          <a:p>
-            <a:r>
-              <a:rPr lang="en-US" dirty="0"/>
-              <a:t>4.1.7	The system shall be available on demand remotely via the </a:t>
-            </a:r>
-            <a:r>
-              <a:rPr lang="en-US" dirty="0" err="1"/>
-              <a:t>WebUI</a:t>
-            </a:r>
-            <a:r>
-              <a:rPr lang="en-US" dirty="0"/>
-              <a:t>. [1]</a:t>
-            </a:r>
-          </a:p>
-          <a:p>
-            <a:r>
-              <a:rPr lang="en-US" dirty="0"/>
-              <a:t>4.1.8	The desktop interface shall:</a:t>
-            </a:r>
-          </a:p>
-          <a:p>
-            <a:r>
-              <a:rPr lang="en-US" dirty="0"/>
-              <a:t>4.1.8.1	Display all possible tests and allow the user to select all tests they wish to run. 			[0]</a:t>
-            </a:r>
-          </a:p>
-          <a:p>
-            <a:r>
-              <a:rPr lang="en-US" dirty="0"/>
-              <a:t>4.1.8.2	Display the selected list of all tests to be run (container object on GUI). [0]</a:t>
-            </a:r>
-          </a:p>
-          <a:p>
-            <a:r>
-              <a:rPr lang="en-US" dirty="0"/>
-              <a:t>4.1.8.3	Show test progress and status on the GUI. [0]</a:t>
-            </a:r>
-          </a:p>
-          <a:p>
-            <a:r>
-              <a:rPr lang="en-US" dirty="0"/>
-              <a:t>4.1.8.4	Display the results of each test in real-time. [1]</a:t>
-            </a:r>
-          </a:p>
-          <a:p>
-            <a:r>
-              <a:rPr lang="en-US" dirty="0"/>
-              <a:t>4.1.8.5	Allow the user to specify an output file in which to log the test results. [1]</a:t>
+              <a:rPr lang="en-US" b="1" dirty="0"/>
+              <a:t>4.1 	User Requirement 1: Unit Test Execution</a:t>
+            </a:r>
+          </a:p>
+          <a:p>
+            <a:r>
+              <a:rPr lang="en-US" dirty="0"/>
+              <a:t>The software developer(s) shall have the ability to run individual unit tests of program code as well as multiple tests simultaneously. They need to be able to stress performance, ensure scalability, and diagnose system interface issues. [0]</a:t>
+            </a:r>
+          </a:p>
+          <a:p>
+            <a:r>
+              <a:rPr lang="en-US" dirty="0"/>
+              <a:t>4.1.1	The test engine shall be an application that can run on the Windows platform. [0]</a:t>
+            </a:r>
+          </a:p>
+          <a:p>
+            <a:r>
+              <a:rPr lang="en-US" dirty="0"/>
+              <a:t>4.1.2	The test engine should run on Linux and Mac platforms. [1]</a:t>
+            </a:r>
+          </a:p>
+          <a:p>
+            <a:r>
+              <a:rPr lang="en-US" dirty="0"/>
+              <a:t>4.1.3	The user shall have the ability to install the test engine on multiple machines (redundancy, performance, latency). [0]</a:t>
+            </a:r>
+          </a:p>
+          <a:p>
+            <a:r>
+              <a:rPr lang="en-US" dirty="0"/>
+              <a:t>4.1.4	The test engine shall not require changing and recompiling the program each time a test is run. 	[0]</a:t>
+            </a:r>
+          </a:p>
+          <a:p>
+            <a:r>
+              <a:rPr lang="en-US" dirty="0"/>
+              <a:t>4.1.5	The system shall have a desktop interface for locally installed users. [0]</a:t>
             </a:r>
           </a:p>
           <a:p>
@@ -7652,7 +7615,7 @@
     </p:spTree>
     <p:extLst>
       <p:ext uri="{BB962C8B-B14F-4D97-AF65-F5344CB8AC3E}">
-        <p14:creationId xmlns:p14="http://schemas.microsoft.com/office/powerpoint/2010/main" val="244142803"/>
+        <p14:creationId xmlns:p14="http://schemas.microsoft.com/office/powerpoint/2010/main" val="328278511"/>
       </p:ext>
     </p:extLst>
   </p:cSld>
@@ -7714,13 +7677,13 @@
         <p:spPr/>
         <p:txBody>
           <a:bodyPr>
-            <a:normAutofit fontScale="92500" lnSpcReduction="20000"/>
+            <a:normAutofit lnSpcReduction="10000"/>
           </a:bodyPr>
           <a:lstStyle/>
           <a:p>
             <a:r>
               <a:rPr lang="en-US" dirty="0"/>
-              <a:t>4.1.9	The </a:t>
+              <a:t>4.1.6	The system shall have a </a:t>
             </a:r>
             <a:r>
               <a:rPr lang="en-US" dirty="0" err="1"/>
@@ -7728,55 +7691,57 @@
             </a:r>
             <a:r>
               <a:rPr lang="en-US" dirty="0"/>
-              <a:t> shall:</a:t>
-            </a:r>
-          </a:p>
-          <a:p>
-            <a:r>
-              <a:rPr lang="en-US" dirty="0"/>
-              <a:t>4.1.9.1	Display all possible tests and allow the user to select all tests they wish to run. 			[1]</a:t>
-            </a:r>
-          </a:p>
-          <a:p>
-            <a:r>
-              <a:rPr lang="en-US" dirty="0"/>
-              <a:t>4.1.9.2	Display the selected list of all tests to be run (container object on GUI). [1]</a:t>
-            </a:r>
-          </a:p>
-          <a:p>
-            <a:r>
-              <a:rPr lang="en-US" dirty="0"/>
-              <a:t>4.1.9.3	Show test progress and status on the GUI. [1]</a:t>
-            </a:r>
-          </a:p>
-          <a:p>
-            <a:r>
-              <a:rPr lang="en-US" dirty="0"/>
-              <a:t>4.1.9.4	Display the results of each test in real-time. [2]</a:t>
-            </a:r>
-          </a:p>
-          <a:p>
-            <a:r>
-              <a:rPr lang="en-US" dirty="0"/>
-              <a:t>4.1.9.5	Allow the user to specify an output file in which to log the test results. [2]</a:t>
-            </a:r>
-          </a:p>
-          <a:p>
-            <a:r>
-              <a:rPr lang="en-US" dirty="0"/>
-              <a:t>              	       4.1.9.1	 Execute tests on available clients. [1]</a:t>
-            </a:r>
-          </a:p>
-          <a:p>
-            <a:r>
-              <a:rPr lang="en-US" dirty="0"/>
-              <a:t>	       4.1.9.2	 Export current and prior test results for specific clients. [2]</a:t>
-            </a:r>
-          </a:p>
-          <a:p>
-            <a:r>
-              <a:rPr lang="en-US" dirty="0"/>
-              <a:t>4.1.10	The application shall log all test results to the output file specified in the GUI. [0]</a:t>
+              <a:t> for remote users. [1]</a:t>
+            </a:r>
+          </a:p>
+          <a:p>
+            <a:r>
+              <a:rPr lang="en-US" dirty="0"/>
+              <a:t>4.1.7	The system shall be available on demand remotely via the </a:t>
+            </a:r>
+            <a:r>
+              <a:rPr lang="en-US" dirty="0" err="1"/>
+              <a:t>WebUI</a:t>
+            </a:r>
+            <a:r>
+              <a:rPr lang="en-US" dirty="0"/>
+              <a:t>. [1]</a:t>
+            </a:r>
+          </a:p>
+          <a:p>
+            <a:r>
+              <a:rPr lang="en-US" dirty="0"/>
+              <a:t>4.1.8	The desktop interface shall:</a:t>
+            </a:r>
+          </a:p>
+          <a:p>
+            <a:r>
+              <a:rPr lang="en-US" dirty="0"/>
+              <a:t>4.1.8.1	Display all possible tests and allow the user to select all tests they wish to run. 			[0]</a:t>
+            </a:r>
+          </a:p>
+          <a:p>
+            <a:r>
+              <a:rPr lang="en-US" dirty="0"/>
+              <a:t>4.1.8.2	Display the selected list of all tests to be run (container object on GUI). [0]</a:t>
+            </a:r>
+          </a:p>
+          <a:p>
+            <a:r>
+              <a:rPr lang="en-US" dirty="0"/>
+              <a:t>4.1.8.3	Show test progress and status on the GUI. [0]</a:t>
+            </a:r>
+          </a:p>
+          <a:p>
+            <a:r>
+              <a:rPr lang="en-US" dirty="0"/>
+              <a:t>4.1.8.4	Display the results of each test in real-time. [1]</a:t>
+            </a:r>
+          </a:p>
+          <a:p>
+            <a:r>
+              <a:rPr lang="en-US" dirty="0"/>
+              <a:t>4.1.8.5	Allow the user to specify an output file in which to log the test results. [1]</a:t>
             </a:r>
           </a:p>
           <a:p>
@@ -7787,7 +7752,7 @@
     </p:spTree>
     <p:extLst>
       <p:ext uri="{BB962C8B-B14F-4D97-AF65-F5344CB8AC3E}">
-        <p14:creationId xmlns:p14="http://schemas.microsoft.com/office/powerpoint/2010/main" val="862683440"/>
+        <p14:creationId xmlns:p14="http://schemas.microsoft.com/office/powerpoint/2010/main" val="244142803"/>
       </p:ext>
     </p:extLst>
   </p:cSld>
@@ -7848,6 +7813,146 @@
         </p:nvSpPr>
         <p:spPr>
           <a:xfrm>
+            <a:off x="677333" y="2160589"/>
+            <a:ext cx="9204603" cy="3880773"/>
+          </a:xfrm>
+        </p:spPr>
+        <p:txBody>
+          <a:bodyPr>
+            <a:normAutofit fontScale="92500" lnSpcReduction="10000"/>
+          </a:bodyPr>
+          <a:lstStyle/>
+          <a:p>
+            <a:r>
+              <a:rPr lang="en-US" dirty="0"/>
+              <a:t>4.1.9	The </a:t>
+            </a:r>
+            <a:r>
+              <a:rPr lang="en-US" dirty="0" err="1"/>
+              <a:t>WebUI</a:t>
+            </a:r>
+            <a:r>
+              <a:rPr lang="en-US" dirty="0"/>
+              <a:t> shall:</a:t>
+            </a:r>
+          </a:p>
+          <a:p>
+            <a:r>
+              <a:rPr lang="en-US" dirty="0"/>
+              <a:t>4.1.9.1	Display all possible tests and allow the user to select all tests they wish to 				run.	[1]</a:t>
+            </a:r>
+          </a:p>
+          <a:p>
+            <a:r>
+              <a:rPr lang="en-US" dirty="0"/>
+              <a:t>4.1.9.2	Display the selected list of all tests to be run (container object on GUI). [1]</a:t>
+            </a:r>
+          </a:p>
+          <a:p>
+            <a:r>
+              <a:rPr lang="en-US" dirty="0"/>
+              <a:t>4.1.9.3	Show test progress and status on the GUI. [1]</a:t>
+            </a:r>
+          </a:p>
+          <a:p>
+            <a:r>
+              <a:rPr lang="en-US" dirty="0"/>
+              <a:t>4.1.9.4	Display the results of each test in real-time. [2]</a:t>
+            </a:r>
+          </a:p>
+          <a:p>
+            <a:r>
+              <a:rPr lang="en-US" dirty="0"/>
+              <a:t>4.1.9.5	Allow the user to specify an output file in which to log the test results. [2]</a:t>
+            </a:r>
+          </a:p>
+          <a:p>
+            <a:r>
+              <a:rPr lang="en-US" dirty="0"/>
+              <a:t>                4.1.9.1	 Execute tests on available clients. [1]</a:t>
+            </a:r>
+          </a:p>
+          <a:p>
+            <a:r>
+              <a:rPr lang="en-US" dirty="0"/>
+              <a:t>	       		4.1.9.2	 Export current and prior test results for specific clients. [2]</a:t>
+            </a:r>
+          </a:p>
+          <a:p>
+            <a:r>
+              <a:rPr lang="en-US" dirty="0"/>
+              <a:t>4.1.10	The application shall log all test results to the output file specified in the GUI. 			[0]</a:t>
+            </a:r>
+          </a:p>
+          <a:p>
+            <a:endParaRPr lang="en-US" dirty="0"/>
+          </a:p>
+        </p:txBody>
+      </p:sp>
+    </p:spTree>
+    <p:extLst>
+      <p:ext uri="{BB962C8B-B14F-4D97-AF65-F5344CB8AC3E}">
+        <p14:creationId xmlns:p14="http://schemas.microsoft.com/office/powerpoint/2010/main" val="862683440"/>
+      </p:ext>
+    </p:extLst>
+  </p:cSld>
+  <p:clrMapOvr>
+    <a:masterClrMapping/>
+  </p:clrMapOvr>
+</p:sld>
+</file>
+
+<file path=ppt/slides/slide27.xml><?xml version="1.0" encoding="utf-8"?>
+<p:sld xmlns:a="http://schemas.openxmlformats.org/drawingml/2006/main" xmlns:r="http://schemas.openxmlformats.org/officeDocument/2006/relationships" xmlns:p="http://schemas.openxmlformats.org/presentationml/2006/main">
+  <p:cSld>
+    <p:spTree>
+      <p:nvGrpSpPr>
+        <p:cNvPr id="1" name=""/>
+        <p:cNvGrpSpPr/>
+        <p:nvPr/>
+      </p:nvGrpSpPr>
+      <p:grpSpPr>
+        <a:xfrm>
+          <a:off x="0" y="0"/>
+          <a:ext cx="0" cy="0"/>
+          <a:chOff x="0" y="0"/>
+          <a:chExt cx="0" cy="0"/>
+        </a:xfrm>
+      </p:grpSpPr>
+      <p:sp>
+        <p:nvSpPr>
+          <p:cNvPr id="2" name="Title 1"/>
+          <p:cNvSpPr>
+            <a:spLocks noGrp="1"/>
+          </p:cNvSpPr>
+          <p:nvPr>
+            <p:ph type="title"/>
+          </p:nvPr>
+        </p:nvSpPr>
+        <p:spPr/>
+        <p:txBody>
+          <a:bodyPr/>
+          <a:lstStyle/>
+          <a:p>
+            <a:r>
+              <a:rPr lang="en-US" dirty="0"/>
+              <a:t>User Requirements</a:t>
+            </a:r>
+          </a:p>
+        </p:txBody>
+      </p:sp>
+      <p:sp>
+        <p:nvSpPr>
+          <p:cNvPr id="3" name="Content Placeholder 2"/>
+          <p:cNvSpPr>
+            <a:spLocks noGrp="1"/>
+          </p:cNvSpPr>
+          <p:nvPr>
+            <p:ph idx="1"/>
+          </p:nvPr>
+        </p:nvSpPr>
+        <p:spPr>
+          <a:xfrm>
             <a:off x="677334" y="1380227"/>
             <a:ext cx="8596668" cy="4661136"/>
           </a:xfrm>
@@ -7872,7 +7977,7 @@
           <a:p>
             <a:r>
               <a:rPr lang="en-US" dirty="0"/>
-              <a:t>4.2.1	The system shall handle exceptions thrown by the application during testing with clear user 	output. [0]</a:t>
+              <a:t>4.2.1	The system shall handle exceptions thrown by the application during testing with clear user output. [0]</a:t>
             </a:r>
           </a:p>
           <a:p>
@@ -7935,7 +8040,7 @@
 </p:sld>
 </file>
 
-<file path=ppt/slides/slide27.xml><?xml version="1.0" encoding="utf-8"?>
+<file path=ppt/slides/slide28.xml><?xml version="1.0" encoding="utf-8"?>
 <p:sld xmlns:a="http://schemas.openxmlformats.org/drawingml/2006/main" xmlns:r="http://schemas.openxmlformats.org/officeDocument/2006/relationships" xmlns:p="http://schemas.openxmlformats.org/presentationml/2006/main">
   <p:cSld>
     <p:spTree>
@@ -8079,7 +8184,12 @@
             <p:ph idx="1"/>
           </p:nvPr>
         </p:nvSpPr>
-        <p:spPr/>
+        <p:spPr>
+          <a:xfrm>
+            <a:off x="677334" y="1488613"/>
+            <a:ext cx="8596668" cy="3880773"/>
+          </a:xfrm>
+        </p:spPr>
         <p:txBody>
           <a:bodyPr/>
           <a:lstStyle/>
@@ -8603,7 +8713,7 @@
         </p:nvSpPr>
         <p:spPr>
           <a:xfrm>
-            <a:off x="677334" y="1930400"/>
+            <a:off x="677334" y="1486017"/>
             <a:ext cx="8596668" cy="4618004"/>
           </a:xfrm>
         </p:spPr>
@@ -8726,26 +8836,43 @@
             <p:ph idx="1"/>
           </p:nvPr>
         </p:nvSpPr>
-        <p:spPr/>
+        <p:spPr>
+          <a:xfrm>
+            <a:off x="677334" y="1488613"/>
+            <a:ext cx="8596668" cy="3880773"/>
+          </a:xfrm>
+        </p:spPr>
         <p:txBody>
           <a:bodyPr/>
           <a:lstStyle/>
           <a:p>
             <a:r>
-              <a:rPr lang="en-US" dirty="0"/>
-              <a:t>Local User – user with locally installed test engine on PC/laptop.  Able to register with Test Server to register test engine in database.  Able to run tests locally.  Uses UI with internal engine.</a:t>
-            </a:r>
-          </a:p>
-          <a:p>
-            <a:r>
-              <a:rPr lang="en-US" dirty="0"/>
-              <a:t>Remote User – user with same capability as local user, but has ability to view available test engines across the web and to use other hardware, servers,  infrastructure for test purposes as well as capability to view archived results.</a:t>
-            </a:r>
-          </a:p>
-          <a:p>
-            <a:r>
-              <a:rPr lang="en-US" dirty="0"/>
-              <a:t>Administrator – user with the ability to install application remotely, update application services, add remote users, de-register test engines, perform HA/DR testing.  </a:t>
+              <a:rPr lang="en-US" b="1" dirty="0"/>
+              <a:t>Local User </a:t>
+            </a:r>
+            <a:r>
+              <a:rPr lang="en-US" dirty="0"/>
+              <a:t>– user with locally installed test engine on PC/laptop.  Able to register with Test Server to register test engine in database.  Able to run tests locally.  Uses UI with internal engine.</a:t>
+            </a:r>
+          </a:p>
+          <a:p>
+            <a:r>
+              <a:rPr lang="en-US" b="1" dirty="0"/>
+              <a:t>Remote User </a:t>
+            </a:r>
+            <a:r>
+              <a:rPr lang="en-US" dirty="0"/>
+              <a:t>– user with same capability as local user, but has ability to view available test engines across the web and to use other hardware, servers,  infrastructure for test purposes as well as capability to view archived results.</a:t>
+            </a:r>
+          </a:p>
+          <a:p>
+            <a:r>
+              <a:rPr lang="en-US" b="1" dirty="0"/>
+              <a:t>Administrator</a:t>
+            </a:r>
+            <a:r>
+              <a:rPr lang="en-US" dirty="0"/>
+              <a:t> – user with the ability to install application remotely, update application services, add remote users, de-register test engines, perform HA/DR testing.  </a:t>
             </a:r>
           </a:p>
         </p:txBody>
@@ -8814,8 +8941,8 @@
         </p:nvSpPr>
         <p:spPr>
           <a:xfrm>
-            <a:off x="677334" y="1548114"/>
-            <a:ext cx="8596668" cy="4999335"/>
+            <a:off x="677333" y="1548114"/>
+            <a:ext cx="9060225" cy="4999335"/>
           </a:xfrm>
         </p:spPr>
         <p:txBody>
@@ -8834,7 +8961,7 @@
             </a:r>
             <a:r>
               <a:rPr lang="en-US" dirty="0"/>
-              <a:t>) communicates with the test engine and test server over the internet.</a:t>
+              <a:t>) communicates with the test engine and test server over the internet. [1]</a:t>
             </a:r>
           </a:p>
           <a:p>
@@ -8848,27 +8975,27 @@
             </a:r>
             <a:r>
               <a:rPr lang="en-US" dirty="0"/>
-              <a:t> to be accessed via a standard web 	browser.</a:t>
+              <a:t> to be accessed via a standard web 	browser. [1]</a:t>
             </a:r>
           </a:p>
           <a:p>
             <a:pPr lvl="1"/>
             <a:r>
               <a:rPr lang="en-US" dirty="0"/>
-              <a:t>2.2.1	The system shall support the Firefox web browser.</a:t>
+              <a:t>2.2.1	The system shall support the Firefox web browser. [1]</a:t>
             </a:r>
           </a:p>
           <a:p>
             <a:pPr lvl="1"/>
             <a:r>
               <a:rPr lang="en-US" dirty="0"/>
-              <a:t>2.2.2	The system should support the Microsoft Edge and Google Chrome web browsers.</a:t>
-            </a:r>
-          </a:p>
-          <a:p>
-            <a:r>
-              <a:rPr lang="en-US" dirty="0"/>
-              <a:t>2.3	The system shall employ a database in which to store all test data, including configuration data, 	test cases, and test results.</a:t>
+              <a:t>2.2.2	The system should support the Microsoft Edge and Google Chrome web browsers. [2]</a:t>
+            </a:r>
+          </a:p>
+          <a:p>
+            <a:r>
+              <a:rPr lang="en-US" dirty="0"/>
+              <a:t>2.3	The system shall employ a database in which to store all test data, including configuration data, 	test cases, and test results. [1]</a:t>
             </a:r>
           </a:p>
           <a:p>
@@ -8882,19 +9009,19 @@
             </a:r>
             <a:r>
               <a:rPr lang="en-US" dirty="0"/>
-              <a:t>.</a:t>
-            </a:r>
-          </a:p>
-          <a:p>
-            <a:r>
-              <a:rPr lang="en-US" dirty="0"/>
-              <a:t>2.5	The system shall be hosted on a cloud platform to support ease of resource acquisition and hosting, automatic scaling of system resources, built-in network infrastructure, managed services 	where needed.</a:t>
-            </a:r>
-          </a:p>
-          <a:p>
-            <a:r>
-              <a:rPr lang="en-US" dirty="0"/>
-              <a:t>2.6	The system shall have a development environment for use by the software engineering and development teams.</a:t>
+              <a:t>. [1]</a:t>
+            </a:r>
+          </a:p>
+          <a:p>
+            <a:r>
+              <a:rPr lang="en-US" dirty="0"/>
+              <a:t>2.5	The system shall be hosted on a cloud platform to support ease of resource acquisition and hosting, automatic scaling of system resources, built-in network infrastructure, managed services	where needed. [2]</a:t>
+            </a:r>
+          </a:p>
+          <a:p>
+            <a:r>
+              <a:rPr lang="en-US" dirty="0"/>
+              <a:t>2.6	The system shall have a development environment for use by the software engineering and development teams. [2]</a:t>
             </a:r>
           </a:p>
           <a:p>

</xml_diff>

<commit_message>
moved roles slide up one
</commit_message>
<xml_diff>
--- a/Test Framework Midterm Presentation 001.pptx
+++ b/Test Framework Midterm Presentation 001.pptx
@@ -11,8 +11,8 @@
     <p:sldId id="259" r:id="rId5"/>
     <p:sldId id="260" r:id="rId6"/>
     <p:sldId id="261" r:id="rId7"/>
-    <p:sldId id="268" r:id="rId8"/>
-    <p:sldId id="275" r:id="rId9"/>
+    <p:sldId id="275" r:id="rId8"/>
+    <p:sldId id="268" r:id="rId9"/>
     <p:sldId id="262" r:id="rId10"/>
     <p:sldId id="269" r:id="rId11"/>
     <p:sldId id="283" r:id="rId12"/>
@@ -885,7 +885,7 @@
             <a:fld id="{B61BEF0D-F0BB-DE4B-95CE-6DB70DBA9567}" type="datetimeFigureOut">
               <a:rPr lang="en-US" dirty="0"/>
               <a:pPr/>
-              <a:t>8/11/2020</a:t>
+              <a:t>8/13/2020</a:t>
             </a:fld>
             <a:endParaRPr lang="en-US" dirty="0"/>
           </a:p>
@@ -1133,7 +1133,7 @@
             <a:fld id="{B61BEF0D-F0BB-DE4B-95CE-6DB70DBA9567}" type="datetimeFigureOut">
               <a:rPr lang="en-US" dirty="0"/>
               <a:pPr/>
-              <a:t>8/11/2020</a:t>
+              <a:t>8/13/2020</a:t>
             </a:fld>
             <a:endParaRPr lang="en-US" dirty="0"/>
           </a:p>
@@ -1444,7 +1444,7 @@
             <a:fld id="{B61BEF0D-F0BB-DE4B-95CE-6DB70DBA9567}" type="datetimeFigureOut">
               <a:rPr lang="en-US" dirty="0"/>
               <a:pPr/>
-              <a:t>8/11/2020</a:t>
+              <a:t>8/13/2020</a:t>
             </a:fld>
             <a:endParaRPr lang="en-US" dirty="0"/>
           </a:p>
@@ -1774,7 +1774,7 @@
             <a:fld id="{B61BEF0D-F0BB-DE4B-95CE-6DB70DBA9567}" type="datetimeFigureOut">
               <a:rPr lang="en-US" dirty="0"/>
               <a:pPr/>
-              <a:t>8/11/2020</a:t>
+              <a:t>8/13/2020</a:t>
             </a:fld>
             <a:endParaRPr lang="en-US" dirty="0"/>
           </a:p>
@@ -2085,7 +2085,7 @@
             <a:fld id="{B61BEF0D-F0BB-DE4B-95CE-6DB70DBA9567}" type="datetimeFigureOut">
               <a:rPr lang="en-US" dirty="0"/>
               <a:pPr/>
-              <a:t>8/11/2020</a:t>
+              <a:t>8/13/2020</a:t>
             </a:fld>
             <a:endParaRPr lang="en-US" dirty="0"/>
           </a:p>
@@ -2475,7 +2475,7 @@
             <a:fld id="{B61BEF0D-F0BB-DE4B-95CE-6DB70DBA9567}" type="datetimeFigureOut">
               <a:rPr lang="en-US" dirty="0"/>
               <a:pPr/>
-              <a:t>8/11/2020</a:t>
+              <a:t>8/13/2020</a:t>
             </a:fld>
             <a:endParaRPr lang="en-US" dirty="0"/>
           </a:p>
@@ -2641,7 +2641,7 @@
           <a:p>
             <a:fld id="{55C6B4A9-1611-4792-9094-5F34BCA07E0B}" type="datetimeFigureOut">
               <a:rPr lang="en-US" dirty="0"/>
-              <a:t>8/11/2020</a:t>
+              <a:t>8/13/2020</a:t>
             </a:fld>
             <a:endParaRPr lang="en-US" dirty="0"/>
           </a:p>
@@ -2817,7 +2817,7 @@
             <a:fld id="{B61BEF0D-F0BB-DE4B-95CE-6DB70DBA9567}" type="datetimeFigureOut">
               <a:rPr lang="en-US" dirty="0"/>
               <a:pPr/>
-              <a:t>8/11/2020</a:t>
+              <a:t>8/13/2020</a:t>
             </a:fld>
             <a:endParaRPr lang="en-US" dirty="0"/>
           </a:p>
@@ -2983,7 +2983,7 @@
           <a:p>
             <a:fld id="{42A54C80-263E-416B-A8E0-580EDEADCBDC}" type="datetimeFigureOut">
               <a:rPr lang="en-US" dirty="0"/>
-              <a:t>8/11/2020</a:t>
+              <a:t>8/13/2020</a:t>
             </a:fld>
             <a:endParaRPr lang="en-US" dirty="0"/>
           </a:p>
@@ -3226,7 +3226,7 @@
             <a:fld id="{B61BEF0D-F0BB-DE4B-95CE-6DB70DBA9567}" type="datetimeFigureOut">
               <a:rPr lang="en-US" dirty="0"/>
               <a:pPr/>
-              <a:t>8/11/2020</a:t>
+              <a:t>8/13/2020</a:t>
             </a:fld>
             <a:endParaRPr lang="en-US" dirty="0"/>
           </a:p>
@@ -3454,7 +3454,7 @@
           <a:p>
             <a:fld id="{42A54C80-263E-416B-A8E0-580EDEADCBDC}" type="datetimeFigureOut">
               <a:rPr lang="en-US" dirty="0"/>
-              <a:t>8/11/2020</a:t>
+              <a:t>8/13/2020</a:t>
             </a:fld>
             <a:endParaRPr lang="en-US" dirty="0"/>
           </a:p>
@@ -3824,7 +3824,7 @@
             <a:fld id="{B61BEF0D-F0BB-DE4B-95CE-6DB70DBA9567}" type="datetimeFigureOut">
               <a:rPr lang="en-US" dirty="0"/>
               <a:pPr/>
-              <a:t>8/11/2020</a:t>
+              <a:t>8/13/2020</a:t>
             </a:fld>
             <a:endParaRPr lang="en-US" dirty="0"/>
           </a:p>
@@ -3944,7 +3944,7 @@
             <a:fld id="{B61BEF0D-F0BB-DE4B-95CE-6DB70DBA9567}" type="datetimeFigureOut">
               <a:rPr lang="en-US" dirty="0"/>
               <a:pPr/>
-              <a:t>8/11/2020</a:t>
+              <a:t>8/13/2020</a:t>
             </a:fld>
             <a:endParaRPr lang="en-US" dirty="0"/>
           </a:p>
@@ -4036,7 +4036,7 @@
             <a:fld id="{B61BEF0D-F0BB-DE4B-95CE-6DB70DBA9567}" type="datetimeFigureOut">
               <a:rPr lang="en-US" dirty="0"/>
               <a:pPr/>
-              <a:t>8/11/2020</a:t>
+              <a:t>8/13/2020</a:t>
             </a:fld>
             <a:endParaRPr lang="en-US" dirty="0"/>
           </a:p>
@@ -4287,7 +4287,7 @@
           <a:p>
             <a:fld id="{42A54C80-263E-416B-A8E0-580EDEADCBDC}" type="datetimeFigureOut">
               <a:rPr lang="en-US" dirty="0"/>
-              <a:t>8/11/2020</a:t>
+              <a:t>8/13/2020</a:t>
             </a:fld>
             <a:endParaRPr lang="en-US" dirty="0"/>
           </a:p>
@@ -4589,7 +4589,7 @@
             <a:fld id="{B61BEF0D-F0BB-DE4B-95CE-6DB70DBA9567}" type="datetimeFigureOut">
               <a:rPr lang="en-US" dirty="0"/>
               <a:pPr/>
-              <a:t>8/11/2020</a:t>
+              <a:t>8/13/2020</a:t>
             </a:fld>
             <a:endParaRPr lang="en-US" dirty="0"/>
           </a:p>
@@ -5287,7 +5287,7 @@
             <a:fld id="{B61BEF0D-F0BB-DE4B-95CE-6DB70DBA9567}" type="datetimeFigureOut">
               <a:rPr lang="en-US" dirty="0"/>
               <a:pPr/>
-              <a:t>8/11/2020</a:t>
+              <a:t>8/13/2020</a:t>
             </a:fld>
             <a:endParaRPr lang="en-US" dirty="0"/>
           </a:p>
@@ -6100,7 +6100,7 @@
           <p:cNvPr id="2" name="Title 1">
             <a:extLst>
               <a:ext uri="{FF2B5EF4-FFF2-40B4-BE49-F238E27FC236}">
-                <a16:creationId xmlns:a16="http://schemas.microsoft.com/office/drawing/2014/main" id="{3016A5BA-F72A-4CD9-AF4C-68ADAC202004}"/>
+                <a16:creationId xmlns:a16="http://schemas.microsoft.com/office/drawing/2014/main" xmlns="" id="{3016A5BA-F72A-4CD9-AF4C-68ADAC202004}"/>
               </a:ext>
             </a:extLst>
           </p:cNvPr>
@@ -6128,7 +6128,7 @@
           <p:cNvPr id="3" name="Content Placeholder 2">
             <a:extLst>
               <a:ext uri="{FF2B5EF4-FFF2-40B4-BE49-F238E27FC236}">
-                <a16:creationId xmlns:a16="http://schemas.microsoft.com/office/drawing/2014/main" id="{BAC61804-0702-4E9C-9632-1F546949E17F}"/>
+                <a16:creationId xmlns:a16="http://schemas.microsoft.com/office/drawing/2014/main" xmlns="" id="{BAC61804-0702-4E9C-9632-1F546949E17F}"/>
               </a:ext>
             </a:extLst>
           </p:cNvPr>
@@ -6727,7 +6727,7 @@
           <p:cNvPr id="9" name="Picture 8">
             <a:extLst>
               <a:ext uri="{FF2B5EF4-FFF2-40B4-BE49-F238E27FC236}">
-                <a16:creationId xmlns:a16="http://schemas.microsoft.com/office/drawing/2014/main" id="{3AA46D10-FDAD-4FDF-879C-3D7BDBD38A0C}"/>
+                <a16:creationId xmlns:a16="http://schemas.microsoft.com/office/drawing/2014/main" xmlns="" id="{3AA46D10-FDAD-4FDF-879C-3D7BDBD38A0C}"/>
               </a:ext>
             </a:extLst>
           </p:cNvPr>
@@ -6757,7 +6757,7 @@
           <p:cNvPr id="11" name="Picture 10">
             <a:extLst>
               <a:ext uri="{FF2B5EF4-FFF2-40B4-BE49-F238E27FC236}">
-                <a16:creationId xmlns:a16="http://schemas.microsoft.com/office/drawing/2014/main" id="{199F2A54-2DBF-4AD1-89D0-FCBED4D40BAD}"/>
+                <a16:creationId xmlns:a16="http://schemas.microsoft.com/office/drawing/2014/main" xmlns="" id="{199F2A54-2DBF-4AD1-89D0-FCBED4D40BAD}"/>
               </a:ext>
             </a:extLst>
           </p:cNvPr>
@@ -6787,7 +6787,7 @@
           <p:cNvPr id="13" name="Picture 12">
             <a:extLst>
               <a:ext uri="{FF2B5EF4-FFF2-40B4-BE49-F238E27FC236}">
-                <a16:creationId xmlns:a16="http://schemas.microsoft.com/office/drawing/2014/main" id="{1F923096-7DC3-4570-86BE-53B9C19BBBCC}"/>
+                <a16:creationId xmlns:a16="http://schemas.microsoft.com/office/drawing/2014/main" xmlns="" id="{1F923096-7DC3-4570-86BE-53B9C19BBBCC}"/>
               </a:ext>
             </a:extLst>
           </p:cNvPr>
@@ -6869,7 +6869,7 @@
           <p:cNvPr id="5" name="Picture 4">
             <a:extLst>
               <a:ext uri="{FF2B5EF4-FFF2-40B4-BE49-F238E27FC236}">
-                <a16:creationId xmlns:a16="http://schemas.microsoft.com/office/drawing/2014/main" id="{13B04C9D-E45A-4DE2-AF80-B1367C691FAE}"/>
+                <a16:creationId xmlns:a16="http://schemas.microsoft.com/office/drawing/2014/main" xmlns="" id="{13B04C9D-E45A-4DE2-AF80-B1367C691FAE}"/>
               </a:ext>
             </a:extLst>
           </p:cNvPr>
@@ -6951,7 +6951,7 @@
           <p:cNvPr id="5" name="Picture 4">
             <a:extLst>
               <a:ext uri="{FF2B5EF4-FFF2-40B4-BE49-F238E27FC236}">
-                <a16:creationId xmlns:a16="http://schemas.microsoft.com/office/drawing/2014/main" id="{C9AEC1BA-FA4A-4D68-9D25-D43E9CFFC02C}"/>
+                <a16:creationId xmlns:a16="http://schemas.microsoft.com/office/drawing/2014/main" xmlns="" id="{C9AEC1BA-FA4A-4D68-9D25-D43E9CFFC02C}"/>
               </a:ext>
             </a:extLst>
           </p:cNvPr>
@@ -6981,7 +6981,7 @@
           <p:cNvPr id="9" name="Picture 8">
             <a:extLst>
               <a:ext uri="{FF2B5EF4-FFF2-40B4-BE49-F238E27FC236}">
-                <a16:creationId xmlns:a16="http://schemas.microsoft.com/office/drawing/2014/main" id="{B50AD3E8-FD4C-4543-9C8F-D6BCED40866F}"/>
+                <a16:creationId xmlns:a16="http://schemas.microsoft.com/office/drawing/2014/main" xmlns="" id="{B50AD3E8-FD4C-4543-9C8F-D6BCED40866F}"/>
               </a:ext>
             </a:extLst>
           </p:cNvPr>
@@ -8294,7 +8294,7 @@
           <p:cNvPr id="6" name="Picture 5">
             <a:extLst>
               <a:ext uri="{FF2B5EF4-FFF2-40B4-BE49-F238E27FC236}">
-                <a16:creationId xmlns:a16="http://schemas.microsoft.com/office/drawing/2014/main" id="{42F62902-0B99-45F6-8313-405C7CFCB586}"/>
+                <a16:creationId xmlns:a16="http://schemas.microsoft.com/office/drawing/2014/main" xmlns="" id="{42F62902-0B99-45F6-8313-405C7CFCB586}"/>
               </a:ext>
             </a:extLst>
           </p:cNvPr>
@@ -8696,7 +8696,7 @@
           <a:p>
             <a:r>
               <a:rPr lang="en-US" dirty="0"/>
-              <a:t>System Usability</a:t>
+              <a:t>User Roles and Accessibility</a:t>
             </a:r>
           </a:p>
         </p:txBody>
@@ -8713,63 +8713,41 @@
         </p:nvSpPr>
         <p:spPr>
           <a:xfrm>
-            <a:off x="677334" y="1486017"/>
-            <a:ext cx="8596668" cy="4618004"/>
+            <a:off x="677334" y="1488613"/>
+            <a:ext cx="8596668" cy="3880773"/>
           </a:xfrm>
         </p:spPr>
         <p:txBody>
-          <a:bodyPr>
-            <a:normAutofit/>
-          </a:bodyPr>
-          <a:lstStyle/>
-          <a:p>
-            <a:pPr marL="0" indent="0">
-              <a:buNone/>
-            </a:pPr>
-            <a:r>
-              <a:rPr lang="en-US" dirty="0"/>
-              <a:t>The system will be used by a range of professional IT development staff.  This is a system that the developers, architects, engineers, and others should be able to learn to use quickly, enable quick testing of program code, get results back and view logs or other test output.  The system shall have:</a:t>
-            </a:r>
-          </a:p>
-          <a:p>
-            <a:pPr lvl="0"/>
-            <a:r>
-              <a:rPr lang="en-US" dirty="0"/>
-              <a:t>Graphic User Interface (GUI). </a:t>
-            </a:r>
-          </a:p>
-          <a:p>
-            <a:pPr lvl="0"/>
-            <a:r>
-              <a:rPr lang="en-US" dirty="0"/>
-              <a:t>Web enabled front end.</a:t>
-            </a:r>
-          </a:p>
-          <a:p>
-            <a:pPr lvl="0"/>
-            <a:r>
-              <a:rPr lang="en-US" dirty="0"/>
-              <a:t>Capability to run multiple tests simultaneously.</a:t>
-            </a:r>
-          </a:p>
-          <a:p>
-            <a:pPr lvl="0"/>
-            <a:r>
-              <a:rPr lang="en-US" dirty="0"/>
-              <a:t>Capability to ensure that no one test can tie up system resources.</a:t>
-            </a:r>
-          </a:p>
-          <a:p>
-            <a:pPr lvl="0"/>
-            <a:r>
-              <a:rPr lang="en-US" dirty="0"/>
-              <a:t>Ability to allow multiple users to use the system at the same time.</a:t>
-            </a:r>
-          </a:p>
-          <a:p>
-            <a:r>
-              <a:rPr lang="en-US" dirty="0"/>
-              <a:t>System is highly available, disaster recoverable, and located in multiple regions of a cloud platform that allow for excellent performance, local scalability, and reduction in network latency.</a:t>
+          <a:bodyPr/>
+          <a:lstStyle/>
+          <a:p>
+            <a:r>
+              <a:rPr lang="en-US" b="1" dirty="0"/>
+              <a:t>Local User </a:t>
+            </a:r>
+            <a:r>
+              <a:rPr lang="en-US" dirty="0"/>
+              <a:t>– user with locally installed test engine on PC/laptop.  Able to register with Test Server to register test engine in database.  Able to run tests locally.  Uses UI with internal engine.</a:t>
+            </a:r>
+          </a:p>
+          <a:p>
+            <a:r>
+              <a:rPr lang="en-US" b="1" dirty="0"/>
+              <a:t>Remote User </a:t>
+            </a:r>
+            <a:r>
+              <a:rPr lang="en-US" dirty="0"/>
+              <a:t>– user with same capability as local user, but has ability to view available test engines across the web and to use other hardware, servers,  infrastructure for test purposes as well as capability to view archived results.</a:t>
+            </a:r>
+          </a:p>
+          <a:p>
+            <a:r>
+              <a:rPr lang="en-US" b="1" dirty="0"/>
+              <a:t>Administrator</a:t>
+            </a:r>
+            <a:r>
+              <a:rPr lang="en-US" dirty="0"/>
+              <a:t> – user with the ability to install application remotely, update application services, add remote users, de-register test engines, perform HA/DR testing.  </a:t>
             </a:r>
           </a:p>
         </p:txBody>
@@ -8777,7 +8755,7 @@
     </p:spTree>
     <p:extLst>
       <p:ext uri="{BB962C8B-B14F-4D97-AF65-F5344CB8AC3E}">
-        <p14:creationId xmlns:p14="http://schemas.microsoft.com/office/powerpoint/2010/main" val="3413660939"/>
+        <p14:creationId xmlns:p14="http://schemas.microsoft.com/office/powerpoint/2010/main" val="3608927386"/>
       </p:ext>
     </p:extLst>
   </p:cSld>
@@ -8821,7 +8799,7 @@
           <a:p>
             <a:r>
               <a:rPr lang="en-US" dirty="0"/>
-              <a:t>User Roles and Accessibility</a:t>
+              <a:t>System Usability</a:t>
             </a:r>
           </a:p>
         </p:txBody>
@@ -8838,41 +8816,63 @@
         </p:nvSpPr>
         <p:spPr>
           <a:xfrm>
-            <a:off x="677334" y="1488613"/>
-            <a:ext cx="8596668" cy="3880773"/>
+            <a:off x="677334" y="1486017"/>
+            <a:ext cx="8596668" cy="4618004"/>
           </a:xfrm>
         </p:spPr>
         <p:txBody>
-          <a:bodyPr/>
-          <a:lstStyle/>
-          <a:p>
-            <a:r>
-              <a:rPr lang="en-US" b="1" dirty="0"/>
-              <a:t>Local User </a:t>
-            </a:r>
-            <a:r>
-              <a:rPr lang="en-US" dirty="0"/>
-              <a:t>– user with locally installed test engine on PC/laptop.  Able to register with Test Server to register test engine in database.  Able to run tests locally.  Uses UI with internal engine.</a:t>
-            </a:r>
-          </a:p>
-          <a:p>
-            <a:r>
-              <a:rPr lang="en-US" b="1" dirty="0"/>
-              <a:t>Remote User </a:t>
-            </a:r>
-            <a:r>
-              <a:rPr lang="en-US" dirty="0"/>
-              <a:t>– user with same capability as local user, but has ability to view available test engines across the web and to use other hardware, servers,  infrastructure for test purposes as well as capability to view archived results.</a:t>
-            </a:r>
-          </a:p>
-          <a:p>
-            <a:r>
-              <a:rPr lang="en-US" b="1" dirty="0"/>
-              <a:t>Administrator</a:t>
-            </a:r>
-            <a:r>
-              <a:rPr lang="en-US" dirty="0"/>
-              <a:t> – user with the ability to install application remotely, update application services, add remote users, de-register test engines, perform HA/DR testing.  </a:t>
+          <a:bodyPr>
+            <a:normAutofit/>
+          </a:bodyPr>
+          <a:lstStyle/>
+          <a:p>
+            <a:pPr marL="0" indent="0">
+              <a:buNone/>
+            </a:pPr>
+            <a:r>
+              <a:rPr lang="en-US" dirty="0"/>
+              <a:t>The system will be used by a range of professional IT development staff.  This is a system that the developers, architects, engineers, and others should be able to learn to use quickly, enable quick testing of program code, get results back and view logs or other test output.  The system shall have:</a:t>
+            </a:r>
+          </a:p>
+          <a:p>
+            <a:pPr lvl="0"/>
+            <a:r>
+              <a:rPr lang="en-US" dirty="0"/>
+              <a:t>Graphic User Interface (GUI). </a:t>
+            </a:r>
+          </a:p>
+          <a:p>
+            <a:pPr lvl="0"/>
+            <a:r>
+              <a:rPr lang="en-US" dirty="0"/>
+              <a:t>Web enabled front end.</a:t>
+            </a:r>
+          </a:p>
+          <a:p>
+            <a:pPr lvl="0"/>
+            <a:r>
+              <a:rPr lang="en-US" dirty="0"/>
+              <a:t>Capability to run multiple tests simultaneously.</a:t>
+            </a:r>
+          </a:p>
+          <a:p>
+            <a:pPr lvl="0"/>
+            <a:r>
+              <a:rPr lang="en-US" dirty="0"/>
+              <a:t>Capability to ensure that no one test can tie up system resources.</a:t>
+            </a:r>
+          </a:p>
+          <a:p>
+            <a:pPr lvl="0"/>
+            <a:r>
+              <a:rPr lang="en-US" dirty="0"/>
+              <a:t>Ability to allow multiple users to use the system at the same time.</a:t>
+            </a:r>
+          </a:p>
+          <a:p>
+            <a:r>
+              <a:rPr lang="en-US" dirty="0"/>
+              <a:t>System is highly available, disaster recoverable, and located in multiple regions of a cloud platform that allow for excellent performance, local scalability, and reduction in network latency.</a:t>
             </a:r>
           </a:p>
         </p:txBody>
@@ -8880,7 +8880,7 @@
     </p:spTree>
     <p:extLst>
       <p:ext uri="{BB962C8B-B14F-4D97-AF65-F5344CB8AC3E}">
-        <p14:creationId xmlns:p14="http://schemas.microsoft.com/office/powerpoint/2010/main" val="3608927386"/>
+        <p14:creationId xmlns:p14="http://schemas.microsoft.com/office/powerpoint/2010/main" val="3413660939"/>
       </p:ext>
     </p:extLst>
   </p:cSld>

</xml_diff>